<commit_message>
Write an explanation of the ideal of the unit tests.
</commit_message>
<xml_diff>
--- a/images/images.pptx
+++ b/images/images.pptx
@@ -6,6 +6,9 @@
   </p:sldMasterIdLst>
   <p:sldIdLst>
     <p:sldId id="256" r:id="rId2"/>
+    <p:sldId id="257" r:id="rId3"/>
+    <p:sldId id="258" r:id="rId4"/>
+    <p:sldId id="259" r:id="rId5"/>
   </p:sldIdLst>
   <p:sldSz cx="12192000" cy="6858000"/>
   <p:notesSz cx="6858000" cy="9144000"/>
@@ -104,6 +107,11 @@
       </a:defRPr>
     </a:lvl9pPr>
   </p:defaultTextStyle>
+  <p:extLst>
+    <p:ext uri="{EFAFB233-063F-42B5-8137-9DF3F51BA10A}">
+      <p15:sldGuideLst xmlns:p15="http://schemas.microsoft.com/office/powerpoint/2012/main"/>
+    </p:ext>
+  </p:extLst>
 </p:presentation>
 </file>
 
@@ -254,7 +262,7 @@
           <a:p>
             <a:fld id="{05CEC32E-2D17-B842-A2D3-04F6F1CD1B45}" type="datetimeFigureOut">
               <a:rPr kumimoji="1" lang="ja-JP" altLang="en-US" smtClean="0"/>
-              <a:t>2024/5/15</a:t>
+              <a:t>2024/5/16</a:t>
             </a:fld>
             <a:endParaRPr kumimoji="1" lang="ja-JP" altLang="en-US"/>
           </a:p>
@@ -484,7 +492,7 @@
           <a:p>
             <a:fld id="{05CEC32E-2D17-B842-A2D3-04F6F1CD1B45}" type="datetimeFigureOut">
               <a:rPr kumimoji="1" lang="ja-JP" altLang="en-US" smtClean="0"/>
-              <a:t>2024/5/15</a:t>
+              <a:t>2024/5/16</a:t>
             </a:fld>
             <a:endParaRPr kumimoji="1" lang="ja-JP" altLang="en-US"/>
           </a:p>
@@ -724,7 +732,7 @@
           <a:p>
             <a:fld id="{05CEC32E-2D17-B842-A2D3-04F6F1CD1B45}" type="datetimeFigureOut">
               <a:rPr kumimoji="1" lang="ja-JP" altLang="en-US" smtClean="0"/>
-              <a:t>2024/5/15</a:t>
+              <a:t>2024/5/16</a:t>
             </a:fld>
             <a:endParaRPr kumimoji="1" lang="ja-JP" altLang="en-US"/>
           </a:p>
@@ -954,7 +962,7 @@
           <a:p>
             <a:fld id="{05CEC32E-2D17-B842-A2D3-04F6F1CD1B45}" type="datetimeFigureOut">
               <a:rPr kumimoji="1" lang="ja-JP" altLang="en-US" smtClean="0"/>
-              <a:t>2024/5/15</a:t>
+              <a:t>2024/5/16</a:t>
             </a:fld>
             <a:endParaRPr kumimoji="1" lang="ja-JP" altLang="en-US"/>
           </a:p>
@@ -1229,7 +1237,7 @@
           <a:p>
             <a:fld id="{05CEC32E-2D17-B842-A2D3-04F6F1CD1B45}" type="datetimeFigureOut">
               <a:rPr kumimoji="1" lang="ja-JP" altLang="en-US" smtClean="0"/>
-              <a:t>2024/5/15</a:t>
+              <a:t>2024/5/16</a:t>
             </a:fld>
             <a:endParaRPr kumimoji="1" lang="ja-JP" altLang="en-US"/>
           </a:p>
@@ -1558,7 +1566,7 @@
           <a:p>
             <a:fld id="{05CEC32E-2D17-B842-A2D3-04F6F1CD1B45}" type="datetimeFigureOut">
               <a:rPr kumimoji="1" lang="ja-JP" altLang="en-US" smtClean="0"/>
-              <a:t>2024/5/15</a:t>
+              <a:t>2024/5/16</a:t>
             </a:fld>
             <a:endParaRPr kumimoji="1" lang="ja-JP" altLang="en-US"/>
           </a:p>
@@ -2034,7 +2042,7 @@
           <a:p>
             <a:fld id="{05CEC32E-2D17-B842-A2D3-04F6F1CD1B45}" type="datetimeFigureOut">
               <a:rPr kumimoji="1" lang="ja-JP" altLang="en-US" smtClean="0"/>
-              <a:t>2024/5/15</a:t>
+              <a:t>2024/5/16</a:t>
             </a:fld>
             <a:endParaRPr kumimoji="1" lang="ja-JP" altLang="en-US"/>
           </a:p>
@@ -2175,7 +2183,7 @@
           <a:p>
             <a:fld id="{05CEC32E-2D17-B842-A2D3-04F6F1CD1B45}" type="datetimeFigureOut">
               <a:rPr kumimoji="1" lang="ja-JP" altLang="en-US" smtClean="0"/>
-              <a:t>2024/5/15</a:t>
+              <a:t>2024/5/16</a:t>
             </a:fld>
             <a:endParaRPr kumimoji="1" lang="ja-JP" altLang="en-US"/>
           </a:p>
@@ -2288,7 +2296,7 @@
           <a:p>
             <a:fld id="{05CEC32E-2D17-B842-A2D3-04F6F1CD1B45}" type="datetimeFigureOut">
               <a:rPr kumimoji="1" lang="ja-JP" altLang="en-US" smtClean="0"/>
-              <a:t>2024/5/15</a:t>
+              <a:t>2024/5/16</a:t>
             </a:fld>
             <a:endParaRPr kumimoji="1" lang="ja-JP" altLang="en-US"/>
           </a:p>
@@ -2631,7 +2639,7 @@
           <a:p>
             <a:fld id="{05CEC32E-2D17-B842-A2D3-04F6F1CD1B45}" type="datetimeFigureOut">
               <a:rPr kumimoji="1" lang="ja-JP" altLang="en-US" smtClean="0"/>
-              <a:t>2024/5/15</a:t>
+              <a:t>2024/5/16</a:t>
             </a:fld>
             <a:endParaRPr kumimoji="1" lang="ja-JP" altLang="en-US"/>
           </a:p>
@@ -2919,7 +2927,7 @@
           <a:p>
             <a:fld id="{05CEC32E-2D17-B842-A2D3-04F6F1CD1B45}" type="datetimeFigureOut">
               <a:rPr kumimoji="1" lang="ja-JP" altLang="en-US" smtClean="0"/>
-              <a:t>2024/5/15</a:t>
+              <a:t>2024/5/16</a:t>
             </a:fld>
             <a:endParaRPr kumimoji="1" lang="ja-JP" altLang="en-US"/>
           </a:p>
@@ -3192,7 +3200,7 @@
           <a:p>
             <a:fld id="{05CEC32E-2D17-B842-A2D3-04F6F1CD1B45}" type="datetimeFigureOut">
               <a:rPr kumimoji="1" lang="ja-JP" altLang="en-US" smtClean="0"/>
-              <a:t>2024/5/15</a:t>
+              <a:t>2024/5/16</a:t>
             </a:fld>
             <a:endParaRPr kumimoji="1" lang="ja-JP" altLang="en-US"/>
           </a:p>
@@ -4028,6 +4036,1803 @@
 </p:sld>
 </file>
 
+<file path=ppt/slides/slide2.xml><?xml version="1.0" encoding="utf-8"?>
+<p:sld xmlns:a="http://schemas.openxmlformats.org/drawingml/2006/main" xmlns:r="http://schemas.openxmlformats.org/officeDocument/2006/relationships" xmlns:p="http://schemas.openxmlformats.org/presentationml/2006/main">
+  <p:cSld>
+    <p:spTree>
+      <p:nvGrpSpPr>
+        <p:cNvPr id="1" name=""/>
+        <p:cNvGrpSpPr/>
+        <p:nvPr/>
+      </p:nvGrpSpPr>
+      <p:grpSpPr>
+        <a:xfrm>
+          <a:off x="0" y="0"/>
+          <a:ext cx="0" cy="0"/>
+          <a:chOff x="0" y="0"/>
+          <a:chExt cx="0" cy="0"/>
+        </a:xfrm>
+      </p:grpSpPr>
+      <p:graphicFrame>
+        <p:nvGraphicFramePr>
+          <p:cNvPr id="4" name="表 3">
+            <a:extLst>
+              <a:ext uri="{FF2B5EF4-FFF2-40B4-BE49-F238E27FC236}">
+                <a16:creationId xmlns:a16="http://schemas.microsoft.com/office/drawing/2014/main" id="{264F031B-3CE5-44F3-81AA-8B0BD7B6C2FF}"/>
+              </a:ext>
+            </a:extLst>
+          </p:cNvPr>
+          <p:cNvGraphicFramePr>
+            <a:graphicFrameLocks noGrp="1"/>
+          </p:cNvGraphicFramePr>
+          <p:nvPr>
+            <p:extLst>
+              <p:ext uri="{D42A27DB-BD31-4B8C-83A1-F6EECF244321}">
+                <p14:modId xmlns:p14="http://schemas.microsoft.com/office/powerpoint/2010/main" val="1322758979"/>
+              </p:ext>
+            </p:extLst>
+          </p:nvPr>
+        </p:nvGraphicFramePr>
+        <p:xfrm>
+          <a:off x="1975943" y="1962807"/>
+          <a:ext cx="7998375" cy="3071649"/>
+        </p:xfrm>
+        <a:graphic>
+          <a:graphicData uri="http://schemas.openxmlformats.org/drawingml/2006/table">
+            <a:tbl>
+              <a:tblPr firstRow="1" bandRow="1">
+                <a:tableStyleId>{5940675A-B579-460E-94D1-54222C63F5DA}</a:tableStyleId>
+              </a:tblPr>
+              <a:tblGrid>
+                <a:gridCol w="1999594">
+                  <a:extLst>
+                    <a:ext uri="{9D8B030D-6E8A-4147-A177-3AD203B41FA5}">
+                      <a16:colId xmlns:a16="http://schemas.microsoft.com/office/drawing/2014/main" val="1363517155"/>
+                    </a:ext>
+                  </a:extLst>
+                </a:gridCol>
+                <a:gridCol w="1761504">
+                  <a:extLst>
+                    <a:ext uri="{9D8B030D-6E8A-4147-A177-3AD203B41FA5}">
+                      <a16:colId xmlns:a16="http://schemas.microsoft.com/office/drawing/2014/main" val="3997038306"/>
+                    </a:ext>
+                  </a:extLst>
+                </a:gridCol>
+                <a:gridCol w="2237683">
+                  <a:extLst>
+                    <a:ext uri="{9D8B030D-6E8A-4147-A177-3AD203B41FA5}">
+                      <a16:colId xmlns:a16="http://schemas.microsoft.com/office/drawing/2014/main" val="481582008"/>
+                    </a:ext>
+                  </a:extLst>
+                </a:gridCol>
+                <a:gridCol w="1999594">
+                  <a:extLst>
+                    <a:ext uri="{9D8B030D-6E8A-4147-A177-3AD203B41FA5}">
+                      <a16:colId xmlns:a16="http://schemas.microsoft.com/office/drawing/2014/main" val="3179733527"/>
+                    </a:ext>
+                  </a:extLst>
+                </a:gridCol>
+              </a:tblGrid>
+              <a:tr h="747399">
+                <a:tc rowSpan="2" gridSpan="2">
+                  <a:txBody>
+                    <a:bodyPr/>
+                    <a:lstStyle/>
+                    <a:p>
+                      <a:pPr algn="ctr"/>
+                      <a:r>
+                        <a:rPr kumimoji="1" lang="ja-JP" altLang="en-US">
+                          <a:latin typeface="Meiryo UI" panose="020B0604030504040204" pitchFamily="34" charset="-128"/>
+                          <a:ea typeface="Meiryo UI" panose="020B0604030504040204" pitchFamily="34" charset="-128"/>
+                        </a:rPr>
+                        <a:t>テストの正確性</a:t>
+                      </a:r>
+                    </a:p>
+                  </a:txBody>
+                  <a:tcPr anchor="ctr"/>
+                </a:tc>
+                <a:tc rowSpan="2" hMerge="1">
+                  <a:txBody>
+                    <a:bodyPr/>
+                    <a:lstStyle/>
+                    <a:p>
+                      <a:endParaRPr kumimoji="1" lang="ja-JP" altLang="en-US"/>
+                    </a:p>
+                  </a:txBody>
+                  <a:tcPr/>
+                </a:tc>
+                <a:tc gridSpan="2">
+                  <a:txBody>
+                    <a:bodyPr/>
+                    <a:lstStyle/>
+                    <a:p>
+                      <a:pPr algn="ctr"/>
+                      <a:r>
+                        <a:rPr kumimoji="1" lang="ja-JP" altLang="en-US">
+                          <a:latin typeface="Meiryo UI" panose="020B0604030504040204" pitchFamily="34" charset="-128"/>
+                          <a:ea typeface="Meiryo UI" panose="020B0604030504040204" pitchFamily="34" charset="-128"/>
+                        </a:rPr>
+                        <a:t>実際の振る舞い</a:t>
+                      </a:r>
+                    </a:p>
+                  </a:txBody>
+                  <a:tcPr anchor="ctr"/>
+                </a:tc>
+                <a:tc hMerge="1">
+                  <a:txBody>
+                    <a:bodyPr/>
+                    <a:lstStyle/>
+                    <a:p>
+                      <a:endParaRPr kumimoji="1" lang="ja-JP" altLang="en-US"/>
+                    </a:p>
+                  </a:txBody>
+                  <a:tcPr/>
+                </a:tc>
+                <a:extLst>
+                  <a:ext uri="{0D108BD9-81ED-4DB2-BD59-A6C34878D82A}">
+                    <a16:rowId xmlns:a16="http://schemas.microsoft.com/office/drawing/2014/main" val="2392356851"/>
+                  </a:ext>
+                </a:extLst>
+              </a:tr>
+              <a:tr h="774750">
+                <a:tc gridSpan="2" vMerge="1">
+                  <a:txBody>
+                    <a:bodyPr/>
+                    <a:lstStyle/>
+                    <a:p>
+                      <a:endParaRPr kumimoji="1" lang="ja-JP" altLang="en-US"/>
+                    </a:p>
+                  </a:txBody>
+                  <a:tcPr/>
+                </a:tc>
+                <a:tc hMerge="1" vMerge="1">
+                  <a:txBody>
+                    <a:bodyPr/>
+                    <a:lstStyle/>
+                    <a:p>
+                      <a:endParaRPr kumimoji="1" lang="ja-JP" altLang="en-US"/>
+                    </a:p>
+                  </a:txBody>
+                  <a:tcPr/>
+                </a:tc>
+                <a:tc>
+                  <a:txBody>
+                    <a:bodyPr/>
+                    <a:lstStyle/>
+                    <a:p>
+                      <a:pPr algn="ctr"/>
+                      <a:r>
+                        <a:rPr kumimoji="1" lang="ja-JP" altLang="en-US">
+                          <a:latin typeface="Meiryo UI" panose="020B0604030504040204" pitchFamily="34" charset="-128"/>
+                          <a:ea typeface="Meiryo UI" panose="020B0604030504040204" pitchFamily="34" charset="-128"/>
+                        </a:rPr>
+                        <a:t>正しい</a:t>
+                      </a:r>
+                    </a:p>
+                  </a:txBody>
+                  <a:tcPr anchor="ctr"/>
+                </a:tc>
+                <a:tc>
+                  <a:txBody>
+                    <a:bodyPr/>
+                    <a:lstStyle/>
+                    <a:p>
+                      <a:pPr algn="ctr"/>
+                      <a:r>
+                        <a:rPr kumimoji="1" lang="ja-JP" altLang="en-US">
+                          <a:latin typeface="Meiryo UI" panose="020B0604030504040204" pitchFamily="34" charset="-128"/>
+                          <a:ea typeface="Meiryo UI" panose="020B0604030504040204" pitchFamily="34" charset="-128"/>
+                        </a:rPr>
+                        <a:t>間違い</a:t>
+                      </a:r>
+                      <a:endParaRPr kumimoji="1" lang="en-US" altLang="ja-JP" dirty="0">
+                        <a:latin typeface="Meiryo UI" panose="020B0604030504040204" pitchFamily="34" charset="-128"/>
+                        <a:ea typeface="Meiryo UI" panose="020B0604030504040204" pitchFamily="34" charset="-128"/>
+                      </a:endParaRPr>
+                    </a:p>
+                  </a:txBody>
+                  <a:tcPr anchor="ctr"/>
+                </a:tc>
+                <a:extLst>
+                  <a:ext uri="{0D108BD9-81ED-4DB2-BD59-A6C34878D82A}">
+                    <a16:rowId xmlns:a16="http://schemas.microsoft.com/office/drawing/2014/main" val="2413917289"/>
+                  </a:ext>
+                </a:extLst>
+              </a:tr>
+              <a:tr h="774750">
+                <a:tc rowSpan="2">
+                  <a:txBody>
+                    <a:bodyPr/>
+                    <a:lstStyle/>
+                    <a:p>
+                      <a:pPr algn="ctr"/>
+                      <a:r>
+                        <a:rPr kumimoji="1" lang="ja-JP" altLang="en-US">
+                          <a:latin typeface="Meiryo UI" panose="020B0604030504040204" pitchFamily="34" charset="-128"/>
+                          <a:ea typeface="Meiryo UI" panose="020B0604030504040204" pitchFamily="34" charset="-128"/>
+                        </a:rPr>
+                        <a:t>テストの結果</a:t>
+                      </a:r>
+                    </a:p>
+                  </a:txBody>
+                  <a:tcPr anchor="ctr"/>
+                </a:tc>
+                <a:tc>
+                  <a:txBody>
+                    <a:bodyPr/>
+                    <a:lstStyle/>
+                    <a:p>
+                      <a:pPr algn="ctr"/>
+                      <a:r>
+                        <a:rPr kumimoji="1" lang="ja-JP" altLang="en-US">
+                          <a:latin typeface="Meiryo UI" panose="020B0604030504040204" pitchFamily="34" charset="-128"/>
+                          <a:ea typeface="Meiryo UI" panose="020B0604030504040204" pitchFamily="34" charset="-128"/>
+                        </a:rPr>
+                        <a:t>成功</a:t>
+                      </a:r>
+                    </a:p>
+                  </a:txBody>
+                  <a:tcPr anchor="ctr"/>
+                </a:tc>
+                <a:tc>
+                  <a:txBody>
+                    <a:bodyPr/>
+                    <a:lstStyle/>
+                    <a:p>
+                      <a:pPr algn="ctr"/>
+                      <a:r>
+                        <a:rPr kumimoji="1" lang="ja-JP" altLang="en-US">
+                          <a:latin typeface="Meiryo UI" panose="020B0604030504040204" pitchFamily="34" charset="-128"/>
+                          <a:ea typeface="Meiryo UI" panose="020B0604030504040204" pitchFamily="34" charset="-128"/>
+                        </a:rPr>
+                        <a:t>真陰性</a:t>
+                      </a:r>
+                      <a:endParaRPr kumimoji="1" lang="en-US" altLang="ja-JP" dirty="0">
+                        <a:latin typeface="Meiryo UI" panose="020B0604030504040204" pitchFamily="34" charset="-128"/>
+                        <a:ea typeface="Meiryo UI" panose="020B0604030504040204" pitchFamily="34" charset="-128"/>
+                      </a:endParaRPr>
+                    </a:p>
+                    <a:p>
+                      <a:pPr algn="ctr"/>
+                      <a:r>
+                        <a:rPr kumimoji="1" lang="ja-JP" altLang="en-US">
+                          <a:latin typeface="Meiryo UI" panose="020B0604030504040204" pitchFamily="34" charset="-128"/>
+                          <a:ea typeface="Meiryo UI" panose="020B0604030504040204" pitchFamily="34" charset="-128"/>
+                        </a:rPr>
+                        <a:t>（正しい推断）</a:t>
+                      </a:r>
+                    </a:p>
+                  </a:txBody>
+                  <a:tcPr anchor="ctr">
+                    <a:solidFill>
+                      <a:schemeClr val="accent4">
+                        <a:lumMod val="20000"/>
+                        <a:lumOff val="80000"/>
+                      </a:schemeClr>
+                    </a:solidFill>
+                  </a:tcPr>
+                </a:tc>
+                <a:tc>
+                  <a:txBody>
+                    <a:bodyPr/>
+                    <a:lstStyle/>
+                    <a:p>
+                      <a:pPr algn="ctr"/>
+                      <a:r>
+                        <a:rPr kumimoji="1" lang="ja-JP" altLang="en-US">
+                          <a:latin typeface="Meiryo UI" panose="020B0604030504040204" pitchFamily="34" charset="-128"/>
+                          <a:ea typeface="Meiryo UI" panose="020B0604030504040204" pitchFamily="34" charset="-128"/>
+                        </a:rPr>
+                        <a:t>偽陰性</a:t>
+                      </a:r>
+                      <a:endParaRPr kumimoji="1" lang="en-US" altLang="ja-JP" dirty="0">
+                        <a:latin typeface="Meiryo UI" panose="020B0604030504040204" pitchFamily="34" charset="-128"/>
+                        <a:ea typeface="Meiryo UI" panose="020B0604030504040204" pitchFamily="34" charset="-128"/>
+                      </a:endParaRPr>
+                    </a:p>
+                    <a:p>
+                      <a:pPr algn="ctr"/>
+                      <a:r>
+                        <a:rPr kumimoji="1" lang="ja-JP" altLang="en-US">
+                          <a:latin typeface="Meiryo UI" panose="020B0604030504040204" pitchFamily="34" charset="-128"/>
+                          <a:ea typeface="Meiryo UI" panose="020B0604030504040204" pitchFamily="34" charset="-128"/>
+                        </a:rPr>
+                        <a:t>（第</a:t>
+                      </a:r>
+                      <a:r>
+                        <a:rPr kumimoji="1" lang="en-US" altLang="ja-JP" dirty="0">
+                          <a:latin typeface="Meiryo UI" panose="020B0604030504040204" pitchFamily="34" charset="-128"/>
+                          <a:ea typeface="Meiryo UI" panose="020B0604030504040204" pitchFamily="34" charset="-128"/>
+                        </a:rPr>
+                        <a:t>2</a:t>
+                      </a:r>
+                      <a:r>
+                        <a:rPr kumimoji="1" lang="ja-JP" altLang="en-US">
+                          <a:latin typeface="Meiryo UI" panose="020B0604030504040204" pitchFamily="34" charset="-128"/>
+                          <a:ea typeface="Meiryo UI" panose="020B0604030504040204" pitchFamily="34" charset="-128"/>
+                        </a:rPr>
+                        <a:t>種過誤）</a:t>
+                      </a:r>
+                    </a:p>
+                  </a:txBody>
+                  <a:tcPr anchor="ctr">
+                    <a:solidFill>
+                      <a:srgbClr val="FF0000"/>
+                    </a:solidFill>
+                  </a:tcPr>
+                </a:tc>
+                <a:extLst>
+                  <a:ext uri="{0D108BD9-81ED-4DB2-BD59-A6C34878D82A}">
+                    <a16:rowId xmlns:a16="http://schemas.microsoft.com/office/drawing/2014/main" val="2191373289"/>
+                  </a:ext>
+                </a:extLst>
+              </a:tr>
+              <a:tr h="774750">
+                <a:tc vMerge="1">
+                  <a:txBody>
+                    <a:bodyPr/>
+                    <a:lstStyle/>
+                    <a:p>
+                      <a:endParaRPr kumimoji="1" lang="ja-JP" altLang="en-US"/>
+                    </a:p>
+                  </a:txBody>
+                  <a:tcPr/>
+                </a:tc>
+                <a:tc>
+                  <a:txBody>
+                    <a:bodyPr/>
+                    <a:lstStyle/>
+                    <a:p>
+                      <a:pPr algn="ctr"/>
+                      <a:r>
+                        <a:rPr kumimoji="1" lang="ja-JP" altLang="en-US">
+                          <a:latin typeface="Meiryo UI" panose="020B0604030504040204" pitchFamily="34" charset="-128"/>
+                          <a:ea typeface="Meiryo UI" panose="020B0604030504040204" pitchFamily="34" charset="-128"/>
+                        </a:rPr>
+                        <a:t>失敗</a:t>
+                      </a:r>
+                    </a:p>
+                  </a:txBody>
+                  <a:tcPr anchor="ctr"/>
+                </a:tc>
+                <a:tc>
+                  <a:txBody>
+                    <a:bodyPr/>
+                    <a:lstStyle/>
+                    <a:p>
+                      <a:pPr algn="ctr"/>
+                      <a:r>
+                        <a:rPr kumimoji="1" lang="ja-JP" altLang="en-US">
+                          <a:latin typeface="Meiryo UI" panose="020B0604030504040204" pitchFamily="34" charset="-128"/>
+                          <a:ea typeface="Meiryo UI" panose="020B0604030504040204" pitchFamily="34" charset="-128"/>
+                        </a:rPr>
+                        <a:t>偽陽性</a:t>
+                      </a:r>
+                      <a:endParaRPr kumimoji="1" lang="en-US" altLang="ja-JP" dirty="0">
+                        <a:latin typeface="Meiryo UI" panose="020B0604030504040204" pitchFamily="34" charset="-128"/>
+                        <a:ea typeface="Meiryo UI" panose="020B0604030504040204" pitchFamily="34" charset="-128"/>
+                      </a:endParaRPr>
+                    </a:p>
+                    <a:p>
+                      <a:pPr algn="ctr"/>
+                      <a:r>
+                        <a:rPr kumimoji="1" lang="ja-JP" altLang="en-US">
+                          <a:latin typeface="Meiryo UI" panose="020B0604030504040204" pitchFamily="34" charset="-128"/>
+                          <a:ea typeface="Meiryo UI" panose="020B0604030504040204" pitchFamily="34" charset="-128"/>
+                        </a:rPr>
+                        <a:t>（第</a:t>
+                      </a:r>
+                      <a:r>
+                        <a:rPr kumimoji="1" lang="en-US" altLang="ja-JP" dirty="0">
+                          <a:latin typeface="Meiryo UI" panose="020B0604030504040204" pitchFamily="34" charset="-128"/>
+                          <a:ea typeface="Meiryo UI" panose="020B0604030504040204" pitchFamily="34" charset="-128"/>
+                        </a:rPr>
+                        <a:t>1</a:t>
+                      </a:r>
+                      <a:r>
+                        <a:rPr kumimoji="1" lang="ja-JP" altLang="en-US">
+                          <a:latin typeface="Meiryo UI" panose="020B0604030504040204" pitchFamily="34" charset="-128"/>
+                          <a:ea typeface="Meiryo UI" panose="020B0604030504040204" pitchFamily="34" charset="-128"/>
+                        </a:rPr>
+                        <a:t>種過誤）</a:t>
+                      </a:r>
+                    </a:p>
+                  </a:txBody>
+                  <a:tcPr anchor="ctr">
+                    <a:solidFill>
+                      <a:srgbClr val="FF0000"/>
+                    </a:solidFill>
+                  </a:tcPr>
+                </a:tc>
+                <a:tc>
+                  <a:txBody>
+                    <a:bodyPr/>
+                    <a:lstStyle/>
+                    <a:p>
+                      <a:pPr algn="ctr"/>
+                      <a:r>
+                        <a:rPr kumimoji="1" lang="ja-JP" altLang="en-US">
+                          <a:latin typeface="Meiryo UI" panose="020B0604030504040204" pitchFamily="34" charset="-128"/>
+                          <a:ea typeface="Meiryo UI" panose="020B0604030504040204" pitchFamily="34" charset="-128"/>
+                        </a:rPr>
+                        <a:t>真陽性</a:t>
+                      </a:r>
+                      <a:endParaRPr kumimoji="1" lang="en-US" altLang="ja-JP" dirty="0">
+                        <a:latin typeface="Meiryo UI" panose="020B0604030504040204" pitchFamily="34" charset="-128"/>
+                        <a:ea typeface="Meiryo UI" panose="020B0604030504040204" pitchFamily="34" charset="-128"/>
+                      </a:endParaRPr>
+                    </a:p>
+                    <a:p>
+                      <a:pPr algn="ctr"/>
+                      <a:r>
+                        <a:rPr kumimoji="1" lang="ja-JP" altLang="en-US">
+                          <a:latin typeface="Meiryo UI" panose="020B0604030504040204" pitchFamily="34" charset="-128"/>
+                          <a:ea typeface="Meiryo UI" panose="020B0604030504040204" pitchFamily="34" charset="-128"/>
+                        </a:rPr>
+                        <a:t>（正しい推断）</a:t>
+                      </a:r>
+                    </a:p>
+                  </a:txBody>
+                  <a:tcPr anchor="ctr">
+                    <a:solidFill>
+                      <a:schemeClr val="accent4">
+                        <a:lumMod val="20000"/>
+                        <a:lumOff val="80000"/>
+                      </a:schemeClr>
+                    </a:solidFill>
+                  </a:tcPr>
+                </a:tc>
+                <a:extLst>
+                  <a:ext uri="{0D108BD9-81ED-4DB2-BD59-A6C34878D82A}">
+                    <a16:rowId xmlns:a16="http://schemas.microsoft.com/office/drawing/2014/main" val="2323472528"/>
+                  </a:ext>
+                </a:extLst>
+              </a:tr>
+            </a:tbl>
+          </a:graphicData>
+        </a:graphic>
+      </p:graphicFrame>
+    </p:spTree>
+    <p:extLst>
+      <p:ext uri="{BB962C8B-B14F-4D97-AF65-F5344CB8AC3E}">
+        <p14:creationId xmlns:p14="http://schemas.microsoft.com/office/powerpoint/2010/main" val="1287289151"/>
+      </p:ext>
+    </p:extLst>
+  </p:cSld>
+  <p:clrMapOvr>
+    <a:masterClrMapping/>
+  </p:clrMapOvr>
+</p:sld>
+</file>
+
+<file path=ppt/slides/slide3.xml><?xml version="1.0" encoding="utf-8"?>
+<p:sld xmlns:a="http://schemas.openxmlformats.org/drawingml/2006/main" xmlns:r="http://schemas.openxmlformats.org/officeDocument/2006/relationships" xmlns:p="http://schemas.openxmlformats.org/presentationml/2006/main">
+  <p:cSld>
+    <p:spTree>
+      <p:nvGrpSpPr>
+        <p:cNvPr id="1" name=""/>
+        <p:cNvGrpSpPr/>
+        <p:nvPr/>
+      </p:nvGrpSpPr>
+      <p:grpSpPr>
+        <a:xfrm>
+          <a:off x="0" y="0"/>
+          <a:ext cx="0" cy="0"/>
+          <a:chOff x="0" y="0"/>
+          <a:chExt cx="0" cy="0"/>
+        </a:xfrm>
+      </p:grpSpPr>
+      <p:sp>
+        <p:nvSpPr>
+          <p:cNvPr id="2" name="三角形 1">
+            <a:extLst>
+              <a:ext uri="{FF2B5EF4-FFF2-40B4-BE49-F238E27FC236}">
+                <a16:creationId xmlns:a16="http://schemas.microsoft.com/office/drawing/2014/main" id="{3E34CE4C-1D5B-6A50-3B94-1A21E445EAAD}"/>
+              </a:ext>
+            </a:extLst>
+          </p:cNvPr>
+          <p:cNvSpPr/>
+          <p:nvPr/>
+        </p:nvSpPr>
+        <p:spPr>
+          <a:xfrm>
+            <a:off x="514565" y="1489842"/>
+            <a:ext cx="4792716" cy="3878318"/>
+          </a:xfrm>
+          <a:prstGeom prst="triangle">
+            <a:avLst/>
+          </a:prstGeom>
+          <a:solidFill>
+            <a:schemeClr val="bg1"/>
+          </a:solidFill>
+          <a:ln>
+            <a:solidFill>
+              <a:schemeClr val="tx1"/>
+            </a:solidFill>
+          </a:ln>
+        </p:spPr>
+        <p:style>
+          <a:lnRef idx="2">
+            <a:schemeClr val="accent1">
+              <a:shade val="15000"/>
+            </a:schemeClr>
+          </a:lnRef>
+          <a:fillRef idx="1">
+            <a:schemeClr val="accent1"/>
+          </a:fillRef>
+          <a:effectRef idx="0">
+            <a:schemeClr val="accent1"/>
+          </a:effectRef>
+          <a:fontRef idx="minor">
+            <a:schemeClr val="lt1"/>
+          </a:fontRef>
+        </p:style>
+        <p:txBody>
+          <a:bodyPr rtlCol="0" anchor="ctr"/>
+          <a:lstStyle/>
+          <a:p>
+            <a:pPr algn="ctr"/>
+            <a:endParaRPr kumimoji="1" lang="ja-JP" altLang="en-US"/>
+          </a:p>
+        </p:txBody>
+      </p:sp>
+      <p:cxnSp>
+        <p:nvCxnSpPr>
+          <p:cNvPr id="4" name="直線コネクタ 3">
+            <a:extLst>
+              <a:ext uri="{FF2B5EF4-FFF2-40B4-BE49-F238E27FC236}">
+                <a16:creationId xmlns:a16="http://schemas.microsoft.com/office/drawing/2014/main" id="{EC30B58D-036E-3254-B677-974798AF64C3}"/>
+              </a:ext>
+            </a:extLst>
+          </p:cNvPr>
+          <p:cNvCxnSpPr>
+            <a:cxnSpLocks/>
+          </p:cNvCxnSpPr>
+          <p:nvPr/>
+        </p:nvCxnSpPr>
+        <p:spPr>
+          <a:xfrm>
+            <a:off x="2091116" y="2774732"/>
+            <a:ext cx="1608082" cy="0"/>
+          </a:xfrm>
+          <a:prstGeom prst="line">
+            <a:avLst/>
+          </a:prstGeom>
+          <a:ln>
+            <a:solidFill>
+              <a:schemeClr val="tx1"/>
+            </a:solidFill>
+          </a:ln>
+        </p:spPr>
+        <p:style>
+          <a:lnRef idx="2">
+            <a:schemeClr val="accent1"/>
+          </a:lnRef>
+          <a:fillRef idx="0">
+            <a:schemeClr val="accent1"/>
+          </a:fillRef>
+          <a:effectRef idx="1">
+            <a:schemeClr val="accent1"/>
+          </a:effectRef>
+          <a:fontRef idx="minor">
+            <a:schemeClr val="tx1"/>
+          </a:fontRef>
+        </p:style>
+      </p:cxnSp>
+      <p:cxnSp>
+        <p:nvCxnSpPr>
+          <p:cNvPr id="5" name="直線コネクタ 4">
+            <a:extLst>
+              <a:ext uri="{FF2B5EF4-FFF2-40B4-BE49-F238E27FC236}">
+                <a16:creationId xmlns:a16="http://schemas.microsoft.com/office/drawing/2014/main" id="{175CFD3A-A970-0712-C127-B48E56103459}"/>
+              </a:ext>
+            </a:extLst>
+          </p:cNvPr>
+          <p:cNvCxnSpPr>
+            <a:cxnSpLocks/>
+          </p:cNvCxnSpPr>
+          <p:nvPr/>
+        </p:nvCxnSpPr>
+        <p:spPr>
+          <a:xfrm>
+            <a:off x="1276562" y="4114801"/>
+            <a:ext cx="3242443" cy="0"/>
+          </a:xfrm>
+          <a:prstGeom prst="line">
+            <a:avLst/>
+          </a:prstGeom>
+          <a:ln>
+            <a:solidFill>
+              <a:schemeClr val="tx1"/>
+            </a:solidFill>
+          </a:ln>
+        </p:spPr>
+        <p:style>
+          <a:lnRef idx="2">
+            <a:schemeClr val="accent1"/>
+          </a:lnRef>
+          <a:fillRef idx="0">
+            <a:schemeClr val="accent1"/>
+          </a:fillRef>
+          <a:effectRef idx="1">
+            <a:schemeClr val="accent1"/>
+          </a:effectRef>
+          <a:fontRef idx="minor">
+            <a:schemeClr val="tx1"/>
+          </a:fontRef>
+        </p:style>
+      </p:cxnSp>
+      <p:sp>
+        <p:nvSpPr>
+          <p:cNvPr id="7" name="テキスト ボックス 6">
+            <a:extLst>
+              <a:ext uri="{FF2B5EF4-FFF2-40B4-BE49-F238E27FC236}">
+                <a16:creationId xmlns:a16="http://schemas.microsoft.com/office/drawing/2014/main" id="{647C55AE-3962-2AEC-1D15-5D30BA6B4CC3}"/>
+              </a:ext>
+            </a:extLst>
+          </p:cNvPr>
+          <p:cNvSpPr txBox="1"/>
+          <p:nvPr/>
+        </p:nvSpPr>
+        <p:spPr>
+          <a:xfrm>
+            <a:off x="1852003" y="4418315"/>
+            <a:ext cx="2091559" cy="646331"/>
+          </a:xfrm>
+          <a:prstGeom prst="rect">
+            <a:avLst/>
+          </a:prstGeom>
+          <a:noFill/>
+        </p:spPr>
+        <p:txBody>
+          <a:bodyPr wrap="square" rtlCol="0">
+            <a:spAutoFit/>
+          </a:bodyPr>
+          <a:lstStyle/>
+          <a:p>
+            <a:pPr algn="ctr"/>
+            <a:r>
+              <a:rPr lang="ja-JP" altLang="en-US">
+                <a:latin typeface="Meiryo UI" panose="020B0604030504040204" pitchFamily="34" charset="-128"/>
+                <a:ea typeface="Meiryo UI" panose="020B0604030504040204" pitchFamily="34" charset="-128"/>
+              </a:rPr>
+              <a:t>単体テスト</a:t>
+            </a:r>
+            <a:endParaRPr lang="en-US" altLang="ja-JP" dirty="0">
+              <a:latin typeface="Meiryo UI" panose="020B0604030504040204" pitchFamily="34" charset="-128"/>
+              <a:ea typeface="Meiryo UI" panose="020B0604030504040204" pitchFamily="34" charset="-128"/>
+            </a:endParaRPr>
+          </a:p>
+          <a:p>
+            <a:pPr algn="ctr"/>
+            <a:r>
+              <a:rPr kumimoji="1" lang="en-US" altLang="ja-JP" dirty="0">
+                <a:latin typeface="Meiryo UI" panose="020B0604030504040204" pitchFamily="34" charset="-128"/>
+                <a:ea typeface="Meiryo UI" panose="020B0604030504040204" pitchFamily="34" charset="-128"/>
+              </a:rPr>
+              <a:t>(unit test)</a:t>
+            </a:r>
+            <a:endParaRPr kumimoji="1" lang="ja-JP" altLang="en-US">
+              <a:latin typeface="Meiryo UI" panose="020B0604030504040204" pitchFamily="34" charset="-128"/>
+              <a:ea typeface="Meiryo UI" panose="020B0604030504040204" pitchFamily="34" charset="-128"/>
+            </a:endParaRPr>
+          </a:p>
+        </p:txBody>
+      </p:sp>
+      <p:sp>
+        <p:nvSpPr>
+          <p:cNvPr id="8" name="テキスト ボックス 7">
+            <a:extLst>
+              <a:ext uri="{FF2B5EF4-FFF2-40B4-BE49-F238E27FC236}">
+                <a16:creationId xmlns:a16="http://schemas.microsoft.com/office/drawing/2014/main" id="{55FC7786-AC9A-3F9A-EE24-40A5B31C8D24}"/>
+              </a:ext>
+            </a:extLst>
+          </p:cNvPr>
+          <p:cNvSpPr txBox="1"/>
+          <p:nvPr/>
+        </p:nvSpPr>
+        <p:spPr>
+          <a:xfrm>
+            <a:off x="2001776" y="3121601"/>
+            <a:ext cx="2091559" cy="646331"/>
+          </a:xfrm>
+          <a:prstGeom prst="rect">
+            <a:avLst/>
+          </a:prstGeom>
+          <a:noFill/>
+        </p:spPr>
+        <p:txBody>
+          <a:bodyPr wrap="square" rtlCol="0">
+            <a:spAutoFit/>
+          </a:bodyPr>
+          <a:lstStyle/>
+          <a:p>
+            <a:pPr algn="ctr"/>
+            <a:r>
+              <a:rPr lang="ja-JP" altLang="en-US">
+                <a:latin typeface="Meiryo UI" panose="020B0604030504040204" pitchFamily="34" charset="-128"/>
+                <a:ea typeface="Meiryo UI" panose="020B0604030504040204" pitchFamily="34" charset="-128"/>
+              </a:rPr>
+              <a:t>統合テスト</a:t>
+            </a:r>
+            <a:endParaRPr lang="en-US" altLang="ja-JP" dirty="0">
+              <a:latin typeface="Meiryo UI" panose="020B0604030504040204" pitchFamily="34" charset="-128"/>
+              <a:ea typeface="Meiryo UI" panose="020B0604030504040204" pitchFamily="34" charset="-128"/>
+            </a:endParaRPr>
+          </a:p>
+          <a:p>
+            <a:pPr algn="ctr"/>
+            <a:r>
+              <a:rPr lang="en-US" altLang="ja-JP" dirty="0">
+                <a:latin typeface="Meiryo UI" panose="020B0604030504040204" pitchFamily="34" charset="-128"/>
+                <a:ea typeface="Meiryo UI" panose="020B0604030504040204" pitchFamily="34" charset="-128"/>
+              </a:rPr>
+              <a:t>(integration</a:t>
+            </a:r>
+            <a:r>
+              <a:rPr kumimoji="1" lang="en-US" altLang="ja-JP" dirty="0">
+                <a:latin typeface="Meiryo UI" panose="020B0604030504040204" pitchFamily="34" charset="-128"/>
+                <a:ea typeface="Meiryo UI" panose="020B0604030504040204" pitchFamily="34" charset="-128"/>
+              </a:rPr>
+              <a:t> test)</a:t>
+            </a:r>
+            <a:endParaRPr kumimoji="1" lang="ja-JP" altLang="en-US">
+              <a:latin typeface="Meiryo UI" panose="020B0604030504040204" pitchFamily="34" charset="-128"/>
+              <a:ea typeface="Meiryo UI" panose="020B0604030504040204" pitchFamily="34" charset="-128"/>
+            </a:endParaRPr>
+          </a:p>
+        </p:txBody>
+      </p:sp>
+      <p:sp>
+        <p:nvSpPr>
+          <p:cNvPr id="9" name="テキスト ボックス 8">
+            <a:extLst>
+              <a:ext uri="{FF2B5EF4-FFF2-40B4-BE49-F238E27FC236}">
+                <a16:creationId xmlns:a16="http://schemas.microsoft.com/office/drawing/2014/main" id="{E29F1B8B-65D4-10BD-5582-5118727D9EF1}"/>
+              </a:ext>
+            </a:extLst>
+          </p:cNvPr>
+          <p:cNvSpPr txBox="1"/>
+          <p:nvPr/>
+        </p:nvSpPr>
+        <p:spPr>
+          <a:xfrm>
+            <a:off x="1865143" y="1964917"/>
+            <a:ext cx="2091559" cy="646331"/>
+          </a:xfrm>
+          <a:prstGeom prst="rect">
+            <a:avLst/>
+          </a:prstGeom>
+          <a:noFill/>
+        </p:spPr>
+        <p:txBody>
+          <a:bodyPr wrap="square" rtlCol="0">
+            <a:spAutoFit/>
+          </a:bodyPr>
+          <a:lstStyle/>
+          <a:p>
+            <a:pPr algn="ctr"/>
+            <a:r>
+              <a:rPr kumimoji="1" lang="en-US" altLang="ja-JP" dirty="0">
+                <a:latin typeface="Meiryo UI" panose="020B0604030504040204" pitchFamily="34" charset="-128"/>
+                <a:ea typeface="Meiryo UI" panose="020B0604030504040204" pitchFamily="34" charset="-128"/>
+              </a:rPr>
+              <a:t>E2E</a:t>
+            </a:r>
+          </a:p>
+          <a:p>
+            <a:pPr algn="ctr"/>
+            <a:r>
+              <a:rPr kumimoji="1" lang="ja-JP" altLang="en-US">
+                <a:latin typeface="Meiryo UI" panose="020B0604030504040204" pitchFamily="34" charset="-128"/>
+                <a:ea typeface="Meiryo UI" panose="020B0604030504040204" pitchFamily="34" charset="-128"/>
+              </a:rPr>
+              <a:t>テスト</a:t>
+            </a:r>
+          </a:p>
+        </p:txBody>
+      </p:sp>
+      <p:sp>
+        <p:nvSpPr>
+          <p:cNvPr id="12" name="右中かっこ 11">
+            <a:extLst>
+              <a:ext uri="{FF2B5EF4-FFF2-40B4-BE49-F238E27FC236}">
+                <a16:creationId xmlns:a16="http://schemas.microsoft.com/office/drawing/2014/main" id="{34B585C5-7557-E397-40D8-25E682D559C6}"/>
+              </a:ext>
+            </a:extLst>
+          </p:cNvPr>
+          <p:cNvSpPr/>
+          <p:nvPr/>
+        </p:nvSpPr>
+        <p:spPr>
+          <a:xfrm rot="5400000">
+            <a:off x="2821583" y="3195706"/>
+            <a:ext cx="178675" cy="4792714"/>
+          </a:xfrm>
+          <a:prstGeom prst="rightBrace">
+            <a:avLst>
+              <a:gd name="adj1" fmla="val 51756"/>
+              <a:gd name="adj2" fmla="val 50000"/>
+            </a:avLst>
+          </a:prstGeom>
+          <a:ln>
+            <a:solidFill>
+              <a:schemeClr val="tx1"/>
+            </a:solidFill>
+          </a:ln>
+        </p:spPr>
+        <p:style>
+          <a:lnRef idx="2">
+            <a:schemeClr val="accent1"/>
+          </a:lnRef>
+          <a:fillRef idx="0">
+            <a:schemeClr val="accent1"/>
+          </a:fillRef>
+          <a:effectRef idx="1">
+            <a:schemeClr val="accent1"/>
+          </a:effectRef>
+          <a:fontRef idx="minor">
+            <a:schemeClr val="tx1"/>
+          </a:fontRef>
+        </p:style>
+        <p:txBody>
+          <a:bodyPr rtlCol="0" anchor="ctr"/>
+          <a:lstStyle/>
+          <a:p>
+            <a:pPr algn="ctr"/>
+            <a:endParaRPr kumimoji="1" lang="ja-JP" altLang="en-US"/>
+          </a:p>
+        </p:txBody>
+      </p:sp>
+      <p:sp>
+        <p:nvSpPr>
+          <p:cNvPr id="13" name="テキスト ボックス 12">
+            <a:extLst>
+              <a:ext uri="{FF2B5EF4-FFF2-40B4-BE49-F238E27FC236}">
+                <a16:creationId xmlns:a16="http://schemas.microsoft.com/office/drawing/2014/main" id="{D3FEF504-FB17-E9F3-B83E-A94D477EAA6F}"/>
+              </a:ext>
+            </a:extLst>
+          </p:cNvPr>
+          <p:cNvSpPr txBox="1"/>
+          <p:nvPr/>
+        </p:nvSpPr>
+        <p:spPr>
+          <a:xfrm>
+            <a:off x="1865143" y="5715028"/>
+            <a:ext cx="2091559" cy="369332"/>
+          </a:xfrm>
+          <a:prstGeom prst="rect">
+            <a:avLst/>
+          </a:prstGeom>
+          <a:noFill/>
+        </p:spPr>
+        <p:txBody>
+          <a:bodyPr wrap="square" rtlCol="0">
+            <a:spAutoFit/>
+          </a:bodyPr>
+          <a:lstStyle/>
+          <a:p>
+            <a:pPr algn="ctr"/>
+            <a:r>
+              <a:rPr kumimoji="1" lang="ja-JP" altLang="en-US">
+                <a:latin typeface="Meiryo UI" panose="020B0604030504040204" pitchFamily="34" charset="-128"/>
+                <a:ea typeface="Meiryo UI" panose="020B0604030504040204" pitchFamily="34" charset="-128"/>
+              </a:rPr>
+              <a:t>テストケースの数</a:t>
+            </a:r>
+          </a:p>
+        </p:txBody>
+      </p:sp>
+      <p:sp>
+        <p:nvSpPr>
+          <p:cNvPr id="15" name="テキスト ボックス 14">
+            <a:extLst>
+              <a:ext uri="{FF2B5EF4-FFF2-40B4-BE49-F238E27FC236}">
+                <a16:creationId xmlns:a16="http://schemas.microsoft.com/office/drawing/2014/main" id="{3D2EF80E-D324-7C39-88B3-710A8AF56453}"/>
+              </a:ext>
+            </a:extLst>
+          </p:cNvPr>
+          <p:cNvSpPr txBox="1"/>
+          <p:nvPr/>
+        </p:nvSpPr>
+        <p:spPr>
+          <a:xfrm>
+            <a:off x="5412878" y="1629542"/>
+            <a:ext cx="2091559" cy="923330"/>
+          </a:xfrm>
+          <a:prstGeom prst="rect">
+            <a:avLst/>
+          </a:prstGeom>
+          <a:noFill/>
+        </p:spPr>
+        <p:txBody>
+          <a:bodyPr wrap="square" rtlCol="0">
+            <a:spAutoFit/>
+          </a:bodyPr>
+          <a:lstStyle/>
+          <a:p>
+            <a:pPr algn="ctr"/>
+            <a:r>
+              <a:rPr lang="ja-JP" altLang="en-US">
+                <a:latin typeface="Meiryo UI" panose="020B0604030504040204" pitchFamily="34" charset="-128"/>
+                <a:ea typeface="Meiryo UI" panose="020B0604030504040204" pitchFamily="34" charset="-128"/>
+              </a:rPr>
+              <a:t>エンドユーザー／</a:t>
+            </a:r>
+            <a:endParaRPr lang="en-US" altLang="ja-JP" dirty="0">
+              <a:latin typeface="Meiryo UI" panose="020B0604030504040204" pitchFamily="34" charset="-128"/>
+              <a:ea typeface="Meiryo UI" panose="020B0604030504040204" pitchFamily="34" charset="-128"/>
+            </a:endParaRPr>
+          </a:p>
+          <a:p>
+            <a:pPr algn="ctr"/>
+            <a:r>
+              <a:rPr lang="ja-JP" altLang="en-US">
+                <a:latin typeface="Meiryo UI" panose="020B0604030504040204" pitchFamily="34" charset="-128"/>
+                <a:ea typeface="Meiryo UI" panose="020B0604030504040204" pitchFamily="34" charset="-128"/>
+              </a:rPr>
+              <a:t>ビジネスエキスパート</a:t>
+            </a:r>
+            <a:endParaRPr lang="en-US" altLang="ja-JP" dirty="0">
+              <a:latin typeface="Meiryo UI" panose="020B0604030504040204" pitchFamily="34" charset="-128"/>
+              <a:ea typeface="Meiryo UI" panose="020B0604030504040204" pitchFamily="34" charset="-128"/>
+            </a:endParaRPr>
+          </a:p>
+          <a:p>
+            <a:pPr algn="ctr"/>
+            <a:r>
+              <a:rPr kumimoji="1" lang="ja-JP" altLang="en-US">
+                <a:latin typeface="Meiryo UI" panose="020B0604030504040204" pitchFamily="34" charset="-128"/>
+                <a:ea typeface="Meiryo UI" panose="020B0604030504040204" pitchFamily="34" charset="-128"/>
+              </a:rPr>
+              <a:t>の関心の高さ</a:t>
+            </a:r>
+          </a:p>
+        </p:txBody>
+      </p:sp>
+      <p:cxnSp>
+        <p:nvCxnSpPr>
+          <p:cNvPr id="17" name="直線矢印コネクタ 16">
+            <a:extLst>
+              <a:ext uri="{FF2B5EF4-FFF2-40B4-BE49-F238E27FC236}">
+                <a16:creationId xmlns:a16="http://schemas.microsoft.com/office/drawing/2014/main" id="{9E1B0CB9-03B5-68CC-9C2F-CC157E9731D8}"/>
+              </a:ext>
+            </a:extLst>
+          </p:cNvPr>
+          <p:cNvCxnSpPr>
+            <a:cxnSpLocks/>
+          </p:cNvCxnSpPr>
+          <p:nvPr/>
+        </p:nvCxnSpPr>
+        <p:spPr>
+          <a:xfrm flipV="1">
+            <a:off x="5412878" y="1489842"/>
+            <a:ext cx="0" cy="3878315"/>
+          </a:xfrm>
+          <a:prstGeom prst="straightConnector1">
+            <a:avLst/>
+          </a:prstGeom>
+          <a:ln>
+            <a:solidFill>
+              <a:schemeClr val="tx1"/>
+            </a:solidFill>
+            <a:tailEnd type="triangle"/>
+          </a:ln>
+        </p:spPr>
+        <p:style>
+          <a:lnRef idx="2">
+            <a:schemeClr val="accent1"/>
+          </a:lnRef>
+          <a:fillRef idx="0">
+            <a:schemeClr val="accent1"/>
+          </a:fillRef>
+          <a:effectRef idx="1">
+            <a:schemeClr val="accent1"/>
+          </a:effectRef>
+          <a:fontRef idx="minor">
+            <a:schemeClr val="tx1"/>
+          </a:fontRef>
+        </p:style>
+      </p:cxnSp>
+    </p:spTree>
+    <p:extLst>
+      <p:ext uri="{BB962C8B-B14F-4D97-AF65-F5344CB8AC3E}">
+        <p14:creationId xmlns:p14="http://schemas.microsoft.com/office/powerpoint/2010/main" val="2412208174"/>
+      </p:ext>
+    </p:extLst>
+  </p:cSld>
+  <p:clrMapOvr>
+    <a:masterClrMapping/>
+  </p:clrMapOvr>
+</p:sld>
+</file>
+
+<file path=ppt/slides/slide4.xml><?xml version="1.0" encoding="utf-8"?>
+<p:sld xmlns:a="http://schemas.openxmlformats.org/drawingml/2006/main" xmlns:r="http://schemas.openxmlformats.org/officeDocument/2006/relationships" xmlns:p="http://schemas.openxmlformats.org/presentationml/2006/main">
+  <p:cSld>
+    <p:spTree>
+      <p:nvGrpSpPr>
+        <p:cNvPr id="1" name=""/>
+        <p:cNvGrpSpPr/>
+        <p:nvPr/>
+      </p:nvGrpSpPr>
+      <p:grpSpPr>
+        <a:xfrm>
+          <a:off x="0" y="0"/>
+          <a:ext cx="0" cy="0"/>
+          <a:chOff x="0" y="0"/>
+          <a:chExt cx="0" cy="0"/>
+        </a:xfrm>
+      </p:grpSpPr>
+      <p:sp>
+        <p:nvSpPr>
+          <p:cNvPr id="6" name="テキスト ボックス 5">
+            <a:extLst>
+              <a:ext uri="{FF2B5EF4-FFF2-40B4-BE49-F238E27FC236}">
+                <a16:creationId xmlns:a16="http://schemas.microsoft.com/office/drawing/2014/main" id="{032F0F8E-673F-FFC6-C610-5F06D4C2B48D}"/>
+              </a:ext>
+            </a:extLst>
+          </p:cNvPr>
+          <p:cNvSpPr txBox="1"/>
+          <p:nvPr/>
+        </p:nvSpPr>
+        <p:spPr>
+          <a:xfrm>
+            <a:off x="2990342" y="657511"/>
+            <a:ext cx="2393310" cy="338554"/>
+          </a:xfrm>
+          <a:prstGeom prst="rect">
+            <a:avLst/>
+          </a:prstGeom>
+          <a:noFill/>
+        </p:spPr>
+        <p:txBody>
+          <a:bodyPr wrap="square" rtlCol="0">
+            <a:spAutoFit/>
+          </a:bodyPr>
+          <a:lstStyle/>
+          <a:p>
+            <a:pPr algn="ctr"/>
+            <a:r>
+              <a:rPr lang="ja-JP" altLang="en-US" sz="1600">
+                <a:latin typeface="Meiryo UI" panose="020B0604030504040204" pitchFamily="34" charset="-128"/>
+                <a:ea typeface="Meiryo UI" panose="020B0604030504040204" pitchFamily="34" charset="-128"/>
+              </a:rPr>
+              <a:t>リファクタリングへの耐性</a:t>
+            </a:r>
+            <a:endParaRPr kumimoji="1" lang="ja-JP" altLang="en-US" sz="1600">
+              <a:latin typeface="Meiryo UI" panose="020B0604030504040204" pitchFamily="34" charset="-128"/>
+              <a:ea typeface="Meiryo UI" panose="020B0604030504040204" pitchFamily="34" charset="-128"/>
+            </a:endParaRPr>
+          </a:p>
+        </p:txBody>
+      </p:sp>
+      <p:sp>
+        <p:nvSpPr>
+          <p:cNvPr id="7" name="円/楕円 6">
+            <a:extLst>
+              <a:ext uri="{FF2B5EF4-FFF2-40B4-BE49-F238E27FC236}">
+                <a16:creationId xmlns:a16="http://schemas.microsoft.com/office/drawing/2014/main" id="{65CFD220-75EA-0E1A-41D8-68B3EA22E6EF}"/>
+              </a:ext>
+            </a:extLst>
+          </p:cNvPr>
+          <p:cNvSpPr>
+            <a:spLocks noChangeAspect="1"/>
+          </p:cNvSpPr>
+          <p:nvPr/>
+        </p:nvSpPr>
+        <p:spPr>
+          <a:xfrm>
+            <a:off x="6096000" y="1007593"/>
+            <a:ext cx="1080000" cy="1080000"/>
+          </a:xfrm>
+          <a:prstGeom prst="ellipse">
+            <a:avLst/>
+          </a:prstGeom>
+          <a:ln/>
+        </p:spPr>
+        <p:style>
+          <a:lnRef idx="2">
+            <a:schemeClr val="dk1"/>
+          </a:lnRef>
+          <a:fillRef idx="1">
+            <a:schemeClr val="lt1"/>
+          </a:fillRef>
+          <a:effectRef idx="0">
+            <a:schemeClr val="dk1"/>
+          </a:effectRef>
+          <a:fontRef idx="minor">
+            <a:schemeClr val="dk1"/>
+          </a:fontRef>
+        </p:style>
+        <p:txBody>
+          <a:bodyPr rtlCol="0" anchor="ctr"/>
+          <a:lstStyle/>
+          <a:p>
+            <a:pPr algn="ctr"/>
+            <a:r>
+              <a:rPr lang="ja-JP" altLang="en-US" sz="1400">
+                <a:latin typeface="Meiryo UI" panose="020B0604030504040204" pitchFamily="34" charset="-128"/>
+                <a:ea typeface="Meiryo UI" panose="020B0604030504040204" pitchFamily="34" charset="-128"/>
+              </a:rPr>
+              <a:t>最大化</a:t>
+            </a:r>
+            <a:endParaRPr kumimoji="1" lang="ja-JP" altLang="en-US" sz="1400">
+              <a:latin typeface="Meiryo UI" panose="020B0604030504040204" pitchFamily="34" charset="-128"/>
+              <a:ea typeface="Meiryo UI" panose="020B0604030504040204" pitchFamily="34" charset="-128"/>
+            </a:endParaRPr>
+          </a:p>
+        </p:txBody>
+      </p:sp>
+      <p:sp>
+        <p:nvSpPr>
+          <p:cNvPr id="8" name="テキスト ボックス 7">
+            <a:extLst>
+              <a:ext uri="{FF2B5EF4-FFF2-40B4-BE49-F238E27FC236}">
+                <a16:creationId xmlns:a16="http://schemas.microsoft.com/office/drawing/2014/main" id="{2434E398-D8CB-2314-D5EA-6A702D2DF652}"/>
+              </a:ext>
+            </a:extLst>
+          </p:cNvPr>
+          <p:cNvSpPr txBox="1"/>
+          <p:nvPr/>
+        </p:nvSpPr>
+        <p:spPr>
+          <a:xfrm>
+            <a:off x="5523770" y="632497"/>
+            <a:ext cx="2393310" cy="338554"/>
+          </a:xfrm>
+          <a:prstGeom prst="rect">
+            <a:avLst/>
+          </a:prstGeom>
+          <a:noFill/>
+        </p:spPr>
+        <p:txBody>
+          <a:bodyPr wrap="square" rtlCol="0">
+            <a:spAutoFit/>
+          </a:bodyPr>
+          <a:lstStyle/>
+          <a:p>
+            <a:pPr algn="ctr"/>
+            <a:r>
+              <a:rPr kumimoji="1" lang="ja-JP" altLang="en-US" sz="1600">
+                <a:latin typeface="Meiryo UI" panose="020B0604030504040204" pitchFamily="34" charset="-128"/>
+                <a:ea typeface="Meiryo UI" panose="020B0604030504040204" pitchFamily="34" charset="-128"/>
+              </a:rPr>
+              <a:t>保守のしやすさ</a:t>
+            </a:r>
+          </a:p>
+        </p:txBody>
+      </p:sp>
+      <p:sp>
+        <p:nvSpPr>
+          <p:cNvPr id="9" name="三角形 8">
+            <a:extLst>
+              <a:ext uri="{FF2B5EF4-FFF2-40B4-BE49-F238E27FC236}">
+                <a16:creationId xmlns:a16="http://schemas.microsoft.com/office/drawing/2014/main" id="{09916E44-E29B-353A-0694-83CBA1FFC1C3}"/>
+              </a:ext>
+            </a:extLst>
+          </p:cNvPr>
+          <p:cNvSpPr/>
+          <p:nvPr/>
+        </p:nvSpPr>
+        <p:spPr>
+          <a:xfrm>
+            <a:off x="2475617" y="1547593"/>
+            <a:ext cx="3461245" cy="2983832"/>
+          </a:xfrm>
+          <a:prstGeom prst="triangle">
+            <a:avLst/>
+          </a:prstGeom>
+          <a:solidFill>
+            <a:schemeClr val="bg1"/>
+          </a:solidFill>
+          <a:ln>
+            <a:solidFill>
+              <a:schemeClr val="tx1"/>
+            </a:solidFill>
+          </a:ln>
+        </p:spPr>
+        <p:style>
+          <a:lnRef idx="2">
+            <a:schemeClr val="accent1">
+              <a:shade val="15000"/>
+            </a:schemeClr>
+          </a:lnRef>
+          <a:fillRef idx="1">
+            <a:schemeClr val="accent1"/>
+          </a:fillRef>
+          <a:effectRef idx="0">
+            <a:schemeClr val="accent1"/>
+          </a:effectRef>
+          <a:fontRef idx="minor">
+            <a:schemeClr val="lt1"/>
+          </a:fontRef>
+        </p:style>
+        <p:txBody>
+          <a:bodyPr rtlCol="0" anchor="ctr"/>
+          <a:lstStyle/>
+          <a:p>
+            <a:pPr algn="ctr"/>
+            <a:endParaRPr kumimoji="1" lang="ja-JP" altLang="en-US"/>
+          </a:p>
+        </p:txBody>
+      </p:sp>
+      <p:sp>
+        <p:nvSpPr>
+          <p:cNvPr id="5" name="円/楕円 4">
+            <a:extLst>
+              <a:ext uri="{FF2B5EF4-FFF2-40B4-BE49-F238E27FC236}">
+                <a16:creationId xmlns:a16="http://schemas.microsoft.com/office/drawing/2014/main" id="{75A09C05-BB44-C7AD-892C-7E7BF72A9770}"/>
+              </a:ext>
+            </a:extLst>
+          </p:cNvPr>
+          <p:cNvSpPr/>
+          <p:nvPr/>
+        </p:nvSpPr>
+        <p:spPr>
+          <a:xfrm>
+            <a:off x="3646997" y="1007593"/>
+            <a:ext cx="1080000" cy="1080000"/>
+          </a:xfrm>
+          <a:prstGeom prst="ellipse">
+            <a:avLst/>
+          </a:prstGeom>
+          <a:ln/>
+        </p:spPr>
+        <p:style>
+          <a:lnRef idx="2">
+            <a:schemeClr val="dk1"/>
+          </a:lnRef>
+          <a:fillRef idx="1">
+            <a:schemeClr val="lt1"/>
+          </a:fillRef>
+          <a:effectRef idx="0">
+            <a:schemeClr val="dk1"/>
+          </a:effectRef>
+          <a:fontRef idx="minor">
+            <a:schemeClr val="dk1"/>
+          </a:fontRef>
+        </p:style>
+        <p:txBody>
+          <a:bodyPr rtlCol="0" anchor="ctr"/>
+          <a:lstStyle/>
+          <a:p>
+            <a:pPr algn="ctr"/>
+            <a:r>
+              <a:rPr lang="ja-JP" altLang="en-US" sz="1400">
+                <a:latin typeface="Meiryo UI" panose="020B0604030504040204" pitchFamily="34" charset="-128"/>
+                <a:ea typeface="Meiryo UI" panose="020B0604030504040204" pitchFamily="34" charset="-128"/>
+              </a:rPr>
+              <a:t>最大化</a:t>
+            </a:r>
+            <a:endParaRPr kumimoji="1" lang="ja-JP" altLang="en-US" sz="1400">
+              <a:latin typeface="Meiryo UI" panose="020B0604030504040204" pitchFamily="34" charset="-128"/>
+              <a:ea typeface="Meiryo UI" panose="020B0604030504040204" pitchFamily="34" charset="-128"/>
+            </a:endParaRPr>
+          </a:p>
+        </p:txBody>
+      </p:sp>
+      <p:sp>
+        <p:nvSpPr>
+          <p:cNvPr id="10" name="円/楕円 9">
+            <a:extLst>
+              <a:ext uri="{FF2B5EF4-FFF2-40B4-BE49-F238E27FC236}">
+                <a16:creationId xmlns:a16="http://schemas.microsoft.com/office/drawing/2014/main" id="{5A63DA28-6F0A-1D71-D58A-7F25825CFF84}"/>
+              </a:ext>
+            </a:extLst>
+          </p:cNvPr>
+          <p:cNvSpPr/>
+          <p:nvPr/>
+        </p:nvSpPr>
+        <p:spPr>
+          <a:xfrm>
+            <a:off x="1935617" y="3991425"/>
+            <a:ext cx="1080000" cy="1080000"/>
+          </a:xfrm>
+          <a:prstGeom prst="ellipse">
+            <a:avLst/>
+          </a:prstGeom>
+          <a:ln/>
+        </p:spPr>
+        <p:style>
+          <a:lnRef idx="2">
+            <a:schemeClr val="dk1"/>
+          </a:lnRef>
+          <a:fillRef idx="1">
+            <a:schemeClr val="lt1"/>
+          </a:fillRef>
+          <a:effectRef idx="0">
+            <a:schemeClr val="dk1"/>
+          </a:effectRef>
+          <a:fontRef idx="minor">
+            <a:schemeClr val="dk1"/>
+          </a:fontRef>
+        </p:style>
+        <p:txBody>
+          <a:bodyPr rtlCol="0" anchor="ctr"/>
+          <a:lstStyle/>
+          <a:p>
+            <a:pPr algn="ctr"/>
+            <a:endParaRPr kumimoji="1" lang="ja-JP" altLang="en-US" sz="1400">
+              <a:latin typeface="Meiryo UI" panose="020B0604030504040204" pitchFamily="34" charset="-128"/>
+              <a:ea typeface="Meiryo UI" panose="020B0604030504040204" pitchFamily="34" charset="-128"/>
+            </a:endParaRPr>
+          </a:p>
+        </p:txBody>
+      </p:sp>
+      <p:sp>
+        <p:nvSpPr>
+          <p:cNvPr id="11" name="円/楕円 10">
+            <a:extLst>
+              <a:ext uri="{FF2B5EF4-FFF2-40B4-BE49-F238E27FC236}">
+                <a16:creationId xmlns:a16="http://schemas.microsoft.com/office/drawing/2014/main" id="{819B3831-8384-51F1-6385-1EE9135EE12A}"/>
+              </a:ext>
+            </a:extLst>
+          </p:cNvPr>
+          <p:cNvSpPr/>
+          <p:nvPr/>
+        </p:nvSpPr>
+        <p:spPr>
+          <a:xfrm>
+            <a:off x="5408927" y="3991425"/>
+            <a:ext cx="1080000" cy="1080000"/>
+          </a:xfrm>
+          <a:prstGeom prst="ellipse">
+            <a:avLst/>
+          </a:prstGeom>
+          <a:ln/>
+        </p:spPr>
+        <p:style>
+          <a:lnRef idx="2">
+            <a:schemeClr val="dk1"/>
+          </a:lnRef>
+          <a:fillRef idx="1">
+            <a:schemeClr val="lt1"/>
+          </a:fillRef>
+          <a:effectRef idx="0">
+            <a:schemeClr val="dk1"/>
+          </a:effectRef>
+          <a:fontRef idx="minor">
+            <a:schemeClr val="dk1"/>
+          </a:fontRef>
+        </p:style>
+        <p:txBody>
+          <a:bodyPr rtlCol="0" anchor="ctr"/>
+          <a:lstStyle/>
+          <a:p>
+            <a:pPr algn="ctr"/>
+            <a:endParaRPr kumimoji="1" lang="ja-JP" altLang="en-US" sz="1400">
+              <a:latin typeface="Meiryo UI" panose="020B0604030504040204" pitchFamily="34" charset="-128"/>
+              <a:ea typeface="Meiryo UI" panose="020B0604030504040204" pitchFamily="34" charset="-128"/>
+            </a:endParaRPr>
+          </a:p>
+        </p:txBody>
+      </p:sp>
+      <p:sp>
+        <p:nvSpPr>
+          <p:cNvPr id="12" name="テキスト ボックス 11">
+            <a:extLst>
+              <a:ext uri="{FF2B5EF4-FFF2-40B4-BE49-F238E27FC236}">
+                <a16:creationId xmlns:a16="http://schemas.microsoft.com/office/drawing/2014/main" id="{759DDCD1-8F66-EB48-39B0-B7B8D41C9312}"/>
+              </a:ext>
+            </a:extLst>
+          </p:cNvPr>
+          <p:cNvSpPr txBox="1"/>
+          <p:nvPr/>
+        </p:nvSpPr>
+        <p:spPr>
+          <a:xfrm>
+            <a:off x="94372" y="3657535"/>
+            <a:ext cx="2393310" cy="338554"/>
+          </a:xfrm>
+          <a:prstGeom prst="rect">
+            <a:avLst/>
+          </a:prstGeom>
+          <a:noFill/>
+        </p:spPr>
+        <p:txBody>
+          <a:bodyPr wrap="square" rtlCol="0">
+            <a:spAutoFit/>
+          </a:bodyPr>
+          <a:lstStyle/>
+          <a:p>
+            <a:pPr algn="r"/>
+            <a:r>
+              <a:rPr kumimoji="1" lang="ja-JP" altLang="en-US" sz="1600">
+                <a:latin typeface="Meiryo UI" panose="020B0604030504040204" pitchFamily="34" charset="-128"/>
+                <a:ea typeface="Meiryo UI" panose="020B0604030504040204" pitchFamily="34" charset="-128"/>
+              </a:rPr>
+              <a:t>対抗に対する保護</a:t>
+            </a:r>
+          </a:p>
+        </p:txBody>
+      </p:sp>
+      <p:sp>
+        <p:nvSpPr>
+          <p:cNvPr id="13" name="テキスト ボックス 12">
+            <a:extLst>
+              <a:ext uri="{FF2B5EF4-FFF2-40B4-BE49-F238E27FC236}">
+                <a16:creationId xmlns:a16="http://schemas.microsoft.com/office/drawing/2014/main" id="{724646E9-F686-FE63-1B07-20F55F404729}"/>
+              </a:ext>
+            </a:extLst>
+          </p:cNvPr>
+          <p:cNvSpPr txBox="1"/>
+          <p:nvPr/>
+        </p:nvSpPr>
+        <p:spPr>
+          <a:xfrm>
+            <a:off x="5936862" y="3641343"/>
+            <a:ext cx="2393310" cy="338554"/>
+          </a:xfrm>
+          <a:prstGeom prst="rect">
+            <a:avLst/>
+          </a:prstGeom>
+          <a:noFill/>
+        </p:spPr>
+        <p:txBody>
+          <a:bodyPr wrap="square" rtlCol="0">
+            <a:spAutoFit/>
+          </a:bodyPr>
+          <a:lstStyle/>
+          <a:p>
+            <a:r>
+              <a:rPr kumimoji="1" lang="ja-JP" altLang="en-US" sz="1600">
+                <a:latin typeface="Meiryo UI" panose="020B0604030504040204" pitchFamily="34" charset="-128"/>
+                <a:ea typeface="Meiryo UI" panose="020B0604030504040204" pitchFamily="34" charset="-128"/>
+              </a:rPr>
+              <a:t>迅速なフィードバック</a:t>
+            </a:r>
+          </a:p>
+        </p:txBody>
+      </p:sp>
+      <p:sp>
+        <p:nvSpPr>
+          <p:cNvPr id="14" name="左右矢印 13">
+            <a:extLst>
+              <a:ext uri="{FF2B5EF4-FFF2-40B4-BE49-F238E27FC236}">
+                <a16:creationId xmlns:a16="http://schemas.microsoft.com/office/drawing/2014/main" id="{E75860A9-3FF3-DCBA-8823-2EFB84A9663E}"/>
+              </a:ext>
+            </a:extLst>
+          </p:cNvPr>
+          <p:cNvSpPr/>
+          <p:nvPr/>
+        </p:nvSpPr>
+        <p:spPr>
+          <a:xfrm>
+            <a:off x="2487682" y="5301907"/>
+            <a:ext cx="3461246" cy="277700"/>
+          </a:xfrm>
+          <a:prstGeom prst="leftRightArrow">
+            <a:avLst>
+              <a:gd name="adj1" fmla="val 36135"/>
+              <a:gd name="adj2" fmla="val 95059"/>
+            </a:avLst>
+          </a:prstGeom>
+          <a:solidFill>
+            <a:schemeClr val="bg1"/>
+          </a:solidFill>
+          <a:ln>
+            <a:solidFill>
+              <a:schemeClr val="tx1"/>
+            </a:solidFill>
+          </a:ln>
+        </p:spPr>
+        <p:style>
+          <a:lnRef idx="2">
+            <a:schemeClr val="accent1">
+              <a:shade val="15000"/>
+            </a:schemeClr>
+          </a:lnRef>
+          <a:fillRef idx="1">
+            <a:schemeClr val="accent1"/>
+          </a:fillRef>
+          <a:effectRef idx="0">
+            <a:schemeClr val="accent1"/>
+          </a:effectRef>
+          <a:fontRef idx="minor">
+            <a:schemeClr val="lt1"/>
+          </a:fontRef>
+        </p:style>
+        <p:txBody>
+          <a:bodyPr rtlCol="0" anchor="ctr"/>
+          <a:lstStyle/>
+          <a:p>
+            <a:pPr algn="ctr"/>
+            <a:endParaRPr kumimoji="1" lang="ja-JP" altLang="en-US"/>
+          </a:p>
+        </p:txBody>
+      </p:sp>
+      <p:sp>
+        <p:nvSpPr>
+          <p:cNvPr id="15" name="正方形/長方形 14">
+            <a:extLst>
+              <a:ext uri="{FF2B5EF4-FFF2-40B4-BE49-F238E27FC236}">
+                <a16:creationId xmlns:a16="http://schemas.microsoft.com/office/drawing/2014/main" id="{6419D11A-3299-DAD1-EF13-C130DC2FBC0C}"/>
+              </a:ext>
+            </a:extLst>
+          </p:cNvPr>
+          <p:cNvSpPr/>
+          <p:nvPr/>
+        </p:nvSpPr>
+        <p:spPr>
+          <a:xfrm>
+            <a:off x="4104021" y="5087823"/>
+            <a:ext cx="228567" cy="720076"/>
+          </a:xfrm>
+          <a:prstGeom prst="rect">
+            <a:avLst/>
+          </a:prstGeom>
+          <a:solidFill>
+            <a:schemeClr val="tx1"/>
+          </a:solidFill>
+        </p:spPr>
+        <p:style>
+          <a:lnRef idx="2">
+            <a:schemeClr val="accent1">
+              <a:shade val="15000"/>
+            </a:schemeClr>
+          </a:lnRef>
+          <a:fillRef idx="1">
+            <a:schemeClr val="accent1"/>
+          </a:fillRef>
+          <a:effectRef idx="0">
+            <a:schemeClr val="accent1"/>
+          </a:effectRef>
+          <a:fontRef idx="minor">
+            <a:schemeClr val="lt1"/>
+          </a:fontRef>
+        </p:style>
+        <p:txBody>
+          <a:bodyPr rtlCol="0" anchor="ctr"/>
+          <a:lstStyle/>
+          <a:p>
+            <a:pPr algn="ctr"/>
+            <a:endParaRPr kumimoji="1" lang="ja-JP" altLang="en-US"/>
+          </a:p>
+        </p:txBody>
+      </p:sp>
+      <p:sp>
+        <p:nvSpPr>
+          <p:cNvPr id="16" name="テキスト ボックス 15">
+            <a:extLst>
+              <a:ext uri="{FF2B5EF4-FFF2-40B4-BE49-F238E27FC236}">
+                <a16:creationId xmlns:a16="http://schemas.microsoft.com/office/drawing/2014/main" id="{60AB3A0E-E402-D94F-D7B5-8CEE293430F1}"/>
+              </a:ext>
+            </a:extLst>
+          </p:cNvPr>
+          <p:cNvSpPr txBox="1"/>
+          <p:nvPr/>
+        </p:nvSpPr>
+        <p:spPr>
+          <a:xfrm>
+            <a:off x="3733193" y="5853715"/>
+            <a:ext cx="946092" cy="307777"/>
+          </a:xfrm>
+          <a:prstGeom prst="rect">
+            <a:avLst/>
+          </a:prstGeom>
+          <a:noFill/>
+        </p:spPr>
+        <p:txBody>
+          <a:bodyPr wrap="none" rtlCol="0">
+            <a:spAutoFit/>
+          </a:bodyPr>
+          <a:lstStyle/>
+          <a:p>
+            <a:pPr algn="ctr"/>
+            <a:r>
+              <a:rPr kumimoji="1" lang="ja-JP" altLang="en-US" sz="1400">
+                <a:latin typeface="Meiryo UI" panose="020B0604030504040204" pitchFamily="34" charset="-128"/>
+                <a:ea typeface="Meiryo UI" panose="020B0604030504040204" pitchFamily="34" charset="-128"/>
+              </a:rPr>
+              <a:t>統合テスト</a:t>
+            </a:r>
+          </a:p>
+        </p:txBody>
+      </p:sp>
+      <p:sp>
+        <p:nvSpPr>
+          <p:cNvPr id="17" name="正方形/長方形 16">
+            <a:extLst>
+              <a:ext uri="{FF2B5EF4-FFF2-40B4-BE49-F238E27FC236}">
+                <a16:creationId xmlns:a16="http://schemas.microsoft.com/office/drawing/2014/main" id="{A5E27A50-A74A-64DF-4EE9-54EE527D4AB8}"/>
+              </a:ext>
+            </a:extLst>
+          </p:cNvPr>
+          <p:cNvSpPr/>
+          <p:nvPr/>
+        </p:nvSpPr>
+        <p:spPr>
+          <a:xfrm>
+            <a:off x="3122244" y="5087823"/>
+            <a:ext cx="228567" cy="720076"/>
+          </a:xfrm>
+          <a:prstGeom prst="rect">
+            <a:avLst/>
+          </a:prstGeom>
+          <a:solidFill>
+            <a:schemeClr val="tx1"/>
+          </a:solidFill>
+        </p:spPr>
+        <p:style>
+          <a:lnRef idx="2">
+            <a:schemeClr val="accent1">
+              <a:shade val="15000"/>
+            </a:schemeClr>
+          </a:lnRef>
+          <a:fillRef idx="1">
+            <a:schemeClr val="accent1"/>
+          </a:fillRef>
+          <a:effectRef idx="0">
+            <a:schemeClr val="accent1"/>
+          </a:effectRef>
+          <a:fontRef idx="minor">
+            <a:schemeClr val="lt1"/>
+          </a:fontRef>
+        </p:style>
+        <p:txBody>
+          <a:bodyPr rtlCol="0" anchor="ctr"/>
+          <a:lstStyle/>
+          <a:p>
+            <a:pPr algn="ctr"/>
+            <a:endParaRPr kumimoji="1" lang="ja-JP" altLang="en-US"/>
+          </a:p>
+        </p:txBody>
+      </p:sp>
+      <p:sp>
+        <p:nvSpPr>
+          <p:cNvPr id="20" name="正方形/長方形 19">
+            <a:extLst>
+              <a:ext uri="{FF2B5EF4-FFF2-40B4-BE49-F238E27FC236}">
+                <a16:creationId xmlns:a16="http://schemas.microsoft.com/office/drawing/2014/main" id="{2D9D0EA0-3A84-0CF7-DAED-27CE8959CEF1}"/>
+              </a:ext>
+            </a:extLst>
+          </p:cNvPr>
+          <p:cNvSpPr/>
+          <p:nvPr/>
+        </p:nvSpPr>
+        <p:spPr>
+          <a:xfrm>
+            <a:off x="5076172" y="5087823"/>
+            <a:ext cx="228567" cy="720076"/>
+          </a:xfrm>
+          <a:prstGeom prst="rect">
+            <a:avLst/>
+          </a:prstGeom>
+          <a:solidFill>
+            <a:schemeClr val="tx1"/>
+          </a:solidFill>
+        </p:spPr>
+        <p:style>
+          <a:lnRef idx="2">
+            <a:schemeClr val="accent1">
+              <a:shade val="15000"/>
+            </a:schemeClr>
+          </a:lnRef>
+          <a:fillRef idx="1">
+            <a:schemeClr val="accent1"/>
+          </a:fillRef>
+          <a:effectRef idx="0">
+            <a:schemeClr val="accent1"/>
+          </a:effectRef>
+          <a:fontRef idx="minor">
+            <a:schemeClr val="lt1"/>
+          </a:fontRef>
+        </p:style>
+        <p:txBody>
+          <a:bodyPr rtlCol="0" anchor="ctr"/>
+          <a:lstStyle/>
+          <a:p>
+            <a:pPr algn="ctr"/>
+            <a:endParaRPr kumimoji="1" lang="ja-JP" altLang="en-US"/>
+          </a:p>
+        </p:txBody>
+      </p:sp>
+      <p:sp>
+        <p:nvSpPr>
+          <p:cNvPr id="21" name="テキスト ボックス 20">
+            <a:extLst>
+              <a:ext uri="{FF2B5EF4-FFF2-40B4-BE49-F238E27FC236}">
+                <a16:creationId xmlns:a16="http://schemas.microsoft.com/office/drawing/2014/main" id="{F24150DB-CC8B-297A-7B72-B46178A66C51}"/>
+              </a:ext>
+            </a:extLst>
+          </p:cNvPr>
+          <p:cNvSpPr txBox="1"/>
+          <p:nvPr/>
+        </p:nvSpPr>
+        <p:spPr>
+          <a:xfrm>
+            <a:off x="2776306" y="5853715"/>
+            <a:ext cx="920445" cy="307777"/>
+          </a:xfrm>
+          <a:prstGeom prst="rect">
+            <a:avLst/>
+          </a:prstGeom>
+          <a:noFill/>
+        </p:spPr>
+        <p:txBody>
+          <a:bodyPr wrap="none" rtlCol="0">
+            <a:spAutoFit/>
+          </a:bodyPr>
+          <a:lstStyle/>
+          <a:p>
+            <a:pPr algn="ctr"/>
+            <a:r>
+              <a:rPr kumimoji="1" lang="en-US" altLang="ja-JP" sz="1400" dirty="0">
+                <a:latin typeface="Meiryo UI" panose="020B0604030504040204" pitchFamily="34" charset="-128"/>
+                <a:ea typeface="Meiryo UI" panose="020B0604030504040204" pitchFamily="34" charset="-128"/>
+              </a:rPr>
+              <a:t>E2E</a:t>
+            </a:r>
+            <a:r>
+              <a:rPr kumimoji="1" lang="ja-JP" altLang="en-US" sz="1400">
+                <a:latin typeface="Meiryo UI" panose="020B0604030504040204" pitchFamily="34" charset="-128"/>
+                <a:ea typeface="Meiryo UI" panose="020B0604030504040204" pitchFamily="34" charset="-128"/>
+              </a:rPr>
+              <a:t>テスト</a:t>
+            </a:r>
+          </a:p>
+        </p:txBody>
+      </p:sp>
+      <p:sp>
+        <p:nvSpPr>
+          <p:cNvPr id="22" name="テキスト ボックス 21">
+            <a:extLst>
+              <a:ext uri="{FF2B5EF4-FFF2-40B4-BE49-F238E27FC236}">
+                <a16:creationId xmlns:a16="http://schemas.microsoft.com/office/drawing/2014/main" id="{6CC668E9-76F4-9DC7-2875-733ADF9D5116}"/>
+              </a:ext>
+            </a:extLst>
+          </p:cNvPr>
+          <p:cNvSpPr txBox="1"/>
+          <p:nvPr/>
+        </p:nvSpPr>
+        <p:spPr>
+          <a:xfrm>
+            <a:off x="4717410" y="5853715"/>
+            <a:ext cx="946092" cy="307777"/>
+          </a:xfrm>
+          <a:prstGeom prst="rect">
+            <a:avLst/>
+          </a:prstGeom>
+          <a:noFill/>
+        </p:spPr>
+        <p:txBody>
+          <a:bodyPr wrap="none" rtlCol="0">
+            <a:spAutoFit/>
+          </a:bodyPr>
+          <a:lstStyle/>
+          <a:p>
+            <a:pPr algn="ctr"/>
+            <a:r>
+              <a:rPr lang="ja-JP" altLang="en-US" sz="1400">
+                <a:latin typeface="Meiryo UI" panose="020B0604030504040204" pitchFamily="34" charset="-128"/>
+                <a:ea typeface="Meiryo UI" panose="020B0604030504040204" pitchFamily="34" charset="-128"/>
+              </a:rPr>
+              <a:t>単体</a:t>
+            </a:r>
+            <a:r>
+              <a:rPr kumimoji="1" lang="ja-JP" altLang="en-US" sz="1400">
+                <a:latin typeface="Meiryo UI" panose="020B0604030504040204" pitchFamily="34" charset="-128"/>
+                <a:ea typeface="Meiryo UI" panose="020B0604030504040204" pitchFamily="34" charset="-128"/>
+              </a:rPr>
+              <a:t>テスト</a:t>
+            </a:r>
+          </a:p>
+        </p:txBody>
+      </p:sp>
+    </p:spTree>
+    <p:extLst>
+      <p:ext uri="{BB962C8B-B14F-4D97-AF65-F5344CB8AC3E}">
+        <p14:creationId xmlns:p14="http://schemas.microsoft.com/office/powerpoint/2010/main" val="3975381654"/>
+      </p:ext>
+    </p:extLst>
+  </p:cSld>
+  <p:clrMapOvr>
+    <a:masterClrMapping/>
+  </p:clrMapOvr>
+</p:sld>
+</file>
+
 <file path=ppt/theme/theme1.xml><?xml version="1.0" encoding="utf-8"?>
 <a:theme xmlns:a="http://schemas.openxmlformats.org/drawingml/2006/main" name="Office テーマ">
   <a:themeElements>

</xml_diff>

<commit_message>
Write the explanation of mock and stub.
</commit_message>
<xml_diff>
--- a/images/images.pptx
+++ b/images/images.pptx
@@ -9,6 +9,7 @@
     <p:sldId id="257" r:id="rId3"/>
     <p:sldId id="258" r:id="rId4"/>
     <p:sldId id="259" r:id="rId5"/>
+    <p:sldId id="260" r:id="rId6"/>
   </p:sldIdLst>
   <p:sldSz cx="12192000" cy="6858000"/>
   <p:notesSz cx="6858000" cy="9144000"/>
@@ -5833,6 +5834,404 @@
 </p:sld>
 </file>
 
+<file path=ppt/slides/slide5.xml><?xml version="1.0" encoding="utf-8"?>
+<p:sld xmlns:a="http://schemas.openxmlformats.org/drawingml/2006/main" xmlns:r="http://schemas.openxmlformats.org/officeDocument/2006/relationships" xmlns:p="http://schemas.openxmlformats.org/presentationml/2006/main">
+  <p:cSld>
+    <p:spTree>
+      <p:nvGrpSpPr>
+        <p:cNvPr id="1" name=""/>
+        <p:cNvGrpSpPr/>
+        <p:nvPr/>
+      </p:nvGrpSpPr>
+      <p:grpSpPr>
+        <a:xfrm>
+          <a:off x="0" y="0"/>
+          <a:ext cx="0" cy="0"/>
+          <a:chOff x="0" y="0"/>
+          <a:chExt cx="0" cy="0"/>
+        </a:xfrm>
+      </p:grpSpPr>
+      <p:sp>
+        <p:nvSpPr>
+          <p:cNvPr id="2" name="テキスト ボックス 1">
+            <a:extLst>
+              <a:ext uri="{FF2B5EF4-FFF2-40B4-BE49-F238E27FC236}">
+                <a16:creationId xmlns:a16="http://schemas.microsoft.com/office/drawing/2014/main" id="{B0511272-0531-DEE7-37A5-7A68A8FA1E58}"/>
+              </a:ext>
+            </a:extLst>
+          </p:cNvPr>
+          <p:cNvSpPr txBox="1"/>
+          <p:nvPr/>
+        </p:nvSpPr>
+        <p:spPr>
+          <a:xfrm>
+            <a:off x="4234942" y="1571910"/>
+            <a:ext cx="1641293" cy="688690"/>
+          </a:xfrm>
+          <a:prstGeom prst="rect">
+            <a:avLst/>
+          </a:prstGeom>
+          <a:solidFill>
+            <a:schemeClr val="bg1">
+              <a:lumMod val="85000"/>
+            </a:schemeClr>
+          </a:solidFill>
+        </p:spPr>
+        <p:style>
+          <a:lnRef idx="2">
+            <a:schemeClr val="dk1"/>
+          </a:lnRef>
+          <a:fillRef idx="1">
+            <a:schemeClr val="lt1"/>
+          </a:fillRef>
+          <a:effectRef idx="0">
+            <a:schemeClr val="dk1"/>
+          </a:effectRef>
+          <a:fontRef idx="minor">
+            <a:schemeClr val="dk1"/>
+          </a:fontRef>
+        </p:style>
+        <p:txBody>
+          <a:bodyPr wrap="square" rtlCol="0" anchor="ctr" anchorCtr="1">
+            <a:noAutofit/>
+          </a:bodyPr>
+          <a:lstStyle/>
+          <a:p>
+            <a:pPr algn="ctr"/>
+            <a:r>
+              <a:rPr lang="en-US" altLang="ja-JP" dirty="0">
+                <a:latin typeface="Meiryo UI" panose="020B0604030504040204" pitchFamily="34" charset="-128"/>
+                <a:ea typeface="Meiryo UI" panose="020B0604030504040204" pitchFamily="34" charset="-128"/>
+              </a:rPr>
+              <a:t>SUT</a:t>
+            </a:r>
+            <a:endParaRPr kumimoji="1" lang="ja-JP" altLang="en-US">
+              <a:latin typeface="Meiryo UI" panose="020B0604030504040204" pitchFamily="34" charset="-128"/>
+              <a:ea typeface="Meiryo UI" panose="020B0604030504040204" pitchFamily="34" charset="-128"/>
+            </a:endParaRPr>
+          </a:p>
+        </p:txBody>
+      </p:sp>
+      <p:sp>
+        <p:nvSpPr>
+          <p:cNvPr id="3" name="テキスト ボックス 2">
+            <a:extLst>
+              <a:ext uri="{FF2B5EF4-FFF2-40B4-BE49-F238E27FC236}">
+                <a16:creationId xmlns:a16="http://schemas.microsoft.com/office/drawing/2014/main" id="{D759B945-5C9E-BEF9-52B4-3270A2045C97}"/>
+              </a:ext>
+            </a:extLst>
+          </p:cNvPr>
+          <p:cNvSpPr txBox="1"/>
+          <p:nvPr/>
+        </p:nvSpPr>
+        <p:spPr>
+          <a:xfrm>
+            <a:off x="640842" y="1571910"/>
+            <a:ext cx="1641293" cy="688690"/>
+          </a:xfrm>
+          <a:prstGeom prst="rect">
+            <a:avLst/>
+          </a:prstGeom>
+        </p:spPr>
+        <p:style>
+          <a:lnRef idx="2">
+            <a:schemeClr val="dk1"/>
+          </a:lnRef>
+          <a:fillRef idx="1">
+            <a:schemeClr val="lt1"/>
+          </a:fillRef>
+          <a:effectRef idx="0">
+            <a:schemeClr val="dk1"/>
+          </a:effectRef>
+          <a:fontRef idx="minor">
+            <a:schemeClr val="dk1"/>
+          </a:fontRef>
+        </p:style>
+        <p:txBody>
+          <a:bodyPr wrap="square" rtlCol="0" anchor="ctr" anchorCtr="1">
+            <a:noAutofit/>
+          </a:bodyPr>
+          <a:lstStyle/>
+          <a:p>
+            <a:pPr algn="ctr"/>
+            <a:r>
+              <a:rPr kumimoji="1" lang="ja-JP" altLang="en-US">
+                <a:latin typeface="Meiryo UI" panose="020B0604030504040204" pitchFamily="34" charset="-128"/>
+                <a:ea typeface="Meiryo UI" panose="020B0604030504040204" pitchFamily="34" charset="-128"/>
+              </a:rPr>
+              <a:t>データベース</a:t>
+            </a:r>
+            <a:endParaRPr kumimoji="1" lang="en-US" altLang="ja-JP" dirty="0">
+              <a:latin typeface="Meiryo UI" panose="020B0604030504040204" pitchFamily="34" charset="-128"/>
+              <a:ea typeface="Meiryo UI" panose="020B0604030504040204" pitchFamily="34" charset="-128"/>
+            </a:endParaRPr>
+          </a:p>
+          <a:p>
+            <a:pPr algn="ctr"/>
+            <a:r>
+              <a:rPr lang="ja-JP" altLang="en-US">
+                <a:latin typeface="Meiryo UI" panose="020B0604030504040204" pitchFamily="34" charset="-128"/>
+                <a:ea typeface="Meiryo UI" panose="020B0604030504040204" pitchFamily="34" charset="-128"/>
+              </a:rPr>
+              <a:t>（スタブ）</a:t>
+            </a:r>
+            <a:endParaRPr kumimoji="1" lang="ja-JP" altLang="en-US">
+              <a:latin typeface="Meiryo UI" panose="020B0604030504040204" pitchFamily="34" charset="-128"/>
+              <a:ea typeface="Meiryo UI" panose="020B0604030504040204" pitchFamily="34" charset="-128"/>
+            </a:endParaRPr>
+          </a:p>
+        </p:txBody>
+      </p:sp>
+      <p:cxnSp>
+        <p:nvCxnSpPr>
+          <p:cNvPr id="5" name="直線矢印コネクタ 4">
+            <a:extLst>
+              <a:ext uri="{FF2B5EF4-FFF2-40B4-BE49-F238E27FC236}">
+                <a16:creationId xmlns:a16="http://schemas.microsoft.com/office/drawing/2014/main" id="{5870D076-D370-3EED-6C02-25005D288165}"/>
+              </a:ext>
+            </a:extLst>
+          </p:cNvPr>
+          <p:cNvCxnSpPr>
+            <a:stCxn id="3" idx="3"/>
+            <a:endCxn id="2" idx="1"/>
+          </p:cNvCxnSpPr>
+          <p:nvPr/>
+        </p:nvCxnSpPr>
+        <p:spPr>
+          <a:xfrm>
+            <a:off x="2282135" y="1916255"/>
+            <a:ext cx="1952807" cy="0"/>
+          </a:xfrm>
+          <a:prstGeom prst="straightConnector1">
+            <a:avLst/>
+          </a:prstGeom>
+          <a:ln>
+            <a:solidFill>
+              <a:schemeClr val="tx1"/>
+            </a:solidFill>
+            <a:tailEnd type="triangle" w="lg" len="lg"/>
+          </a:ln>
+        </p:spPr>
+        <p:style>
+          <a:lnRef idx="2">
+            <a:schemeClr val="accent1"/>
+          </a:lnRef>
+          <a:fillRef idx="0">
+            <a:schemeClr val="accent1"/>
+          </a:fillRef>
+          <a:effectRef idx="1">
+            <a:schemeClr val="accent1"/>
+          </a:effectRef>
+          <a:fontRef idx="minor">
+            <a:schemeClr val="tx1"/>
+          </a:fontRef>
+        </p:style>
+      </p:cxnSp>
+      <p:sp>
+        <p:nvSpPr>
+          <p:cNvPr id="7" name="テキスト ボックス 6">
+            <a:extLst>
+              <a:ext uri="{FF2B5EF4-FFF2-40B4-BE49-F238E27FC236}">
+                <a16:creationId xmlns:a16="http://schemas.microsoft.com/office/drawing/2014/main" id="{5B2B0145-6CC6-8F3E-A886-24AE17F69E12}"/>
+              </a:ext>
+            </a:extLst>
+          </p:cNvPr>
+          <p:cNvSpPr txBox="1"/>
+          <p:nvPr/>
+        </p:nvSpPr>
+        <p:spPr>
+          <a:xfrm>
+            <a:off x="7829042" y="1571910"/>
+            <a:ext cx="1641293" cy="688690"/>
+          </a:xfrm>
+          <a:prstGeom prst="rect">
+            <a:avLst/>
+          </a:prstGeom>
+        </p:spPr>
+        <p:style>
+          <a:lnRef idx="2">
+            <a:schemeClr val="dk1"/>
+          </a:lnRef>
+          <a:fillRef idx="1">
+            <a:schemeClr val="lt1"/>
+          </a:fillRef>
+          <a:effectRef idx="0">
+            <a:schemeClr val="dk1"/>
+          </a:effectRef>
+          <a:fontRef idx="minor">
+            <a:schemeClr val="dk1"/>
+          </a:fontRef>
+        </p:style>
+        <p:txBody>
+          <a:bodyPr wrap="square" rtlCol="0" anchor="ctr" anchorCtr="1">
+            <a:noAutofit/>
+          </a:bodyPr>
+          <a:lstStyle/>
+          <a:p>
+            <a:pPr algn="ctr"/>
+            <a:r>
+              <a:rPr kumimoji="1" lang="ja-JP" altLang="en-US">
+                <a:latin typeface="Meiryo UI" panose="020B0604030504040204" pitchFamily="34" charset="-128"/>
+                <a:ea typeface="Meiryo UI" panose="020B0604030504040204" pitchFamily="34" charset="-128"/>
+              </a:rPr>
+              <a:t>メールサービス</a:t>
+            </a:r>
+            <a:endParaRPr kumimoji="1" lang="en-US" altLang="ja-JP" dirty="0">
+              <a:latin typeface="Meiryo UI" panose="020B0604030504040204" pitchFamily="34" charset="-128"/>
+              <a:ea typeface="Meiryo UI" panose="020B0604030504040204" pitchFamily="34" charset="-128"/>
+            </a:endParaRPr>
+          </a:p>
+          <a:p>
+            <a:pPr algn="ctr"/>
+            <a:r>
+              <a:rPr lang="ja-JP" altLang="en-US">
+                <a:latin typeface="Meiryo UI" panose="020B0604030504040204" pitchFamily="34" charset="-128"/>
+                <a:ea typeface="Meiryo UI" panose="020B0604030504040204" pitchFamily="34" charset="-128"/>
+              </a:rPr>
+              <a:t>（モック）</a:t>
+            </a:r>
+            <a:endParaRPr kumimoji="1" lang="ja-JP" altLang="en-US">
+              <a:latin typeface="Meiryo UI" panose="020B0604030504040204" pitchFamily="34" charset="-128"/>
+              <a:ea typeface="Meiryo UI" panose="020B0604030504040204" pitchFamily="34" charset="-128"/>
+            </a:endParaRPr>
+          </a:p>
+        </p:txBody>
+      </p:sp>
+      <p:cxnSp>
+        <p:nvCxnSpPr>
+          <p:cNvPr id="8" name="直線矢印コネクタ 7">
+            <a:extLst>
+              <a:ext uri="{FF2B5EF4-FFF2-40B4-BE49-F238E27FC236}">
+                <a16:creationId xmlns:a16="http://schemas.microsoft.com/office/drawing/2014/main" id="{5F57049E-CB05-79CB-A5E3-A1FDCF997986}"/>
+              </a:ext>
+            </a:extLst>
+          </p:cNvPr>
+          <p:cNvCxnSpPr>
+            <a:cxnSpLocks/>
+            <a:stCxn id="2" idx="3"/>
+            <a:endCxn id="7" idx="1"/>
+          </p:cNvCxnSpPr>
+          <p:nvPr/>
+        </p:nvCxnSpPr>
+        <p:spPr>
+          <a:xfrm>
+            <a:off x="5876235" y="1916255"/>
+            <a:ext cx="1952807" cy="0"/>
+          </a:xfrm>
+          <a:prstGeom prst="straightConnector1">
+            <a:avLst/>
+          </a:prstGeom>
+          <a:ln>
+            <a:solidFill>
+              <a:schemeClr val="tx1"/>
+            </a:solidFill>
+            <a:tailEnd type="triangle" w="lg" len="lg"/>
+          </a:ln>
+        </p:spPr>
+        <p:style>
+          <a:lnRef idx="2">
+            <a:schemeClr val="accent1"/>
+          </a:lnRef>
+          <a:fillRef idx="0">
+            <a:schemeClr val="accent1"/>
+          </a:fillRef>
+          <a:effectRef idx="1">
+            <a:schemeClr val="accent1"/>
+          </a:effectRef>
+          <a:fontRef idx="minor">
+            <a:schemeClr val="tx1"/>
+          </a:fontRef>
+        </p:style>
+      </p:cxnSp>
+      <p:sp>
+        <p:nvSpPr>
+          <p:cNvPr id="11" name="テキスト ボックス 10">
+            <a:extLst>
+              <a:ext uri="{FF2B5EF4-FFF2-40B4-BE49-F238E27FC236}">
+                <a16:creationId xmlns:a16="http://schemas.microsoft.com/office/drawing/2014/main" id="{B3DDB73B-6AD4-C9CD-9ED6-156DD012F5AF}"/>
+              </a:ext>
+            </a:extLst>
+          </p:cNvPr>
+          <p:cNvSpPr txBox="1"/>
+          <p:nvPr/>
+        </p:nvSpPr>
+        <p:spPr>
+          <a:xfrm>
+            <a:off x="2593649" y="1571910"/>
+            <a:ext cx="1242648" cy="338554"/>
+          </a:xfrm>
+          <a:prstGeom prst="rect">
+            <a:avLst/>
+          </a:prstGeom>
+          <a:noFill/>
+        </p:spPr>
+        <p:txBody>
+          <a:bodyPr wrap="none" rtlCol="0">
+            <a:spAutoFit/>
+          </a:bodyPr>
+          <a:lstStyle/>
+          <a:p>
+            <a:r>
+              <a:rPr kumimoji="1" lang="ja-JP" altLang="en-US" sz="1600">
+                <a:latin typeface="Meiryo UI" panose="020B0604030504040204" pitchFamily="34" charset="-128"/>
+                <a:ea typeface="Meiryo UI" panose="020B0604030504040204" pitchFamily="34" charset="-128"/>
+              </a:rPr>
+              <a:t>データの取得</a:t>
+            </a:r>
+          </a:p>
+        </p:txBody>
+      </p:sp>
+      <p:sp>
+        <p:nvSpPr>
+          <p:cNvPr id="12" name="テキスト ボックス 11">
+            <a:extLst>
+              <a:ext uri="{FF2B5EF4-FFF2-40B4-BE49-F238E27FC236}">
+                <a16:creationId xmlns:a16="http://schemas.microsoft.com/office/drawing/2014/main" id="{FF200E1A-A907-EC08-67E6-728167EFE594}"/>
+              </a:ext>
+            </a:extLst>
+          </p:cNvPr>
+          <p:cNvSpPr txBox="1"/>
+          <p:nvPr/>
+        </p:nvSpPr>
+        <p:spPr>
+          <a:xfrm>
+            <a:off x="6274880" y="1571910"/>
+            <a:ext cx="1242648" cy="338554"/>
+          </a:xfrm>
+          <a:prstGeom prst="rect">
+            <a:avLst/>
+          </a:prstGeom>
+          <a:noFill/>
+        </p:spPr>
+        <p:txBody>
+          <a:bodyPr wrap="none" rtlCol="0">
+            <a:spAutoFit/>
+          </a:bodyPr>
+          <a:lstStyle/>
+          <a:p>
+            <a:r>
+              <a:rPr kumimoji="1" lang="ja-JP" altLang="en-US" sz="1600">
+                <a:latin typeface="Meiryo UI" panose="020B0604030504040204" pitchFamily="34" charset="-128"/>
+                <a:ea typeface="Meiryo UI" panose="020B0604030504040204" pitchFamily="34" charset="-128"/>
+              </a:rPr>
+              <a:t>メールの送信</a:t>
+            </a:r>
+          </a:p>
+        </p:txBody>
+      </p:sp>
+    </p:spTree>
+    <p:extLst>
+      <p:ext uri="{BB962C8B-B14F-4D97-AF65-F5344CB8AC3E}">
+        <p14:creationId xmlns:p14="http://schemas.microsoft.com/office/powerpoint/2010/main" val="3169229051"/>
+      </p:ext>
+    </p:extLst>
+  </p:cSld>
+  <p:clrMapOvr>
+    <a:masterClrMapping/>
+  </p:clrMapOvr>
+</p:sld>
+</file>
+
 <file path=ppt/theme/theme1.xml><?xml version="1.0" encoding="utf-8"?>
 <a:theme xmlns:a="http://schemas.openxmlformats.org/drawingml/2006/main" name="Office テーマ">
   <a:themeElements>

</xml_diff>

<commit_message>
Write the explanation of classification of the production code.
</commit_message>
<xml_diff>
--- a/images/images.pptx
+++ b/images/images.pptx
@@ -10,6 +10,7 @@
     <p:sldId id="258" r:id="rId4"/>
     <p:sldId id="259" r:id="rId5"/>
     <p:sldId id="260" r:id="rId6"/>
+    <p:sldId id="261" r:id="rId7"/>
   </p:sldIdLst>
   <p:sldSz cx="12192000" cy="6858000"/>
   <p:notesSz cx="6858000" cy="9144000"/>
@@ -6232,6 +6233,579 @@
 </p:sld>
 </file>
 
+<file path=ppt/slides/slide6.xml><?xml version="1.0" encoding="utf-8"?>
+<p:sld xmlns:a="http://schemas.openxmlformats.org/drawingml/2006/main" xmlns:r="http://schemas.openxmlformats.org/officeDocument/2006/relationships" xmlns:p="http://schemas.openxmlformats.org/presentationml/2006/main">
+  <p:cSld>
+    <p:spTree>
+      <p:nvGrpSpPr>
+        <p:cNvPr id="1" name=""/>
+        <p:cNvGrpSpPr/>
+        <p:nvPr/>
+      </p:nvGrpSpPr>
+      <p:grpSpPr>
+        <a:xfrm>
+          <a:off x="0" y="0"/>
+          <a:ext cx="0" cy="0"/>
+          <a:chOff x="0" y="0"/>
+          <a:chExt cx="0" cy="0"/>
+        </a:xfrm>
+      </p:grpSpPr>
+      <p:sp>
+        <p:nvSpPr>
+          <p:cNvPr id="10" name="テキスト ボックス 9">
+            <a:extLst>
+              <a:ext uri="{FF2B5EF4-FFF2-40B4-BE49-F238E27FC236}">
+                <a16:creationId xmlns:a16="http://schemas.microsoft.com/office/drawing/2014/main" id="{3C9A5BD7-2610-C3A9-CA42-692A7AD0A3C0}"/>
+              </a:ext>
+            </a:extLst>
+          </p:cNvPr>
+          <p:cNvSpPr txBox="1"/>
+          <p:nvPr/>
+        </p:nvSpPr>
+        <p:spPr>
+          <a:xfrm>
+            <a:off x="2349500" y="1237962"/>
+            <a:ext cx="3517900" cy="1968500"/>
+          </a:xfrm>
+          <a:prstGeom prst="rect">
+            <a:avLst/>
+          </a:prstGeom>
+          <a:noFill/>
+          <a:ln>
+            <a:solidFill>
+              <a:schemeClr val="tx1"/>
+            </a:solidFill>
+          </a:ln>
+        </p:spPr>
+        <p:txBody>
+          <a:bodyPr wrap="square" rtlCol="0" anchor="ctr" anchorCtr="1">
+            <a:noAutofit/>
+          </a:bodyPr>
+          <a:lstStyle/>
+          <a:p>
+            <a:r>
+              <a:rPr kumimoji="1" lang="ja-JP" altLang="en-US">
+                <a:latin typeface="Meiryo UI" panose="020B0604030504040204" pitchFamily="34" charset="-128"/>
+                <a:ea typeface="Meiryo UI" panose="020B0604030504040204" pitchFamily="34" charset="-128"/>
+              </a:rPr>
+              <a:t>ドメインモデル／アルゴリズム</a:t>
+            </a:r>
+          </a:p>
+        </p:txBody>
+      </p:sp>
+      <p:sp>
+        <p:nvSpPr>
+          <p:cNvPr id="11" name="テキスト ボックス 10">
+            <a:extLst>
+              <a:ext uri="{FF2B5EF4-FFF2-40B4-BE49-F238E27FC236}">
+                <a16:creationId xmlns:a16="http://schemas.microsoft.com/office/drawing/2014/main" id="{075EA3CE-2797-B60A-6831-5FF0EA0B10DD}"/>
+              </a:ext>
+            </a:extLst>
+          </p:cNvPr>
+          <p:cNvSpPr txBox="1"/>
+          <p:nvPr/>
+        </p:nvSpPr>
+        <p:spPr>
+          <a:xfrm>
+            <a:off x="5867400" y="1237962"/>
+            <a:ext cx="3517900" cy="1968500"/>
+          </a:xfrm>
+          <a:prstGeom prst="rect">
+            <a:avLst/>
+          </a:prstGeom>
+          <a:noFill/>
+          <a:ln>
+            <a:solidFill>
+              <a:schemeClr val="tx1"/>
+            </a:solidFill>
+          </a:ln>
+        </p:spPr>
+        <p:txBody>
+          <a:bodyPr wrap="square" rtlCol="0" anchor="ctr" anchorCtr="1">
+            <a:noAutofit/>
+          </a:bodyPr>
+          <a:lstStyle/>
+          <a:p>
+            <a:r>
+              <a:rPr lang="ja-JP" altLang="en-US">
+                <a:latin typeface="Meiryo UI" panose="020B0604030504040204" pitchFamily="34" charset="-128"/>
+                <a:ea typeface="Meiryo UI" panose="020B0604030504040204" pitchFamily="34" charset="-128"/>
+              </a:rPr>
+              <a:t>過度に複雑なコード</a:t>
+            </a:r>
+            <a:endParaRPr kumimoji="1" lang="ja-JP" altLang="en-US">
+              <a:latin typeface="Meiryo UI" panose="020B0604030504040204" pitchFamily="34" charset="-128"/>
+              <a:ea typeface="Meiryo UI" panose="020B0604030504040204" pitchFamily="34" charset="-128"/>
+            </a:endParaRPr>
+          </a:p>
+        </p:txBody>
+      </p:sp>
+      <p:sp>
+        <p:nvSpPr>
+          <p:cNvPr id="12" name="テキスト ボックス 11">
+            <a:extLst>
+              <a:ext uri="{FF2B5EF4-FFF2-40B4-BE49-F238E27FC236}">
+                <a16:creationId xmlns:a16="http://schemas.microsoft.com/office/drawing/2014/main" id="{C8855C96-5EA3-0C4E-31CA-F1080C093ABA}"/>
+              </a:ext>
+            </a:extLst>
+          </p:cNvPr>
+          <p:cNvSpPr txBox="1"/>
+          <p:nvPr/>
+        </p:nvSpPr>
+        <p:spPr>
+          <a:xfrm>
+            <a:off x="2349500" y="3206462"/>
+            <a:ext cx="3517900" cy="1968500"/>
+          </a:xfrm>
+          <a:prstGeom prst="rect">
+            <a:avLst/>
+          </a:prstGeom>
+          <a:noFill/>
+          <a:ln>
+            <a:solidFill>
+              <a:schemeClr val="tx1"/>
+            </a:solidFill>
+          </a:ln>
+        </p:spPr>
+        <p:txBody>
+          <a:bodyPr wrap="square" rtlCol="0" anchor="ctr" anchorCtr="1">
+            <a:noAutofit/>
+          </a:bodyPr>
+          <a:lstStyle/>
+          <a:p>
+            <a:r>
+              <a:rPr kumimoji="1" lang="ja-JP" altLang="en-US">
+                <a:latin typeface="Meiryo UI" panose="020B0604030504040204" pitchFamily="34" charset="-128"/>
+                <a:ea typeface="Meiryo UI" panose="020B0604030504040204" pitchFamily="34" charset="-128"/>
+              </a:rPr>
+              <a:t>取るに足らないコード</a:t>
+            </a:r>
+          </a:p>
+        </p:txBody>
+      </p:sp>
+      <p:sp>
+        <p:nvSpPr>
+          <p:cNvPr id="13" name="テキスト ボックス 12">
+            <a:extLst>
+              <a:ext uri="{FF2B5EF4-FFF2-40B4-BE49-F238E27FC236}">
+                <a16:creationId xmlns:a16="http://schemas.microsoft.com/office/drawing/2014/main" id="{07C08407-0C34-1B15-135F-B106BAF2AFAD}"/>
+              </a:ext>
+            </a:extLst>
+          </p:cNvPr>
+          <p:cNvSpPr txBox="1"/>
+          <p:nvPr/>
+        </p:nvSpPr>
+        <p:spPr>
+          <a:xfrm>
+            <a:off x="5867400" y="3206462"/>
+            <a:ext cx="3517900" cy="1968500"/>
+          </a:xfrm>
+          <a:prstGeom prst="rect">
+            <a:avLst/>
+          </a:prstGeom>
+          <a:noFill/>
+          <a:ln>
+            <a:solidFill>
+              <a:schemeClr val="tx1"/>
+            </a:solidFill>
+          </a:ln>
+        </p:spPr>
+        <p:txBody>
+          <a:bodyPr wrap="square" rtlCol="0" anchor="ctr" anchorCtr="1">
+            <a:noAutofit/>
+          </a:bodyPr>
+          <a:lstStyle/>
+          <a:p>
+            <a:r>
+              <a:rPr lang="ja-JP" altLang="en-US">
+                <a:latin typeface="Meiryo UI" panose="020B0604030504040204" pitchFamily="34" charset="-128"/>
+                <a:ea typeface="Meiryo UI" panose="020B0604030504040204" pitchFamily="34" charset="-128"/>
+              </a:rPr>
+              <a:t>コントローラー</a:t>
+            </a:r>
+            <a:endParaRPr kumimoji="1" lang="ja-JP" altLang="en-US">
+              <a:latin typeface="Meiryo UI" panose="020B0604030504040204" pitchFamily="34" charset="-128"/>
+              <a:ea typeface="Meiryo UI" panose="020B0604030504040204" pitchFamily="34" charset="-128"/>
+            </a:endParaRPr>
+          </a:p>
+        </p:txBody>
+      </p:sp>
+      <p:sp>
+        <p:nvSpPr>
+          <p:cNvPr id="14" name="下矢印 13">
+            <a:extLst>
+              <a:ext uri="{FF2B5EF4-FFF2-40B4-BE49-F238E27FC236}">
+                <a16:creationId xmlns:a16="http://schemas.microsoft.com/office/drawing/2014/main" id="{80CFC0A4-8012-F445-75E5-7D2C762EFCDA}"/>
+              </a:ext>
+            </a:extLst>
+          </p:cNvPr>
+          <p:cNvSpPr/>
+          <p:nvPr/>
+        </p:nvSpPr>
+        <p:spPr>
+          <a:xfrm rot="10800000">
+            <a:off x="2133600" y="691862"/>
+            <a:ext cx="444500" cy="4483100"/>
+          </a:xfrm>
+          <a:prstGeom prst="downArrow">
+            <a:avLst>
+              <a:gd name="adj1" fmla="val 33333"/>
+              <a:gd name="adj2" fmla="val 88889"/>
+            </a:avLst>
+          </a:prstGeom>
+          <a:solidFill>
+            <a:schemeClr val="tx1"/>
+          </a:solidFill>
+          <a:ln>
+            <a:solidFill>
+              <a:schemeClr val="tx1"/>
+            </a:solidFill>
+          </a:ln>
+        </p:spPr>
+        <p:style>
+          <a:lnRef idx="2">
+            <a:schemeClr val="accent1">
+              <a:shade val="15000"/>
+            </a:schemeClr>
+          </a:lnRef>
+          <a:fillRef idx="1">
+            <a:schemeClr val="accent1"/>
+          </a:fillRef>
+          <a:effectRef idx="0">
+            <a:schemeClr val="accent1"/>
+          </a:effectRef>
+          <a:fontRef idx="minor">
+            <a:schemeClr val="lt1"/>
+          </a:fontRef>
+        </p:style>
+        <p:txBody>
+          <a:bodyPr rtlCol="0" anchor="ctr"/>
+          <a:lstStyle/>
+          <a:p>
+            <a:pPr algn="ctr"/>
+            <a:endParaRPr kumimoji="1" lang="ja-JP" altLang="en-US"/>
+          </a:p>
+        </p:txBody>
+      </p:sp>
+      <p:sp>
+        <p:nvSpPr>
+          <p:cNvPr id="15" name="下矢印 14">
+            <a:extLst>
+              <a:ext uri="{FF2B5EF4-FFF2-40B4-BE49-F238E27FC236}">
+                <a16:creationId xmlns:a16="http://schemas.microsoft.com/office/drawing/2014/main" id="{FD2B3512-AC68-556B-18EC-8C6DAAAC2AC2}"/>
+              </a:ext>
+            </a:extLst>
+          </p:cNvPr>
+          <p:cNvSpPr/>
+          <p:nvPr/>
+        </p:nvSpPr>
+        <p:spPr>
+          <a:xfrm rot="16200000">
+            <a:off x="5956300" y="1345912"/>
+            <a:ext cx="444500" cy="7658100"/>
+          </a:xfrm>
+          <a:prstGeom prst="downArrow">
+            <a:avLst>
+              <a:gd name="adj1" fmla="val 33333"/>
+              <a:gd name="adj2" fmla="val 88889"/>
+            </a:avLst>
+          </a:prstGeom>
+          <a:solidFill>
+            <a:schemeClr val="tx1"/>
+          </a:solidFill>
+          <a:ln>
+            <a:solidFill>
+              <a:schemeClr val="tx1"/>
+            </a:solidFill>
+          </a:ln>
+        </p:spPr>
+        <p:style>
+          <a:lnRef idx="2">
+            <a:schemeClr val="accent1">
+              <a:shade val="15000"/>
+            </a:schemeClr>
+          </a:lnRef>
+          <a:fillRef idx="1">
+            <a:schemeClr val="accent1"/>
+          </a:fillRef>
+          <a:effectRef idx="0">
+            <a:schemeClr val="accent1"/>
+          </a:effectRef>
+          <a:fontRef idx="minor">
+            <a:schemeClr val="lt1"/>
+          </a:fontRef>
+        </p:style>
+        <p:txBody>
+          <a:bodyPr rtlCol="0" anchor="ctr"/>
+          <a:lstStyle/>
+          <a:p>
+            <a:pPr algn="ctr"/>
+            <a:endParaRPr kumimoji="1" lang="ja-JP" altLang="en-US"/>
+          </a:p>
+        </p:txBody>
+      </p:sp>
+      <p:sp>
+        <p:nvSpPr>
+          <p:cNvPr id="16" name="テキスト ボックス 15">
+            <a:extLst>
+              <a:ext uri="{FF2B5EF4-FFF2-40B4-BE49-F238E27FC236}">
+                <a16:creationId xmlns:a16="http://schemas.microsoft.com/office/drawing/2014/main" id="{7453D4DB-663F-2393-A556-63B0BF68A812}"/>
+              </a:ext>
+            </a:extLst>
+          </p:cNvPr>
+          <p:cNvSpPr txBox="1"/>
+          <p:nvPr/>
+        </p:nvSpPr>
+        <p:spPr>
+          <a:xfrm>
+            <a:off x="220922" y="2914075"/>
+            <a:ext cx="2047355" cy="584775"/>
+          </a:xfrm>
+          <a:prstGeom prst="rect">
+            <a:avLst/>
+          </a:prstGeom>
+          <a:noFill/>
+        </p:spPr>
+        <p:txBody>
+          <a:bodyPr wrap="none" rtlCol="0">
+            <a:spAutoFit/>
+          </a:bodyPr>
+          <a:lstStyle/>
+          <a:p>
+            <a:r>
+              <a:rPr lang="ja-JP" altLang="en-US" sz="1600">
+                <a:latin typeface="Meiryo UI" panose="020B0604030504040204" pitchFamily="34" charset="-128"/>
+                <a:ea typeface="Meiryo UI" panose="020B0604030504040204" pitchFamily="34" charset="-128"/>
+              </a:rPr>
+              <a:t>コードの複雑さ／</a:t>
+            </a:r>
+            <a:endParaRPr lang="en-US" altLang="ja-JP" sz="1600" dirty="0">
+              <a:latin typeface="Meiryo UI" panose="020B0604030504040204" pitchFamily="34" charset="-128"/>
+              <a:ea typeface="Meiryo UI" panose="020B0604030504040204" pitchFamily="34" charset="-128"/>
+            </a:endParaRPr>
+          </a:p>
+          <a:p>
+            <a:r>
+              <a:rPr lang="ja-JP" altLang="en-US" sz="1600">
+                <a:latin typeface="Meiryo UI" panose="020B0604030504040204" pitchFamily="34" charset="-128"/>
+                <a:ea typeface="Meiryo UI" panose="020B0604030504040204" pitchFamily="34" charset="-128"/>
+              </a:rPr>
+              <a:t>ドメインにおける重要性</a:t>
+            </a:r>
+            <a:endParaRPr kumimoji="1" lang="ja-JP" altLang="en-US" sz="1600">
+              <a:latin typeface="Meiryo UI" panose="020B0604030504040204" pitchFamily="34" charset="-128"/>
+              <a:ea typeface="Meiryo UI" panose="020B0604030504040204" pitchFamily="34" charset="-128"/>
+            </a:endParaRPr>
+          </a:p>
+        </p:txBody>
+      </p:sp>
+      <p:sp>
+        <p:nvSpPr>
+          <p:cNvPr id="17" name="テキスト ボックス 16">
+            <a:extLst>
+              <a:ext uri="{FF2B5EF4-FFF2-40B4-BE49-F238E27FC236}">
+                <a16:creationId xmlns:a16="http://schemas.microsoft.com/office/drawing/2014/main" id="{55899447-9277-ACEC-D4C9-7BC68E66B180}"/>
+              </a:ext>
+            </a:extLst>
+          </p:cNvPr>
+          <p:cNvSpPr txBox="1"/>
+          <p:nvPr/>
+        </p:nvSpPr>
+        <p:spPr>
+          <a:xfrm>
+            <a:off x="4832501" y="5353050"/>
+            <a:ext cx="2069797" cy="338554"/>
+          </a:xfrm>
+          <a:prstGeom prst="rect">
+            <a:avLst/>
+          </a:prstGeom>
+          <a:noFill/>
+        </p:spPr>
+        <p:txBody>
+          <a:bodyPr wrap="none" rtlCol="0">
+            <a:spAutoFit/>
+          </a:bodyPr>
+          <a:lstStyle/>
+          <a:p>
+            <a:r>
+              <a:rPr lang="ja-JP" altLang="en-US" sz="1600">
+                <a:latin typeface="Meiryo UI" panose="020B0604030504040204" pitchFamily="34" charset="-128"/>
+                <a:ea typeface="Meiryo UI" panose="020B0604030504040204" pitchFamily="34" charset="-128"/>
+              </a:rPr>
+              <a:t>協力者オブジェクトの数</a:t>
+            </a:r>
+            <a:endParaRPr lang="en-US" altLang="ja-JP" sz="1600" dirty="0">
+              <a:latin typeface="Meiryo UI" panose="020B0604030504040204" pitchFamily="34" charset="-128"/>
+              <a:ea typeface="Meiryo UI" panose="020B0604030504040204" pitchFamily="34" charset="-128"/>
+            </a:endParaRPr>
+          </a:p>
+        </p:txBody>
+      </p:sp>
+      <p:sp>
+        <p:nvSpPr>
+          <p:cNvPr id="18" name="左矢印 17">
+            <a:extLst>
+              <a:ext uri="{FF2B5EF4-FFF2-40B4-BE49-F238E27FC236}">
+                <a16:creationId xmlns:a16="http://schemas.microsoft.com/office/drawing/2014/main" id="{4A65C5E3-0DA7-61B3-8EDE-99715ECF961F}"/>
+              </a:ext>
+            </a:extLst>
+          </p:cNvPr>
+          <p:cNvSpPr/>
+          <p:nvPr/>
+        </p:nvSpPr>
+        <p:spPr>
+          <a:xfrm>
+            <a:off x="5396172" y="1796762"/>
+            <a:ext cx="1104901" cy="850900"/>
+          </a:xfrm>
+          <a:prstGeom prst="leftArrow">
+            <a:avLst>
+              <a:gd name="adj1" fmla="val 50000"/>
+              <a:gd name="adj2" fmla="val 61940"/>
+            </a:avLst>
+          </a:prstGeom>
+          <a:solidFill>
+            <a:schemeClr val="accent4">
+              <a:lumMod val="20000"/>
+              <a:lumOff val="80000"/>
+            </a:schemeClr>
+          </a:solidFill>
+        </p:spPr>
+        <p:style>
+          <a:lnRef idx="2">
+            <a:schemeClr val="accent1">
+              <a:shade val="15000"/>
+            </a:schemeClr>
+          </a:lnRef>
+          <a:fillRef idx="1">
+            <a:schemeClr val="accent1"/>
+          </a:fillRef>
+          <a:effectRef idx="0">
+            <a:schemeClr val="accent1"/>
+          </a:effectRef>
+          <a:fontRef idx="minor">
+            <a:schemeClr val="lt1"/>
+          </a:fontRef>
+        </p:style>
+        <p:txBody>
+          <a:bodyPr rtlCol="0" anchor="ctr"/>
+          <a:lstStyle/>
+          <a:p>
+            <a:pPr algn="ctr"/>
+            <a:endParaRPr kumimoji="1" lang="ja-JP" altLang="en-US"/>
+          </a:p>
+        </p:txBody>
+      </p:sp>
+      <p:sp>
+        <p:nvSpPr>
+          <p:cNvPr id="19" name="左矢印 18">
+            <a:extLst>
+              <a:ext uri="{FF2B5EF4-FFF2-40B4-BE49-F238E27FC236}">
+                <a16:creationId xmlns:a16="http://schemas.microsoft.com/office/drawing/2014/main" id="{BE86D41D-1529-8FF7-C8AD-D39D55AA674C}"/>
+              </a:ext>
+            </a:extLst>
+          </p:cNvPr>
+          <p:cNvSpPr/>
+          <p:nvPr/>
+        </p:nvSpPr>
+        <p:spPr>
+          <a:xfrm rot="16200000">
+            <a:off x="6932873" y="2851720"/>
+            <a:ext cx="1104901" cy="850900"/>
+          </a:xfrm>
+          <a:prstGeom prst="leftArrow">
+            <a:avLst>
+              <a:gd name="adj1" fmla="val 50000"/>
+              <a:gd name="adj2" fmla="val 61940"/>
+            </a:avLst>
+          </a:prstGeom>
+          <a:solidFill>
+            <a:schemeClr val="accent4">
+              <a:lumMod val="20000"/>
+              <a:lumOff val="80000"/>
+            </a:schemeClr>
+          </a:solidFill>
+        </p:spPr>
+        <p:style>
+          <a:lnRef idx="2">
+            <a:schemeClr val="accent1">
+              <a:shade val="15000"/>
+            </a:schemeClr>
+          </a:lnRef>
+          <a:fillRef idx="1">
+            <a:schemeClr val="accent1"/>
+          </a:fillRef>
+          <a:effectRef idx="0">
+            <a:schemeClr val="accent1"/>
+          </a:effectRef>
+          <a:fontRef idx="minor">
+            <a:schemeClr val="lt1"/>
+          </a:fontRef>
+        </p:style>
+        <p:txBody>
+          <a:bodyPr rtlCol="0" anchor="ctr"/>
+          <a:lstStyle/>
+          <a:p>
+            <a:pPr algn="ctr"/>
+            <a:endParaRPr kumimoji="1" lang="ja-JP" altLang="en-US"/>
+          </a:p>
+        </p:txBody>
+      </p:sp>
+      <p:sp>
+        <p:nvSpPr>
+          <p:cNvPr id="21" name="テキスト ボックス 20">
+            <a:extLst>
+              <a:ext uri="{FF2B5EF4-FFF2-40B4-BE49-F238E27FC236}">
+                <a16:creationId xmlns:a16="http://schemas.microsoft.com/office/drawing/2014/main" id="{370350E1-B0A5-DFFF-7873-6AECFA2A82FC}"/>
+              </a:ext>
+            </a:extLst>
+          </p:cNvPr>
+          <p:cNvSpPr txBox="1"/>
+          <p:nvPr/>
+        </p:nvSpPr>
+        <p:spPr>
+          <a:xfrm>
+            <a:off x="5867400" y="134094"/>
+            <a:ext cx="3517900" cy="1077218"/>
+          </a:xfrm>
+          <a:prstGeom prst="rect">
+            <a:avLst/>
+          </a:prstGeom>
+          <a:noFill/>
+        </p:spPr>
+        <p:txBody>
+          <a:bodyPr wrap="square" rtlCol="0">
+            <a:spAutoFit/>
+          </a:bodyPr>
+          <a:lstStyle/>
+          <a:p>
+            <a:r>
+              <a:rPr lang="ja-JP" altLang="en-US" sz="1600">
+                <a:latin typeface="Meiryo UI" panose="020B0604030504040204" pitchFamily="34" charset="-128"/>
+                <a:ea typeface="Meiryo UI" panose="020B0604030504040204" pitchFamily="34" charset="-128"/>
+              </a:rPr>
+              <a:t>過度に複雑なコードは、リファクタリングにより、ドメインモデル／アルゴリズムとコントローラーに分割して、テストを簡単に実装できるようにする必要があります。</a:t>
+            </a:r>
+            <a:endParaRPr lang="en-US" altLang="ja-JP" sz="1600" dirty="0">
+              <a:latin typeface="Meiryo UI" panose="020B0604030504040204" pitchFamily="34" charset="-128"/>
+              <a:ea typeface="Meiryo UI" panose="020B0604030504040204" pitchFamily="34" charset="-128"/>
+            </a:endParaRPr>
+          </a:p>
+        </p:txBody>
+      </p:sp>
+    </p:spTree>
+    <p:extLst>
+      <p:ext uri="{BB962C8B-B14F-4D97-AF65-F5344CB8AC3E}">
+        <p14:creationId xmlns:p14="http://schemas.microsoft.com/office/powerpoint/2010/main" val="4174168829"/>
+      </p:ext>
+    </p:extLst>
+  </p:cSld>
+  <p:clrMapOvr>
+    <a:masterClrMapping/>
+  </p:clrMapOvr>
+</p:sld>
+</file>
+
 <file path=ppt/theme/theme1.xml><?xml version="1.0" encoding="utf-8"?>
 <a:theme xmlns:a="http://schemas.openxmlformats.org/drawingml/2006/main" name="Office テーマ">
   <a:themeElements>

</xml_diff>

<commit_message>
Write the first version of the user management system.
</commit_message>
<xml_diff>
--- a/images/images.pptx
+++ b/images/images.pptx
@@ -11,6 +11,7 @@
     <p:sldId id="259" r:id="rId5"/>
     <p:sldId id="260" r:id="rId6"/>
     <p:sldId id="261" r:id="rId7"/>
+    <p:sldId id="262" r:id="rId8"/>
   </p:sldIdLst>
   <p:sldSz cx="12192000" cy="6858000"/>
   <p:notesSz cx="6858000" cy="9144000"/>
@@ -264,7 +265,7 @@
           <a:p>
             <a:fld id="{05CEC32E-2D17-B842-A2D3-04F6F1CD1B45}" type="datetimeFigureOut">
               <a:rPr kumimoji="1" lang="ja-JP" altLang="en-US" smtClean="0"/>
-              <a:t>2024/5/16</a:t>
+              <a:t>2024/5/20</a:t>
             </a:fld>
             <a:endParaRPr kumimoji="1" lang="ja-JP" altLang="en-US"/>
           </a:p>
@@ -494,7 +495,7 @@
           <a:p>
             <a:fld id="{05CEC32E-2D17-B842-A2D3-04F6F1CD1B45}" type="datetimeFigureOut">
               <a:rPr kumimoji="1" lang="ja-JP" altLang="en-US" smtClean="0"/>
-              <a:t>2024/5/16</a:t>
+              <a:t>2024/5/20</a:t>
             </a:fld>
             <a:endParaRPr kumimoji="1" lang="ja-JP" altLang="en-US"/>
           </a:p>
@@ -734,7 +735,7 @@
           <a:p>
             <a:fld id="{05CEC32E-2D17-B842-A2D3-04F6F1CD1B45}" type="datetimeFigureOut">
               <a:rPr kumimoji="1" lang="ja-JP" altLang="en-US" smtClean="0"/>
-              <a:t>2024/5/16</a:t>
+              <a:t>2024/5/20</a:t>
             </a:fld>
             <a:endParaRPr kumimoji="1" lang="ja-JP" altLang="en-US"/>
           </a:p>
@@ -964,7 +965,7 @@
           <a:p>
             <a:fld id="{05CEC32E-2D17-B842-A2D3-04F6F1CD1B45}" type="datetimeFigureOut">
               <a:rPr kumimoji="1" lang="ja-JP" altLang="en-US" smtClean="0"/>
-              <a:t>2024/5/16</a:t>
+              <a:t>2024/5/20</a:t>
             </a:fld>
             <a:endParaRPr kumimoji="1" lang="ja-JP" altLang="en-US"/>
           </a:p>
@@ -1239,7 +1240,7 @@
           <a:p>
             <a:fld id="{05CEC32E-2D17-B842-A2D3-04F6F1CD1B45}" type="datetimeFigureOut">
               <a:rPr kumimoji="1" lang="ja-JP" altLang="en-US" smtClean="0"/>
-              <a:t>2024/5/16</a:t>
+              <a:t>2024/5/20</a:t>
             </a:fld>
             <a:endParaRPr kumimoji="1" lang="ja-JP" altLang="en-US"/>
           </a:p>
@@ -1568,7 +1569,7 @@
           <a:p>
             <a:fld id="{05CEC32E-2D17-B842-A2D3-04F6F1CD1B45}" type="datetimeFigureOut">
               <a:rPr kumimoji="1" lang="ja-JP" altLang="en-US" smtClean="0"/>
-              <a:t>2024/5/16</a:t>
+              <a:t>2024/5/20</a:t>
             </a:fld>
             <a:endParaRPr kumimoji="1" lang="ja-JP" altLang="en-US"/>
           </a:p>
@@ -2044,7 +2045,7 @@
           <a:p>
             <a:fld id="{05CEC32E-2D17-B842-A2D3-04F6F1CD1B45}" type="datetimeFigureOut">
               <a:rPr kumimoji="1" lang="ja-JP" altLang="en-US" smtClean="0"/>
-              <a:t>2024/5/16</a:t>
+              <a:t>2024/5/20</a:t>
             </a:fld>
             <a:endParaRPr kumimoji="1" lang="ja-JP" altLang="en-US"/>
           </a:p>
@@ -2185,7 +2186,7 @@
           <a:p>
             <a:fld id="{05CEC32E-2D17-B842-A2D3-04F6F1CD1B45}" type="datetimeFigureOut">
               <a:rPr kumimoji="1" lang="ja-JP" altLang="en-US" smtClean="0"/>
-              <a:t>2024/5/16</a:t>
+              <a:t>2024/5/20</a:t>
             </a:fld>
             <a:endParaRPr kumimoji="1" lang="ja-JP" altLang="en-US"/>
           </a:p>
@@ -2298,7 +2299,7 @@
           <a:p>
             <a:fld id="{05CEC32E-2D17-B842-A2D3-04F6F1CD1B45}" type="datetimeFigureOut">
               <a:rPr kumimoji="1" lang="ja-JP" altLang="en-US" smtClean="0"/>
-              <a:t>2024/5/16</a:t>
+              <a:t>2024/5/20</a:t>
             </a:fld>
             <a:endParaRPr kumimoji="1" lang="ja-JP" altLang="en-US"/>
           </a:p>
@@ -2641,7 +2642,7 @@
           <a:p>
             <a:fld id="{05CEC32E-2D17-B842-A2D3-04F6F1CD1B45}" type="datetimeFigureOut">
               <a:rPr kumimoji="1" lang="ja-JP" altLang="en-US" smtClean="0"/>
-              <a:t>2024/5/16</a:t>
+              <a:t>2024/5/20</a:t>
             </a:fld>
             <a:endParaRPr kumimoji="1" lang="ja-JP" altLang="en-US"/>
           </a:p>
@@ -2929,7 +2930,7 @@
           <a:p>
             <a:fld id="{05CEC32E-2D17-B842-A2D3-04F6F1CD1B45}" type="datetimeFigureOut">
               <a:rPr kumimoji="1" lang="ja-JP" altLang="en-US" smtClean="0"/>
-              <a:t>2024/5/16</a:t>
+              <a:t>2024/5/20</a:t>
             </a:fld>
             <a:endParaRPr kumimoji="1" lang="ja-JP" altLang="en-US"/>
           </a:p>
@@ -3202,7 +3203,7 @@
           <a:p>
             <a:fld id="{05CEC32E-2D17-B842-A2D3-04F6F1CD1B45}" type="datetimeFigureOut">
               <a:rPr kumimoji="1" lang="ja-JP" altLang="en-US" smtClean="0"/>
-              <a:t>2024/5/16</a:t>
+              <a:t>2024/5/20</a:t>
             </a:fld>
             <a:endParaRPr kumimoji="1" lang="ja-JP" altLang="en-US"/>
           </a:p>
@@ -6806,6 +6807,410 @@
 </p:sld>
 </file>
 
+<file path=ppt/slides/slide7.xml><?xml version="1.0" encoding="utf-8"?>
+<p:sld xmlns:a="http://schemas.openxmlformats.org/drawingml/2006/main" xmlns:r="http://schemas.openxmlformats.org/officeDocument/2006/relationships" xmlns:p="http://schemas.openxmlformats.org/presentationml/2006/main">
+  <p:cSld>
+    <p:spTree>
+      <p:nvGrpSpPr>
+        <p:cNvPr id="1" name=""/>
+        <p:cNvGrpSpPr/>
+        <p:nvPr/>
+      </p:nvGrpSpPr>
+      <p:grpSpPr>
+        <a:xfrm>
+          <a:off x="0" y="0"/>
+          <a:ext cx="0" cy="0"/>
+          <a:chOff x="0" y="0"/>
+          <a:chExt cx="0" cy="0"/>
+        </a:xfrm>
+      </p:grpSpPr>
+      <p:sp>
+        <p:nvSpPr>
+          <p:cNvPr id="2" name="テキスト ボックス 1">
+            <a:extLst>
+              <a:ext uri="{FF2B5EF4-FFF2-40B4-BE49-F238E27FC236}">
+                <a16:creationId xmlns:a16="http://schemas.microsoft.com/office/drawing/2014/main" id="{1D531C8D-5746-AB62-8D77-F1D29AB08AEF}"/>
+              </a:ext>
+            </a:extLst>
+          </p:cNvPr>
+          <p:cNvSpPr txBox="1"/>
+          <p:nvPr/>
+        </p:nvSpPr>
+        <p:spPr>
+          <a:xfrm>
+            <a:off x="1746161" y="1581958"/>
+            <a:ext cx="2343518" cy="688690"/>
+          </a:xfrm>
+          <a:prstGeom prst="rect">
+            <a:avLst/>
+          </a:prstGeom>
+        </p:spPr>
+        <p:style>
+          <a:lnRef idx="2">
+            <a:schemeClr val="dk1"/>
+          </a:lnRef>
+          <a:fillRef idx="1">
+            <a:schemeClr val="lt1"/>
+          </a:fillRef>
+          <a:effectRef idx="0">
+            <a:schemeClr val="dk1"/>
+          </a:effectRef>
+          <a:fontRef idx="minor">
+            <a:schemeClr val="dk1"/>
+          </a:fontRef>
+        </p:style>
+        <p:txBody>
+          <a:bodyPr wrap="square" rtlCol="0" anchor="ctr" anchorCtr="1">
+            <a:noAutofit/>
+          </a:bodyPr>
+          <a:lstStyle/>
+          <a:p>
+            <a:pPr algn="ctr"/>
+            <a:r>
+              <a:rPr lang="ja-JP" altLang="en-US">
+                <a:latin typeface="Meiryo UI" panose="020B0604030504040204" pitchFamily="34" charset="-128"/>
+                <a:ea typeface="Meiryo UI" panose="020B0604030504040204" pitchFamily="34" charset="-128"/>
+              </a:rPr>
+              <a:t>質素なオブジェクト</a:t>
+            </a:r>
+            <a:endParaRPr kumimoji="1" lang="en-US" altLang="ja-JP" dirty="0">
+              <a:latin typeface="Meiryo UI" panose="020B0604030504040204" pitchFamily="34" charset="-128"/>
+              <a:ea typeface="Meiryo UI" panose="020B0604030504040204" pitchFamily="34" charset="-128"/>
+            </a:endParaRPr>
+          </a:p>
+        </p:txBody>
+      </p:sp>
+      <p:sp>
+        <p:nvSpPr>
+          <p:cNvPr id="3" name="テキスト ボックス 2">
+            <a:extLst>
+              <a:ext uri="{FF2B5EF4-FFF2-40B4-BE49-F238E27FC236}">
+                <a16:creationId xmlns:a16="http://schemas.microsoft.com/office/drawing/2014/main" id="{03910B72-6C72-FED2-FA12-FFA42FF5FBDD}"/>
+              </a:ext>
+            </a:extLst>
+          </p:cNvPr>
+          <p:cNvSpPr txBox="1"/>
+          <p:nvPr/>
+        </p:nvSpPr>
+        <p:spPr>
+          <a:xfrm>
+            <a:off x="5224566" y="1581958"/>
+            <a:ext cx="2343518" cy="688690"/>
+          </a:xfrm>
+          <a:prstGeom prst="rect">
+            <a:avLst/>
+          </a:prstGeom>
+        </p:spPr>
+        <p:style>
+          <a:lnRef idx="2">
+            <a:schemeClr val="dk1"/>
+          </a:lnRef>
+          <a:fillRef idx="1">
+            <a:schemeClr val="lt1"/>
+          </a:fillRef>
+          <a:effectRef idx="0">
+            <a:schemeClr val="dk1"/>
+          </a:effectRef>
+          <a:fontRef idx="minor">
+            <a:schemeClr val="dk1"/>
+          </a:fontRef>
+        </p:style>
+        <p:txBody>
+          <a:bodyPr wrap="square" rtlCol="0" anchor="ctr" anchorCtr="1">
+            <a:noAutofit/>
+          </a:bodyPr>
+          <a:lstStyle/>
+          <a:p>
+            <a:pPr algn="ctr"/>
+            <a:r>
+              <a:rPr kumimoji="1" lang="ja-JP" altLang="en-US">
+                <a:latin typeface="Meiryo UI" panose="020B0604030504040204" pitchFamily="34" charset="-128"/>
+                <a:ea typeface="Meiryo UI" panose="020B0604030504040204" pitchFamily="34" charset="-128"/>
+              </a:rPr>
+              <a:t>テストすることが</a:t>
+            </a:r>
+            <a:endParaRPr kumimoji="1" lang="en-US" altLang="ja-JP" dirty="0">
+              <a:latin typeface="Meiryo UI" panose="020B0604030504040204" pitchFamily="34" charset="-128"/>
+              <a:ea typeface="Meiryo UI" panose="020B0604030504040204" pitchFamily="34" charset="-128"/>
+            </a:endParaRPr>
+          </a:p>
+          <a:p>
+            <a:pPr algn="ctr"/>
+            <a:r>
+              <a:rPr kumimoji="1" lang="ja-JP" altLang="en-US">
+                <a:latin typeface="Meiryo UI" panose="020B0604030504040204" pitchFamily="34" charset="-128"/>
+                <a:ea typeface="Meiryo UI" panose="020B0604030504040204" pitchFamily="34" charset="-128"/>
+              </a:rPr>
+              <a:t>難しい依存</a:t>
+            </a:r>
+            <a:endParaRPr kumimoji="1" lang="en-US" altLang="ja-JP" dirty="0">
+              <a:latin typeface="Meiryo UI" panose="020B0604030504040204" pitchFamily="34" charset="-128"/>
+              <a:ea typeface="Meiryo UI" panose="020B0604030504040204" pitchFamily="34" charset="-128"/>
+            </a:endParaRPr>
+          </a:p>
+        </p:txBody>
+      </p:sp>
+      <p:sp>
+        <p:nvSpPr>
+          <p:cNvPr id="4" name="テキスト ボックス 3">
+            <a:extLst>
+              <a:ext uri="{FF2B5EF4-FFF2-40B4-BE49-F238E27FC236}">
+                <a16:creationId xmlns:a16="http://schemas.microsoft.com/office/drawing/2014/main" id="{9E7773A5-1585-182D-4BBE-0E198A63A49B}"/>
+              </a:ext>
+            </a:extLst>
+          </p:cNvPr>
+          <p:cNvSpPr txBox="1"/>
+          <p:nvPr/>
+        </p:nvSpPr>
+        <p:spPr>
+          <a:xfrm>
+            <a:off x="5224566" y="2668854"/>
+            <a:ext cx="2343518" cy="688690"/>
+          </a:xfrm>
+          <a:prstGeom prst="rect">
+            <a:avLst/>
+          </a:prstGeom>
+        </p:spPr>
+        <p:style>
+          <a:lnRef idx="2">
+            <a:schemeClr val="dk1"/>
+          </a:lnRef>
+          <a:fillRef idx="1">
+            <a:schemeClr val="lt1"/>
+          </a:fillRef>
+          <a:effectRef idx="0">
+            <a:schemeClr val="dk1"/>
+          </a:effectRef>
+          <a:fontRef idx="minor">
+            <a:schemeClr val="dk1"/>
+          </a:fontRef>
+        </p:style>
+        <p:txBody>
+          <a:bodyPr wrap="square" rtlCol="0" anchor="ctr" anchorCtr="1">
+            <a:noAutofit/>
+          </a:bodyPr>
+          <a:lstStyle/>
+          <a:p>
+            <a:pPr algn="ctr"/>
+            <a:r>
+              <a:rPr lang="ja-JP" altLang="en-US">
+                <a:latin typeface="Meiryo UI" panose="020B0604030504040204" pitchFamily="34" charset="-128"/>
+                <a:ea typeface="Meiryo UI" panose="020B0604030504040204" pitchFamily="34" charset="-128"/>
+              </a:rPr>
+              <a:t>ロジック</a:t>
+            </a:r>
+            <a:endParaRPr kumimoji="1" lang="en-US" altLang="ja-JP" dirty="0">
+              <a:latin typeface="Meiryo UI" panose="020B0604030504040204" pitchFamily="34" charset="-128"/>
+              <a:ea typeface="Meiryo UI" panose="020B0604030504040204" pitchFamily="34" charset="-128"/>
+            </a:endParaRPr>
+          </a:p>
+        </p:txBody>
+      </p:sp>
+      <p:sp>
+        <p:nvSpPr>
+          <p:cNvPr id="5" name="テキスト ボックス 4">
+            <a:extLst>
+              <a:ext uri="{FF2B5EF4-FFF2-40B4-BE49-F238E27FC236}">
+                <a16:creationId xmlns:a16="http://schemas.microsoft.com/office/drawing/2014/main" id="{CCCA364D-7E88-FB81-5180-D24E25171BC7}"/>
+              </a:ext>
+            </a:extLst>
+          </p:cNvPr>
+          <p:cNvSpPr txBox="1"/>
+          <p:nvPr/>
+        </p:nvSpPr>
+        <p:spPr>
+          <a:xfrm>
+            <a:off x="1746161" y="2668854"/>
+            <a:ext cx="2343518" cy="688690"/>
+          </a:xfrm>
+          <a:prstGeom prst="rect">
+            <a:avLst/>
+          </a:prstGeom>
+        </p:spPr>
+        <p:style>
+          <a:lnRef idx="2">
+            <a:schemeClr val="dk1"/>
+          </a:lnRef>
+          <a:fillRef idx="1">
+            <a:schemeClr val="lt1"/>
+          </a:fillRef>
+          <a:effectRef idx="0">
+            <a:schemeClr val="dk1"/>
+          </a:effectRef>
+          <a:fontRef idx="minor">
+            <a:schemeClr val="dk1"/>
+          </a:fontRef>
+        </p:style>
+        <p:txBody>
+          <a:bodyPr wrap="square" rtlCol="0" anchor="ctr" anchorCtr="1">
+            <a:noAutofit/>
+          </a:bodyPr>
+          <a:lstStyle/>
+          <a:p>
+            <a:pPr algn="ctr"/>
+            <a:r>
+              <a:rPr lang="ja-JP" altLang="en-US">
+                <a:latin typeface="Meiryo UI" panose="020B0604030504040204" pitchFamily="34" charset="-128"/>
+                <a:ea typeface="Meiryo UI" panose="020B0604030504040204" pitchFamily="34" charset="-128"/>
+              </a:rPr>
+              <a:t>テストケース</a:t>
+            </a:r>
+            <a:endParaRPr kumimoji="1" lang="en-US" altLang="ja-JP" dirty="0">
+              <a:latin typeface="Meiryo UI" panose="020B0604030504040204" pitchFamily="34" charset="-128"/>
+              <a:ea typeface="Meiryo UI" panose="020B0604030504040204" pitchFamily="34" charset="-128"/>
+            </a:endParaRPr>
+          </a:p>
+        </p:txBody>
+      </p:sp>
+      <p:cxnSp>
+        <p:nvCxnSpPr>
+          <p:cNvPr id="7" name="直線矢印コネクタ 6">
+            <a:extLst>
+              <a:ext uri="{FF2B5EF4-FFF2-40B4-BE49-F238E27FC236}">
+                <a16:creationId xmlns:a16="http://schemas.microsoft.com/office/drawing/2014/main" id="{7D2AC590-C3FB-649B-74C5-4A53B2FA0969}"/>
+              </a:ext>
+            </a:extLst>
+          </p:cNvPr>
+          <p:cNvCxnSpPr>
+            <a:stCxn id="5" idx="3"/>
+            <a:endCxn id="4" idx="1"/>
+          </p:cNvCxnSpPr>
+          <p:nvPr/>
+        </p:nvCxnSpPr>
+        <p:spPr>
+          <a:xfrm>
+            <a:off x="4089679" y="3013199"/>
+            <a:ext cx="1134887" cy="0"/>
+          </a:xfrm>
+          <a:prstGeom prst="straightConnector1">
+            <a:avLst/>
+          </a:prstGeom>
+          <a:ln>
+            <a:solidFill>
+              <a:schemeClr val="tx1"/>
+            </a:solidFill>
+            <a:tailEnd type="triangle" w="lg" len="lg"/>
+          </a:ln>
+        </p:spPr>
+        <p:style>
+          <a:lnRef idx="2">
+            <a:schemeClr val="accent1"/>
+          </a:lnRef>
+          <a:fillRef idx="0">
+            <a:schemeClr val="accent1"/>
+          </a:fillRef>
+          <a:effectRef idx="1">
+            <a:schemeClr val="accent1"/>
+          </a:effectRef>
+          <a:fontRef idx="minor">
+            <a:schemeClr val="tx1"/>
+          </a:fontRef>
+        </p:style>
+      </p:cxnSp>
+      <p:cxnSp>
+        <p:nvCxnSpPr>
+          <p:cNvPr id="8" name="直線矢印コネクタ 7">
+            <a:extLst>
+              <a:ext uri="{FF2B5EF4-FFF2-40B4-BE49-F238E27FC236}">
+                <a16:creationId xmlns:a16="http://schemas.microsoft.com/office/drawing/2014/main" id="{84D4569D-7642-8047-6656-95F72C3CCE88}"/>
+              </a:ext>
+            </a:extLst>
+          </p:cNvPr>
+          <p:cNvCxnSpPr>
+            <a:cxnSpLocks/>
+            <a:stCxn id="2" idx="3"/>
+          </p:cNvCxnSpPr>
+          <p:nvPr/>
+        </p:nvCxnSpPr>
+        <p:spPr>
+          <a:xfrm>
+            <a:off x="4089679" y="1926303"/>
+            <a:ext cx="1134887" cy="742551"/>
+          </a:xfrm>
+          <a:prstGeom prst="straightConnector1">
+            <a:avLst/>
+          </a:prstGeom>
+          <a:ln>
+            <a:solidFill>
+              <a:schemeClr val="tx1"/>
+            </a:solidFill>
+            <a:tailEnd type="triangle" w="lg" len="lg"/>
+          </a:ln>
+        </p:spPr>
+        <p:style>
+          <a:lnRef idx="2">
+            <a:schemeClr val="accent1"/>
+          </a:lnRef>
+          <a:fillRef idx="0">
+            <a:schemeClr val="accent1"/>
+          </a:fillRef>
+          <a:effectRef idx="1">
+            <a:schemeClr val="accent1"/>
+          </a:effectRef>
+          <a:fontRef idx="minor">
+            <a:schemeClr val="tx1"/>
+          </a:fontRef>
+        </p:style>
+      </p:cxnSp>
+      <p:cxnSp>
+        <p:nvCxnSpPr>
+          <p:cNvPr id="12" name="直線矢印コネクタ 11">
+            <a:extLst>
+              <a:ext uri="{FF2B5EF4-FFF2-40B4-BE49-F238E27FC236}">
+                <a16:creationId xmlns:a16="http://schemas.microsoft.com/office/drawing/2014/main" id="{80265AF6-E973-9BBF-8A33-C13623E688E7}"/>
+              </a:ext>
+            </a:extLst>
+          </p:cNvPr>
+          <p:cNvCxnSpPr>
+            <a:cxnSpLocks/>
+            <a:stCxn id="3" idx="2"/>
+            <a:endCxn id="4" idx="0"/>
+          </p:cNvCxnSpPr>
+          <p:nvPr/>
+        </p:nvCxnSpPr>
+        <p:spPr>
+          <a:xfrm>
+            <a:off x="6396325" y="2270648"/>
+            <a:ext cx="0" cy="398206"/>
+          </a:xfrm>
+          <a:prstGeom prst="straightConnector1">
+            <a:avLst/>
+          </a:prstGeom>
+          <a:ln>
+            <a:solidFill>
+              <a:schemeClr val="tx1"/>
+            </a:solidFill>
+            <a:tailEnd type="triangle" w="lg" len="lg"/>
+          </a:ln>
+        </p:spPr>
+        <p:style>
+          <a:lnRef idx="2">
+            <a:schemeClr val="accent1"/>
+          </a:lnRef>
+          <a:fillRef idx="0">
+            <a:schemeClr val="accent1"/>
+          </a:fillRef>
+          <a:effectRef idx="1">
+            <a:schemeClr val="accent1"/>
+          </a:effectRef>
+          <a:fontRef idx="minor">
+            <a:schemeClr val="tx1"/>
+          </a:fontRef>
+        </p:style>
+      </p:cxnSp>
+    </p:spTree>
+    <p:extLst>
+      <p:ext uri="{BB962C8B-B14F-4D97-AF65-F5344CB8AC3E}">
+        <p14:creationId xmlns:p14="http://schemas.microsoft.com/office/powerpoint/2010/main" val="1872722757"/>
+      </p:ext>
+    </p:extLst>
+  </p:cSld>
+  <p:clrMapOvr>
+    <a:masterClrMapping/>
+  </p:clrMapOvr>
+</p:sld>
+</file>
+
 <file path=ppt/theme/theme1.xml><?xml version="1.0" encoding="utf-8"?>
 <a:theme xmlns:a="http://schemas.openxmlformats.org/drawingml/2006/main" name="Office テーマ">
   <a:themeElements>

</xml_diff>

<commit_message>
Write the execution order of TestCase methods.
</commit_message>
<xml_diff>
--- a/images/images.pptx
+++ b/images/images.pptx
@@ -12,6 +12,7 @@
     <p:sldId id="260" r:id="rId6"/>
     <p:sldId id="261" r:id="rId7"/>
     <p:sldId id="262" r:id="rId8"/>
+    <p:sldId id="263" r:id="rId9"/>
   </p:sldIdLst>
   <p:sldSz cx="12192000" cy="6858000"/>
   <p:notesSz cx="6858000" cy="9144000"/>
@@ -265,7 +266,7 @@
           <a:p>
             <a:fld id="{05CEC32E-2D17-B842-A2D3-04F6F1CD1B45}" type="datetimeFigureOut">
               <a:rPr kumimoji="1" lang="ja-JP" altLang="en-US" smtClean="0"/>
-              <a:t>2024/5/20</a:t>
+              <a:t>2024/5/22</a:t>
             </a:fld>
             <a:endParaRPr kumimoji="1" lang="ja-JP" altLang="en-US"/>
           </a:p>
@@ -495,7 +496,7 @@
           <a:p>
             <a:fld id="{05CEC32E-2D17-B842-A2D3-04F6F1CD1B45}" type="datetimeFigureOut">
               <a:rPr kumimoji="1" lang="ja-JP" altLang="en-US" smtClean="0"/>
-              <a:t>2024/5/20</a:t>
+              <a:t>2024/5/22</a:t>
             </a:fld>
             <a:endParaRPr kumimoji="1" lang="ja-JP" altLang="en-US"/>
           </a:p>
@@ -735,7 +736,7 @@
           <a:p>
             <a:fld id="{05CEC32E-2D17-B842-A2D3-04F6F1CD1B45}" type="datetimeFigureOut">
               <a:rPr kumimoji="1" lang="ja-JP" altLang="en-US" smtClean="0"/>
-              <a:t>2024/5/20</a:t>
+              <a:t>2024/5/22</a:t>
             </a:fld>
             <a:endParaRPr kumimoji="1" lang="ja-JP" altLang="en-US"/>
           </a:p>
@@ -965,7 +966,7 @@
           <a:p>
             <a:fld id="{05CEC32E-2D17-B842-A2D3-04F6F1CD1B45}" type="datetimeFigureOut">
               <a:rPr kumimoji="1" lang="ja-JP" altLang="en-US" smtClean="0"/>
-              <a:t>2024/5/20</a:t>
+              <a:t>2024/5/22</a:t>
             </a:fld>
             <a:endParaRPr kumimoji="1" lang="ja-JP" altLang="en-US"/>
           </a:p>
@@ -1240,7 +1241,7 @@
           <a:p>
             <a:fld id="{05CEC32E-2D17-B842-A2D3-04F6F1CD1B45}" type="datetimeFigureOut">
               <a:rPr kumimoji="1" lang="ja-JP" altLang="en-US" smtClean="0"/>
-              <a:t>2024/5/20</a:t>
+              <a:t>2024/5/22</a:t>
             </a:fld>
             <a:endParaRPr kumimoji="1" lang="ja-JP" altLang="en-US"/>
           </a:p>
@@ -1569,7 +1570,7 @@
           <a:p>
             <a:fld id="{05CEC32E-2D17-B842-A2D3-04F6F1CD1B45}" type="datetimeFigureOut">
               <a:rPr kumimoji="1" lang="ja-JP" altLang="en-US" smtClean="0"/>
-              <a:t>2024/5/20</a:t>
+              <a:t>2024/5/22</a:t>
             </a:fld>
             <a:endParaRPr kumimoji="1" lang="ja-JP" altLang="en-US"/>
           </a:p>
@@ -2045,7 +2046,7 @@
           <a:p>
             <a:fld id="{05CEC32E-2D17-B842-A2D3-04F6F1CD1B45}" type="datetimeFigureOut">
               <a:rPr kumimoji="1" lang="ja-JP" altLang="en-US" smtClean="0"/>
-              <a:t>2024/5/20</a:t>
+              <a:t>2024/5/22</a:t>
             </a:fld>
             <a:endParaRPr kumimoji="1" lang="ja-JP" altLang="en-US"/>
           </a:p>
@@ -2186,7 +2187,7 @@
           <a:p>
             <a:fld id="{05CEC32E-2D17-B842-A2D3-04F6F1CD1B45}" type="datetimeFigureOut">
               <a:rPr kumimoji="1" lang="ja-JP" altLang="en-US" smtClean="0"/>
-              <a:t>2024/5/20</a:t>
+              <a:t>2024/5/22</a:t>
             </a:fld>
             <a:endParaRPr kumimoji="1" lang="ja-JP" altLang="en-US"/>
           </a:p>
@@ -2299,7 +2300,7 @@
           <a:p>
             <a:fld id="{05CEC32E-2D17-B842-A2D3-04F6F1CD1B45}" type="datetimeFigureOut">
               <a:rPr kumimoji="1" lang="ja-JP" altLang="en-US" smtClean="0"/>
-              <a:t>2024/5/20</a:t>
+              <a:t>2024/5/22</a:t>
             </a:fld>
             <a:endParaRPr kumimoji="1" lang="ja-JP" altLang="en-US"/>
           </a:p>
@@ -2642,7 +2643,7 @@
           <a:p>
             <a:fld id="{05CEC32E-2D17-B842-A2D3-04F6F1CD1B45}" type="datetimeFigureOut">
               <a:rPr kumimoji="1" lang="ja-JP" altLang="en-US" smtClean="0"/>
-              <a:t>2024/5/20</a:t>
+              <a:t>2024/5/22</a:t>
             </a:fld>
             <a:endParaRPr kumimoji="1" lang="ja-JP" altLang="en-US"/>
           </a:p>
@@ -2930,7 +2931,7 @@
           <a:p>
             <a:fld id="{05CEC32E-2D17-B842-A2D3-04F6F1CD1B45}" type="datetimeFigureOut">
               <a:rPr kumimoji="1" lang="ja-JP" altLang="en-US" smtClean="0"/>
-              <a:t>2024/5/20</a:t>
+              <a:t>2024/5/22</a:t>
             </a:fld>
             <a:endParaRPr kumimoji="1" lang="ja-JP" altLang="en-US"/>
           </a:p>
@@ -3203,7 +3204,7 @@
           <a:p>
             <a:fld id="{05CEC32E-2D17-B842-A2D3-04F6F1CD1B45}" type="datetimeFigureOut">
               <a:rPr kumimoji="1" lang="ja-JP" altLang="en-US" smtClean="0"/>
-              <a:t>2024/5/20</a:t>
+              <a:t>2024/5/22</a:t>
             </a:fld>
             <a:endParaRPr kumimoji="1" lang="ja-JP" altLang="en-US"/>
           </a:p>
@@ -7211,6 +7212,955 @@
 </p:sld>
 </file>
 
+<file path=ppt/slides/slide8.xml><?xml version="1.0" encoding="utf-8"?>
+<p:sld xmlns:a="http://schemas.openxmlformats.org/drawingml/2006/main" xmlns:r="http://schemas.openxmlformats.org/officeDocument/2006/relationships" xmlns:p="http://schemas.openxmlformats.org/presentationml/2006/main">
+  <p:cSld>
+    <p:spTree>
+      <p:nvGrpSpPr>
+        <p:cNvPr id="1" name=""/>
+        <p:cNvGrpSpPr/>
+        <p:nvPr/>
+      </p:nvGrpSpPr>
+      <p:grpSpPr>
+        <a:xfrm>
+          <a:off x="0" y="0"/>
+          <a:ext cx="0" cy="0"/>
+          <a:chOff x="0" y="0"/>
+          <a:chExt cx="0" cy="0"/>
+        </a:xfrm>
+      </p:grpSpPr>
+      <p:sp>
+        <p:nvSpPr>
+          <p:cNvPr id="2" name="テキスト ボックス 1">
+            <a:extLst>
+              <a:ext uri="{FF2B5EF4-FFF2-40B4-BE49-F238E27FC236}">
+                <a16:creationId xmlns:a16="http://schemas.microsoft.com/office/drawing/2014/main" id="{323374FE-B609-8532-2258-BF763C61271B}"/>
+              </a:ext>
+            </a:extLst>
+          </p:cNvPr>
+          <p:cNvSpPr txBox="1"/>
+          <p:nvPr/>
+        </p:nvSpPr>
+        <p:spPr>
+          <a:xfrm>
+            <a:off x="2071009" y="1185383"/>
+            <a:ext cx="2343518" cy="494247"/>
+          </a:xfrm>
+          <a:prstGeom prst="rect">
+            <a:avLst/>
+          </a:prstGeom>
+        </p:spPr>
+        <p:style>
+          <a:lnRef idx="2">
+            <a:schemeClr val="dk1"/>
+          </a:lnRef>
+          <a:fillRef idx="1">
+            <a:schemeClr val="lt1"/>
+          </a:fillRef>
+          <a:effectRef idx="0">
+            <a:schemeClr val="dk1"/>
+          </a:effectRef>
+          <a:fontRef idx="minor">
+            <a:schemeClr val="dk1"/>
+          </a:fontRef>
+        </p:style>
+        <p:txBody>
+          <a:bodyPr wrap="square" rtlCol="0" anchor="ctr" anchorCtr="1">
+            <a:noAutofit/>
+          </a:bodyPr>
+          <a:lstStyle/>
+          <a:p>
+            <a:pPr algn="ctr"/>
+            <a:r>
+              <a:rPr kumimoji="1" lang="en-US" altLang="ja-JP" dirty="0">
+                <a:latin typeface="Meiryo UI" panose="020B0604030504040204" pitchFamily="34" charset="-128"/>
+                <a:ea typeface="Meiryo UI" panose="020B0604030504040204" pitchFamily="34" charset="-128"/>
+              </a:rPr>
+              <a:t>①</a:t>
+            </a:r>
+            <a:r>
+              <a:rPr kumimoji="1" lang="en-US" altLang="ja-JP" dirty="0" err="1">
+                <a:latin typeface="Meiryo UI" panose="020B0604030504040204" pitchFamily="34" charset="-128"/>
+                <a:ea typeface="Meiryo UI" panose="020B0604030504040204" pitchFamily="34" charset="-128"/>
+              </a:rPr>
+              <a:t>setUpClass</a:t>
+            </a:r>
+            <a:endParaRPr kumimoji="1" lang="en-US" altLang="ja-JP" dirty="0">
+              <a:latin typeface="Meiryo UI" panose="020B0604030504040204" pitchFamily="34" charset="-128"/>
+              <a:ea typeface="Meiryo UI" panose="020B0604030504040204" pitchFamily="34" charset="-128"/>
+            </a:endParaRPr>
+          </a:p>
+        </p:txBody>
+      </p:sp>
+      <p:sp>
+        <p:nvSpPr>
+          <p:cNvPr id="3" name="テキスト ボックス 2">
+            <a:extLst>
+              <a:ext uri="{FF2B5EF4-FFF2-40B4-BE49-F238E27FC236}">
+                <a16:creationId xmlns:a16="http://schemas.microsoft.com/office/drawing/2014/main" id="{9CD568B2-800A-E5E0-6989-8301BB745058}"/>
+              </a:ext>
+            </a:extLst>
+          </p:cNvPr>
+          <p:cNvSpPr txBox="1"/>
+          <p:nvPr/>
+        </p:nvSpPr>
+        <p:spPr>
+          <a:xfrm>
+            <a:off x="2071009" y="5156303"/>
+            <a:ext cx="2343518" cy="494247"/>
+          </a:xfrm>
+          <a:prstGeom prst="rect">
+            <a:avLst/>
+          </a:prstGeom>
+        </p:spPr>
+        <p:style>
+          <a:lnRef idx="2">
+            <a:schemeClr val="dk1"/>
+          </a:lnRef>
+          <a:fillRef idx="1">
+            <a:schemeClr val="lt1"/>
+          </a:fillRef>
+          <a:effectRef idx="0">
+            <a:schemeClr val="dk1"/>
+          </a:effectRef>
+          <a:fontRef idx="minor">
+            <a:schemeClr val="dk1"/>
+          </a:fontRef>
+        </p:style>
+        <p:txBody>
+          <a:bodyPr wrap="square" rtlCol="0" anchor="ctr" anchorCtr="1">
+            <a:noAutofit/>
+          </a:bodyPr>
+          <a:lstStyle/>
+          <a:p>
+            <a:pPr algn="ctr"/>
+            <a:r>
+              <a:rPr lang="en-US" altLang="ja-JP" dirty="0">
+                <a:latin typeface="Meiryo UI" panose="020B0604030504040204" pitchFamily="34" charset="-128"/>
+                <a:ea typeface="Meiryo UI" panose="020B0604030504040204" pitchFamily="34" charset="-128"/>
+              </a:rPr>
+              <a:t>⑧</a:t>
+            </a:r>
+            <a:r>
+              <a:rPr kumimoji="1" lang="en-US" altLang="ja-JP" dirty="0" err="1">
+                <a:latin typeface="Meiryo UI" panose="020B0604030504040204" pitchFamily="34" charset="-128"/>
+                <a:ea typeface="Meiryo UI" panose="020B0604030504040204" pitchFamily="34" charset="-128"/>
+              </a:rPr>
+              <a:t>tearDownClass</a:t>
+            </a:r>
+            <a:endParaRPr kumimoji="1" lang="en-US" altLang="ja-JP" dirty="0">
+              <a:latin typeface="Meiryo UI" panose="020B0604030504040204" pitchFamily="34" charset="-128"/>
+              <a:ea typeface="Meiryo UI" panose="020B0604030504040204" pitchFamily="34" charset="-128"/>
+            </a:endParaRPr>
+          </a:p>
+        </p:txBody>
+      </p:sp>
+      <p:sp>
+        <p:nvSpPr>
+          <p:cNvPr id="4" name="テキスト ボックス 3">
+            <a:extLst>
+              <a:ext uri="{FF2B5EF4-FFF2-40B4-BE49-F238E27FC236}">
+                <a16:creationId xmlns:a16="http://schemas.microsoft.com/office/drawing/2014/main" id="{C464137E-11AB-BC01-EA2B-2886C272FEB0}"/>
+              </a:ext>
+            </a:extLst>
+          </p:cNvPr>
+          <p:cNvSpPr txBox="1"/>
+          <p:nvPr/>
+        </p:nvSpPr>
+        <p:spPr>
+          <a:xfrm>
+            <a:off x="2071984" y="2178113"/>
+            <a:ext cx="2343518" cy="494247"/>
+          </a:xfrm>
+          <a:prstGeom prst="rect">
+            <a:avLst/>
+          </a:prstGeom>
+        </p:spPr>
+        <p:style>
+          <a:lnRef idx="2">
+            <a:schemeClr val="dk1"/>
+          </a:lnRef>
+          <a:fillRef idx="1">
+            <a:schemeClr val="lt1"/>
+          </a:fillRef>
+          <a:effectRef idx="0">
+            <a:schemeClr val="dk1"/>
+          </a:effectRef>
+          <a:fontRef idx="minor">
+            <a:schemeClr val="dk1"/>
+          </a:fontRef>
+        </p:style>
+        <p:txBody>
+          <a:bodyPr wrap="square" rtlCol="0" anchor="ctr" anchorCtr="1">
+            <a:noAutofit/>
+          </a:bodyPr>
+          <a:lstStyle/>
+          <a:p>
+            <a:pPr algn="ctr"/>
+            <a:r>
+              <a:rPr kumimoji="1" lang="en-US" altLang="ja-JP" dirty="0">
+                <a:latin typeface="Meiryo UI" panose="020B0604030504040204" pitchFamily="34" charset="-128"/>
+                <a:ea typeface="Meiryo UI" panose="020B0604030504040204" pitchFamily="34" charset="-128"/>
+              </a:rPr>
+              <a:t>②⑤</a:t>
+            </a:r>
+            <a:r>
+              <a:rPr kumimoji="1" lang="en-US" altLang="ja-JP" dirty="0" err="1">
+                <a:latin typeface="Meiryo UI" panose="020B0604030504040204" pitchFamily="34" charset="-128"/>
+                <a:ea typeface="Meiryo UI" panose="020B0604030504040204" pitchFamily="34" charset="-128"/>
+              </a:rPr>
+              <a:t>setUp</a:t>
+            </a:r>
+            <a:endParaRPr kumimoji="1" lang="en-US" altLang="ja-JP" dirty="0">
+              <a:latin typeface="Meiryo UI" panose="020B0604030504040204" pitchFamily="34" charset="-128"/>
+              <a:ea typeface="Meiryo UI" panose="020B0604030504040204" pitchFamily="34" charset="-128"/>
+            </a:endParaRPr>
+          </a:p>
+        </p:txBody>
+      </p:sp>
+      <p:sp>
+        <p:nvSpPr>
+          <p:cNvPr id="5" name="テキスト ボックス 4">
+            <a:extLst>
+              <a:ext uri="{FF2B5EF4-FFF2-40B4-BE49-F238E27FC236}">
+                <a16:creationId xmlns:a16="http://schemas.microsoft.com/office/drawing/2014/main" id="{71412074-41FA-82D9-1F6E-A322713589F6}"/>
+              </a:ext>
+            </a:extLst>
+          </p:cNvPr>
+          <p:cNvSpPr txBox="1"/>
+          <p:nvPr/>
+        </p:nvSpPr>
+        <p:spPr>
+          <a:xfrm>
+            <a:off x="2072959" y="4163573"/>
+            <a:ext cx="2343518" cy="494247"/>
+          </a:xfrm>
+          <a:prstGeom prst="rect">
+            <a:avLst/>
+          </a:prstGeom>
+        </p:spPr>
+        <p:style>
+          <a:lnRef idx="2">
+            <a:schemeClr val="dk1"/>
+          </a:lnRef>
+          <a:fillRef idx="1">
+            <a:schemeClr val="lt1"/>
+          </a:fillRef>
+          <a:effectRef idx="0">
+            <a:schemeClr val="dk1"/>
+          </a:effectRef>
+          <a:fontRef idx="minor">
+            <a:schemeClr val="dk1"/>
+          </a:fontRef>
+        </p:style>
+        <p:txBody>
+          <a:bodyPr wrap="square" rtlCol="0" anchor="ctr" anchorCtr="1">
+            <a:noAutofit/>
+          </a:bodyPr>
+          <a:lstStyle/>
+          <a:p>
+            <a:pPr algn="ctr"/>
+            <a:r>
+              <a:rPr kumimoji="1" lang="en-US" altLang="ja-JP" dirty="0">
+                <a:latin typeface="Meiryo UI" panose="020B0604030504040204" pitchFamily="34" charset="-128"/>
+                <a:ea typeface="Meiryo UI" panose="020B0604030504040204" pitchFamily="34" charset="-128"/>
+              </a:rPr>
+              <a:t>④⑦</a:t>
+            </a:r>
+            <a:r>
+              <a:rPr kumimoji="1" lang="en-US" altLang="ja-JP" dirty="0" err="1">
+                <a:latin typeface="Meiryo UI" panose="020B0604030504040204" pitchFamily="34" charset="-128"/>
+                <a:ea typeface="Meiryo UI" panose="020B0604030504040204" pitchFamily="34" charset="-128"/>
+              </a:rPr>
+              <a:t>tearDown</a:t>
+            </a:r>
+            <a:endParaRPr kumimoji="1" lang="en-US" altLang="ja-JP" dirty="0">
+              <a:latin typeface="Meiryo UI" panose="020B0604030504040204" pitchFamily="34" charset="-128"/>
+              <a:ea typeface="Meiryo UI" panose="020B0604030504040204" pitchFamily="34" charset="-128"/>
+            </a:endParaRPr>
+          </a:p>
+        </p:txBody>
+      </p:sp>
+      <p:sp>
+        <p:nvSpPr>
+          <p:cNvPr id="6" name="テキスト ボックス 5">
+            <a:extLst>
+              <a:ext uri="{FF2B5EF4-FFF2-40B4-BE49-F238E27FC236}">
+                <a16:creationId xmlns:a16="http://schemas.microsoft.com/office/drawing/2014/main" id="{7EDFA7ED-4484-C5E2-1F99-620383F93FD6}"/>
+              </a:ext>
+            </a:extLst>
+          </p:cNvPr>
+          <p:cNvSpPr txBox="1"/>
+          <p:nvPr/>
+        </p:nvSpPr>
+        <p:spPr>
+          <a:xfrm>
+            <a:off x="2074907" y="3170843"/>
+            <a:ext cx="2343518" cy="494247"/>
+          </a:xfrm>
+          <a:prstGeom prst="rect">
+            <a:avLst/>
+          </a:prstGeom>
+        </p:spPr>
+        <p:style>
+          <a:lnRef idx="2">
+            <a:schemeClr val="dk1"/>
+          </a:lnRef>
+          <a:fillRef idx="1">
+            <a:schemeClr val="lt1"/>
+          </a:fillRef>
+          <a:effectRef idx="0">
+            <a:schemeClr val="dk1"/>
+          </a:effectRef>
+          <a:fontRef idx="minor">
+            <a:schemeClr val="dk1"/>
+          </a:fontRef>
+        </p:style>
+        <p:txBody>
+          <a:bodyPr wrap="square" rtlCol="0" anchor="ctr" anchorCtr="1">
+            <a:noAutofit/>
+          </a:bodyPr>
+          <a:lstStyle/>
+          <a:p>
+            <a:pPr algn="ctr"/>
+            <a:r>
+              <a:rPr lang="en-US" altLang="ja-JP" dirty="0">
+                <a:latin typeface="Meiryo UI" panose="020B0604030504040204" pitchFamily="34" charset="-128"/>
+                <a:ea typeface="Meiryo UI" panose="020B0604030504040204" pitchFamily="34" charset="-128"/>
+              </a:rPr>
+              <a:t>③</a:t>
+            </a:r>
+            <a:r>
+              <a:rPr lang="en-US" altLang="ja-JP" dirty="0" err="1">
+                <a:latin typeface="Meiryo UI" panose="020B0604030504040204" pitchFamily="34" charset="-128"/>
+                <a:ea typeface="Meiryo UI" panose="020B0604030504040204" pitchFamily="34" charset="-128"/>
+              </a:rPr>
+              <a:t>test_foo</a:t>
+            </a:r>
+            <a:endParaRPr kumimoji="1" lang="en-US" altLang="ja-JP" dirty="0">
+              <a:latin typeface="Meiryo UI" panose="020B0604030504040204" pitchFamily="34" charset="-128"/>
+              <a:ea typeface="Meiryo UI" panose="020B0604030504040204" pitchFamily="34" charset="-128"/>
+            </a:endParaRPr>
+          </a:p>
+        </p:txBody>
+      </p:sp>
+      <p:sp>
+        <p:nvSpPr>
+          <p:cNvPr id="7" name="テキスト ボックス 6">
+            <a:extLst>
+              <a:ext uri="{FF2B5EF4-FFF2-40B4-BE49-F238E27FC236}">
+                <a16:creationId xmlns:a16="http://schemas.microsoft.com/office/drawing/2014/main" id="{39F62D21-9A1D-A3BF-C2D1-1C5202F03ECE}"/>
+              </a:ext>
+            </a:extLst>
+          </p:cNvPr>
+          <p:cNvSpPr txBox="1"/>
+          <p:nvPr/>
+        </p:nvSpPr>
+        <p:spPr>
+          <a:xfrm>
+            <a:off x="4754911" y="3170843"/>
+            <a:ext cx="2343518" cy="494247"/>
+          </a:xfrm>
+          <a:prstGeom prst="rect">
+            <a:avLst/>
+          </a:prstGeom>
+        </p:spPr>
+        <p:style>
+          <a:lnRef idx="2">
+            <a:schemeClr val="dk1"/>
+          </a:lnRef>
+          <a:fillRef idx="1">
+            <a:schemeClr val="lt1"/>
+          </a:fillRef>
+          <a:effectRef idx="0">
+            <a:schemeClr val="dk1"/>
+          </a:effectRef>
+          <a:fontRef idx="minor">
+            <a:schemeClr val="dk1"/>
+          </a:fontRef>
+        </p:style>
+        <p:txBody>
+          <a:bodyPr wrap="square" rtlCol="0" anchor="ctr" anchorCtr="1">
+            <a:noAutofit/>
+          </a:bodyPr>
+          <a:lstStyle/>
+          <a:p>
+            <a:pPr algn="ctr"/>
+            <a:r>
+              <a:rPr lang="en-US" altLang="ja-JP" dirty="0">
+                <a:latin typeface="Meiryo UI" panose="020B0604030504040204" pitchFamily="34" charset="-128"/>
+                <a:ea typeface="Meiryo UI" panose="020B0604030504040204" pitchFamily="34" charset="-128"/>
+              </a:rPr>
+              <a:t>⑥</a:t>
+            </a:r>
+            <a:r>
+              <a:rPr lang="en-US" altLang="ja-JP" dirty="0" err="1">
+                <a:latin typeface="Meiryo UI" panose="020B0604030504040204" pitchFamily="34" charset="-128"/>
+                <a:ea typeface="Meiryo UI" panose="020B0604030504040204" pitchFamily="34" charset="-128"/>
+              </a:rPr>
+              <a:t>test_bar</a:t>
+            </a:r>
+            <a:endParaRPr kumimoji="1" lang="en-US" altLang="ja-JP" dirty="0">
+              <a:latin typeface="Meiryo UI" panose="020B0604030504040204" pitchFamily="34" charset="-128"/>
+              <a:ea typeface="Meiryo UI" panose="020B0604030504040204" pitchFamily="34" charset="-128"/>
+            </a:endParaRPr>
+          </a:p>
+        </p:txBody>
+      </p:sp>
+      <p:cxnSp>
+        <p:nvCxnSpPr>
+          <p:cNvPr id="9" name="直線矢印コネクタ 8">
+            <a:extLst>
+              <a:ext uri="{FF2B5EF4-FFF2-40B4-BE49-F238E27FC236}">
+                <a16:creationId xmlns:a16="http://schemas.microsoft.com/office/drawing/2014/main" id="{31C49A66-56D1-76FF-0CE7-E3C744BC4516}"/>
+              </a:ext>
+            </a:extLst>
+          </p:cNvPr>
+          <p:cNvCxnSpPr>
+            <a:stCxn id="2" idx="2"/>
+            <a:endCxn id="4" idx="0"/>
+          </p:cNvCxnSpPr>
+          <p:nvPr/>
+        </p:nvCxnSpPr>
+        <p:spPr>
+          <a:xfrm>
+            <a:off x="3242768" y="1679630"/>
+            <a:ext cx="975" cy="498483"/>
+          </a:xfrm>
+          <a:prstGeom prst="straightConnector1">
+            <a:avLst/>
+          </a:prstGeom>
+          <a:ln>
+            <a:solidFill>
+              <a:schemeClr val="tx1"/>
+            </a:solidFill>
+            <a:tailEnd type="triangle" w="lg" len="lg"/>
+          </a:ln>
+        </p:spPr>
+        <p:style>
+          <a:lnRef idx="2">
+            <a:schemeClr val="accent1"/>
+          </a:lnRef>
+          <a:fillRef idx="0">
+            <a:schemeClr val="accent1"/>
+          </a:fillRef>
+          <a:effectRef idx="1">
+            <a:schemeClr val="accent1"/>
+          </a:effectRef>
+          <a:fontRef idx="minor">
+            <a:schemeClr val="tx1"/>
+          </a:fontRef>
+        </p:style>
+      </p:cxnSp>
+      <p:cxnSp>
+        <p:nvCxnSpPr>
+          <p:cNvPr id="10" name="直線矢印コネクタ 9">
+            <a:extLst>
+              <a:ext uri="{FF2B5EF4-FFF2-40B4-BE49-F238E27FC236}">
+                <a16:creationId xmlns:a16="http://schemas.microsoft.com/office/drawing/2014/main" id="{F06DBE85-66FF-8BB9-C2F2-2C442F5FF731}"/>
+              </a:ext>
+            </a:extLst>
+          </p:cNvPr>
+          <p:cNvCxnSpPr>
+            <a:cxnSpLocks/>
+            <a:stCxn id="4" idx="2"/>
+            <a:endCxn id="6" idx="0"/>
+          </p:cNvCxnSpPr>
+          <p:nvPr/>
+        </p:nvCxnSpPr>
+        <p:spPr>
+          <a:xfrm>
+            <a:off x="3243743" y="2672360"/>
+            <a:ext cx="2923" cy="498483"/>
+          </a:xfrm>
+          <a:prstGeom prst="straightConnector1">
+            <a:avLst/>
+          </a:prstGeom>
+          <a:ln>
+            <a:solidFill>
+              <a:schemeClr val="tx1"/>
+            </a:solidFill>
+            <a:tailEnd type="triangle" w="lg" len="lg"/>
+          </a:ln>
+        </p:spPr>
+        <p:style>
+          <a:lnRef idx="2">
+            <a:schemeClr val="accent1"/>
+          </a:lnRef>
+          <a:fillRef idx="0">
+            <a:schemeClr val="accent1"/>
+          </a:fillRef>
+          <a:effectRef idx="1">
+            <a:schemeClr val="accent1"/>
+          </a:effectRef>
+          <a:fontRef idx="minor">
+            <a:schemeClr val="tx1"/>
+          </a:fontRef>
+        </p:style>
+      </p:cxnSp>
+      <p:cxnSp>
+        <p:nvCxnSpPr>
+          <p:cNvPr id="13" name="直線矢印コネクタ 12">
+            <a:extLst>
+              <a:ext uri="{FF2B5EF4-FFF2-40B4-BE49-F238E27FC236}">
+                <a16:creationId xmlns:a16="http://schemas.microsoft.com/office/drawing/2014/main" id="{8FA9BA97-C797-C679-BC5F-5C18814AAC6B}"/>
+              </a:ext>
+            </a:extLst>
+          </p:cNvPr>
+          <p:cNvCxnSpPr>
+            <a:cxnSpLocks/>
+            <a:stCxn id="6" idx="2"/>
+            <a:endCxn id="5" idx="0"/>
+          </p:cNvCxnSpPr>
+          <p:nvPr/>
+        </p:nvCxnSpPr>
+        <p:spPr>
+          <a:xfrm flipH="1">
+            <a:off x="3244718" y="3665090"/>
+            <a:ext cx="1948" cy="498483"/>
+          </a:xfrm>
+          <a:prstGeom prst="straightConnector1">
+            <a:avLst/>
+          </a:prstGeom>
+          <a:ln>
+            <a:solidFill>
+              <a:schemeClr val="tx1"/>
+            </a:solidFill>
+            <a:tailEnd type="triangle" w="lg" len="lg"/>
+          </a:ln>
+        </p:spPr>
+        <p:style>
+          <a:lnRef idx="2">
+            <a:schemeClr val="accent1"/>
+          </a:lnRef>
+          <a:fillRef idx="0">
+            <a:schemeClr val="accent1"/>
+          </a:fillRef>
+          <a:effectRef idx="1">
+            <a:schemeClr val="accent1"/>
+          </a:effectRef>
+          <a:fontRef idx="minor">
+            <a:schemeClr val="tx1"/>
+          </a:fontRef>
+        </p:style>
+      </p:cxnSp>
+      <p:cxnSp>
+        <p:nvCxnSpPr>
+          <p:cNvPr id="16" name="直線矢印コネクタ 15">
+            <a:extLst>
+              <a:ext uri="{FF2B5EF4-FFF2-40B4-BE49-F238E27FC236}">
+                <a16:creationId xmlns:a16="http://schemas.microsoft.com/office/drawing/2014/main" id="{AE1C39E7-8977-06B3-6A7B-5B0636D01EDC}"/>
+              </a:ext>
+            </a:extLst>
+          </p:cNvPr>
+          <p:cNvCxnSpPr>
+            <a:cxnSpLocks/>
+            <a:stCxn id="5" idx="1"/>
+            <a:endCxn id="4" idx="1"/>
+          </p:cNvCxnSpPr>
+          <p:nvPr/>
+        </p:nvCxnSpPr>
+        <p:spPr>
+          <a:xfrm rot="10800000">
+            <a:off x="2071985" y="2425237"/>
+            <a:ext cx="975" cy="1985460"/>
+          </a:xfrm>
+          <a:prstGeom prst="bentConnector3">
+            <a:avLst>
+              <a:gd name="adj1" fmla="val 23546154"/>
+            </a:avLst>
+          </a:prstGeom>
+          <a:ln>
+            <a:solidFill>
+              <a:schemeClr val="tx1"/>
+            </a:solidFill>
+            <a:tailEnd type="triangle" w="lg" len="lg"/>
+          </a:ln>
+        </p:spPr>
+        <p:style>
+          <a:lnRef idx="2">
+            <a:schemeClr val="accent1"/>
+          </a:lnRef>
+          <a:fillRef idx="0">
+            <a:schemeClr val="accent1"/>
+          </a:fillRef>
+          <a:effectRef idx="1">
+            <a:schemeClr val="accent1"/>
+          </a:effectRef>
+          <a:fontRef idx="minor">
+            <a:schemeClr val="tx1"/>
+          </a:fontRef>
+        </p:style>
+      </p:cxnSp>
+      <p:cxnSp>
+        <p:nvCxnSpPr>
+          <p:cNvPr id="19" name="直線矢印コネクタ 15">
+            <a:extLst>
+              <a:ext uri="{FF2B5EF4-FFF2-40B4-BE49-F238E27FC236}">
+                <a16:creationId xmlns:a16="http://schemas.microsoft.com/office/drawing/2014/main" id="{4E95EB98-13C6-82FC-1ECF-5405690FA647}"/>
+              </a:ext>
+            </a:extLst>
+          </p:cNvPr>
+          <p:cNvCxnSpPr>
+            <a:cxnSpLocks/>
+            <a:stCxn id="4" idx="3"/>
+            <a:endCxn id="7" idx="0"/>
+          </p:cNvCxnSpPr>
+          <p:nvPr/>
+        </p:nvCxnSpPr>
+        <p:spPr>
+          <a:xfrm>
+            <a:off x="4415502" y="2425237"/>
+            <a:ext cx="1511168" cy="745606"/>
+          </a:xfrm>
+          <a:prstGeom prst="bentConnector2">
+            <a:avLst/>
+          </a:prstGeom>
+          <a:ln>
+            <a:solidFill>
+              <a:schemeClr val="tx1"/>
+            </a:solidFill>
+            <a:tailEnd type="triangle" w="lg" len="lg"/>
+          </a:ln>
+        </p:spPr>
+        <p:style>
+          <a:lnRef idx="2">
+            <a:schemeClr val="accent1"/>
+          </a:lnRef>
+          <a:fillRef idx="0">
+            <a:schemeClr val="accent1"/>
+          </a:fillRef>
+          <a:effectRef idx="1">
+            <a:schemeClr val="accent1"/>
+          </a:effectRef>
+          <a:fontRef idx="minor">
+            <a:schemeClr val="tx1"/>
+          </a:fontRef>
+        </p:style>
+      </p:cxnSp>
+      <p:cxnSp>
+        <p:nvCxnSpPr>
+          <p:cNvPr id="23" name="直線矢印コネクタ 15">
+            <a:extLst>
+              <a:ext uri="{FF2B5EF4-FFF2-40B4-BE49-F238E27FC236}">
+                <a16:creationId xmlns:a16="http://schemas.microsoft.com/office/drawing/2014/main" id="{519AD30E-2EAC-6A87-2AC8-71E3D749F5C7}"/>
+              </a:ext>
+            </a:extLst>
+          </p:cNvPr>
+          <p:cNvCxnSpPr>
+            <a:cxnSpLocks/>
+            <a:stCxn id="7" idx="2"/>
+            <a:endCxn id="5" idx="3"/>
+          </p:cNvCxnSpPr>
+          <p:nvPr/>
+        </p:nvCxnSpPr>
+        <p:spPr>
+          <a:xfrm rot="5400000">
+            <a:off x="4798771" y="3282797"/>
+            <a:ext cx="745607" cy="1510193"/>
+          </a:xfrm>
+          <a:prstGeom prst="bentConnector2">
+            <a:avLst/>
+          </a:prstGeom>
+          <a:ln>
+            <a:solidFill>
+              <a:schemeClr val="tx1"/>
+            </a:solidFill>
+            <a:tailEnd type="triangle" w="lg" len="lg"/>
+          </a:ln>
+        </p:spPr>
+        <p:style>
+          <a:lnRef idx="2">
+            <a:schemeClr val="accent1"/>
+          </a:lnRef>
+          <a:fillRef idx="0">
+            <a:schemeClr val="accent1"/>
+          </a:fillRef>
+          <a:effectRef idx="1">
+            <a:schemeClr val="accent1"/>
+          </a:effectRef>
+          <a:fontRef idx="minor">
+            <a:schemeClr val="tx1"/>
+          </a:fontRef>
+        </p:style>
+      </p:cxnSp>
+      <p:cxnSp>
+        <p:nvCxnSpPr>
+          <p:cNvPr id="27" name="直線矢印コネクタ 26">
+            <a:extLst>
+              <a:ext uri="{FF2B5EF4-FFF2-40B4-BE49-F238E27FC236}">
+                <a16:creationId xmlns:a16="http://schemas.microsoft.com/office/drawing/2014/main" id="{CBB9311B-3E09-C989-463F-4B7FE8CB8096}"/>
+              </a:ext>
+            </a:extLst>
+          </p:cNvPr>
+          <p:cNvCxnSpPr>
+            <a:cxnSpLocks/>
+            <a:stCxn id="5" idx="2"/>
+            <a:endCxn id="3" idx="0"/>
+          </p:cNvCxnSpPr>
+          <p:nvPr/>
+        </p:nvCxnSpPr>
+        <p:spPr>
+          <a:xfrm flipH="1">
+            <a:off x="3242768" y="4657820"/>
+            <a:ext cx="1950" cy="498483"/>
+          </a:xfrm>
+          <a:prstGeom prst="straightConnector1">
+            <a:avLst/>
+          </a:prstGeom>
+          <a:ln>
+            <a:solidFill>
+              <a:schemeClr val="tx1"/>
+            </a:solidFill>
+            <a:tailEnd type="triangle" w="lg" len="lg"/>
+          </a:ln>
+        </p:spPr>
+        <p:style>
+          <a:lnRef idx="2">
+            <a:schemeClr val="accent1"/>
+          </a:lnRef>
+          <a:fillRef idx="0">
+            <a:schemeClr val="accent1"/>
+          </a:fillRef>
+          <a:effectRef idx="1">
+            <a:schemeClr val="accent1"/>
+          </a:effectRef>
+          <a:fontRef idx="minor">
+            <a:schemeClr val="tx1"/>
+          </a:fontRef>
+        </p:style>
+      </p:cxnSp>
+      <p:sp>
+        <p:nvSpPr>
+          <p:cNvPr id="33" name="テキスト ボックス 32">
+            <a:extLst>
+              <a:ext uri="{FF2B5EF4-FFF2-40B4-BE49-F238E27FC236}">
+                <a16:creationId xmlns:a16="http://schemas.microsoft.com/office/drawing/2014/main" id="{E80722F3-01AB-D398-FA4D-F1BDAE711BE1}"/>
+              </a:ext>
+            </a:extLst>
+          </p:cNvPr>
+          <p:cNvSpPr txBox="1"/>
+          <p:nvPr/>
+        </p:nvSpPr>
+        <p:spPr>
+          <a:xfrm>
+            <a:off x="2071009" y="192653"/>
+            <a:ext cx="2343518" cy="494247"/>
+          </a:xfrm>
+          <a:prstGeom prst="rect">
+            <a:avLst/>
+          </a:prstGeom>
+        </p:spPr>
+        <p:style>
+          <a:lnRef idx="2">
+            <a:schemeClr val="dk1"/>
+          </a:lnRef>
+          <a:fillRef idx="1">
+            <a:schemeClr val="lt1"/>
+          </a:fillRef>
+          <a:effectRef idx="0">
+            <a:schemeClr val="dk1"/>
+          </a:effectRef>
+          <a:fontRef idx="minor">
+            <a:schemeClr val="dk1"/>
+          </a:fontRef>
+        </p:style>
+        <p:txBody>
+          <a:bodyPr wrap="square" rtlCol="0" anchor="ctr" anchorCtr="1">
+            <a:noAutofit/>
+          </a:bodyPr>
+          <a:lstStyle/>
+          <a:p>
+            <a:pPr algn="ctr"/>
+            <a:r>
+              <a:rPr kumimoji="1" lang="en-US" altLang="ja-JP" dirty="0" err="1">
+                <a:latin typeface="Meiryo UI" panose="020B0604030504040204" pitchFamily="34" charset="-128"/>
+                <a:ea typeface="Meiryo UI" panose="020B0604030504040204" pitchFamily="34" charset="-128"/>
+              </a:rPr>
+              <a:t>TestCase</a:t>
+            </a:r>
+            <a:r>
+              <a:rPr kumimoji="1" lang="ja-JP" altLang="en-US">
+                <a:latin typeface="Meiryo UI" panose="020B0604030504040204" pitchFamily="34" charset="-128"/>
+                <a:ea typeface="Meiryo UI" panose="020B0604030504040204" pitchFamily="34" charset="-128"/>
+              </a:rPr>
+              <a:t>開始</a:t>
+            </a:r>
+            <a:endParaRPr kumimoji="1" lang="en-US" altLang="ja-JP" dirty="0">
+              <a:latin typeface="Meiryo UI" panose="020B0604030504040204" pitchFamily="34" charset="-128"/>
+              <a:ea typeface="Meiryo UI" panose="020B0604030504040204" pitchFamily="34" charset="-128"/>
+            </a:endParaRPr>
+          </a:p>
+        </p:txBody>
+      </p:sp>
+      <p:cxnSp>
+        <p:nvCxnSpPr>
+          <p:cNvPr id="34" name="直線矢印コネクタ 33">
+            <a:extLst>
+              <a:ext uri="{FF2B5EF4-FFF2-40B4-BE49-F238E27FC236}">
+                <a16:creationId xmlns:a16="http://schemas.microsoft.com/office/drawing/2014/main" id="{562B66E7-AFB9-4869-EDB5-A04176537054}"/>
+              </a:ext>
+            </a:extLst>
+          </p:cNvPr>
+          <p:cNvCxnSpPr>
+            <a:cxnSpLocks/>
+            <a:stCxn id="33" idx="2"/>
+            <a:endCxn id="2" idx="0"/>
+          </p:cNvCxnSpPr>
+          <p:nvPr/>
+        </p:nvCxnSpPr>
+        <p:spPr>
+          <a:xfrm>
+            <a:off x="3242768" y="686900"/>
+            <a:ext cx="0" cy="498483"/>
+          </a:xfrm>
+          <a:prstGeom prst="straightConnector1">
+            <a:avLst/>
+          </a:prstGeom>
+          <a:ln>
+            <a:solidFill>
+              <a:schemeClr val="tx1"/>
+            </a:solidFill>
+            <a:tailEnd type="triangle" w="lg" len="lg"/>
+          </a:ln>
+        </p:spPr>
+        <p:style>
+          <a:lnRef idx="2">
+            <a:schemeClr val="accent1"/>
+          </a:lnRef>
+          <a:fillRef idx="0">
+            <a:schemeClr val="accent1"/>
+          </a:fillRef>
+          <a:effectRef idx="1">
+            <a:schemeClr val="accent1"/>
+          </a:effectRef>
+          <a:fontRef idx="minor">
+            <a:schemeClr val="tx1"/>
+          </a:fontRef>
+        </p:style>
+      </p:cxnSp>
+      <p:cxnSp>
+        <p:nvCxnSpPr>
+          <p:cNvPr id="37" name="直線矢印コネクタ 36">
+            <a:extLst>
+              <a:ext uri="{FF2B5EF4-FFF2-40B4-BE49-F238E27FC236}">
+                <a16:creationId xmlns:a16="http://schemas.microsoft.com/office/drawing/2014/main" id="{B9B903F7-C5D3-80EB-94B2-3DC227C255FE}"/>
+              </a:ext>
+            </a:extLst>
+          </p:cNvPr>
+          <p:cNvCxnSpPr>
+            <a:cxnSpLocks/>
+            <a:stCxn id="3" idx="2"/>
+            <a:endCxn id="39" idx="0"/>
+          </p:cNvCxnSpPr>
+          <p:nvPr/>
+        </p:nvCxnSpPr>
+        <p:spPr>
+          <a:xfrm>
+            <a:off x="3242768" y="5650550"/>
+            <a:ext cx="0" cy="498482"/>
+          </a:xfrm>
+          <a:prstGeom prst="straightConnector1">
+            <a:avLst/>
+          </a:prstGeom>
+          <a:ln>
+            <a:solidFill>
+              <a:schemeClr val="tx1"/>
+            </a:solidFill>
+            <a:tailEnd type="triangle" w="lg" len="lg"/>
+          </a:ln>
+        </p:spPr>
+        <p:style>
+          <a:lnRef idx="2">
+            <a:schemeClr val="accent1"/>
+          </a:lnRef>
+          <a:fillRef idx="0">
+            <a:schemeClr val="accent1"/>
+          </a:fillRef>
+          <a:effectRef idx="1">
+            <a:schemeClr val="accent1"/>
+          </a:effectRef>
+          <a:fontRef idx="minor">
+            <a:schemeClr val="tx1"/>
+          </a:fontRef>
+        </p:style>
+      </p:cxnSp>
+      <p:sp>
+        <p:nvSpPr>
+          <p:cNvPr id="39" name="テキスト ボックス 38">
+            <a:extLst>
+              <a:ext uri="{FF2B5EF4-FFF2-40B4-BE49-F238E27FC236}">
+                <a16:creationId xmlns:a16="http://schemas.microsoft.com/office/drawing/2014/main" id="{92432F2F-E99A-EDE2-D5A5-CB43597AE6E4}"/>
+              </a:ext>
+            </a:extLst>
+          </p:cNvPr>
+          <p:cNvSpPr txBox="1"/>
+          <p:nvPr/>
+        </p:nvSpPr>
+        <p:spPr>
+          <a:xfrm>
+            <a:off x="2071009" y="6149032"/>
+            <a:ext cx="2343518" cy="494247"/>
+          </a:xfrm>
+          <a:prstGeom prst="rect">
+            <a:avLst/>
+          </a:prstGeom>
+        </p:spPr>
+        <p:style>
+          <a:lnRef idx="2">
+            <a:schemeClr val="dk1"/>
+          </a:lnRef>
+          <a:fillRef idx="1">
+            <a:schemeClr val="lt1"/>
+          </a:fillRef>
+          <a:effectRef idx="0">
+            <a:schemeClr val="dk1"/>
+          </a:effectRef>
+          <a:fontRef idx="minor">
+            <a:schemeClr val="dk1"/>
+          </a:fontRef>
+        </p:style>
+        <p:txBody>
+          <a:bodyPr wrap="square" rtlCol="0" anchor="ctr" anchorCtr="1">
+            <a:noAutofit/>
+          </a:bodyPr>
+          <a:lstStyle/>
+          <a:p>
+            <a:pPr algn="ctr"/>
+            <a:r>
+              <a:rPr kumimoji="1" lang="en-US" altLang="ja-JP" dirty="0" err="1">
+                <a:latin typeface="Meiryo UI" panose="020B0604030504040204" pitchFamily="34" charset="-128"/>
+                <a:ea typeface="Meiryo UI" panose="020B0604030504040204" pitchFamily="34" charset="-128"/>
+              </a:rPr>
+              <a:t>TestCase</a:t>
+            </a:r>
+            <a:r>
+              <a:rPr kumimoji="1" lang="ja-JP" altLang="en-US">
+                <a:latin typeface="Meiryo UI" panose="020B0604030504040204" pitchFamily="34" charset="-128"/>
+                <a:ea typeface="Meiryo UI" panose="020B0604030504040204" pitchFamily="34" charset="-128"/>
+              </a:rPr>
+              <a:t>終了</a:t>
+            </a:r>
+            <a:endParaRPr kumimoji="1" lang="en-US" altLang="ja-JP" dirty="0">
+              <a:latin typeface="Meiryo UI" panose="020B0604030504040204" pitchFamily="34" charset="-128"/>
+              <a:ea typeface="Meiryo UI" panose="020B0604030504040204" pitchFamily="34" charset="-128"/>
+            </a:endParaRPr>
+          </a:p>
+        </p:txBody>
+      </p:sp>
+    </p:spTree>
+    <p:extLst>
+      <p:ext uri="{BB962C8B-B14F-4D97-AF65-F5344CB8AC3E}">
+        <p14:creationId xmlns:p14="http://schemas.microsoft.com/office/powerpoint/2010/main" val="1604638501"/>
+      </p:ext>
+    </p:extLst>
+  </p:cSld>
+  <p:clrMapOvr>
+    <a:masterClrMapping/>
+  </p:clrMapOvr>
+</p:sld>
+</file>
+
 <file path=ppt/theme/theme1.xml><?xml version="1.0" encoding="utf-8"?>
 <a:theme xmlns:a="http://schemas.openxmlformats.org/drawingml/2006/main" name="Office テーマ">
   <a:themeElements>

</xml_diff>

<commit_message>
Fix the explanation of the humble object.
</commit_message>
<xml_diff>
--- a/images/images.pptx
+++ b/images/images.pptx
@@ -7061,7 +7061,7 @@
                 <a:latin typeface="Meiryo UI" panose="020B0604030504040204" pitchFamily="34" charset="-128"/>
                 <a:ea typeface="Meiryo UI" panose="020B0604030504040204" pitchFamily="34" charset="-128"/>
               </a:rPr>
-              <a:t>テストケース</a:t>
+              <a:t>単体テスト</a:t>
             </a:r>
             <a:endParaRPr kumimoji="1" lang="en-US" altLang="ja-JP" dirty="0">
               <a:latin typeface="Meiryo UI" panose="020B0604030504040204" pitchFamily="34" charset="-128"/>
@@ -7206,6 +7206,132 @@
           </a:fontRef>
         </p:style>
       </p:cxnSp>
+      <p:cxnSp>
+        <p:nvCxnSpPr>
+          <p:cNvPr id="6" name="直線矢印コネクタ 5">
+            <a:extLst>
+              <a:ext uri="{FF2B5EF4-FFF2-40B4-BE49-F238E27FC236}">
+                <a16:creationId xmlns:a16="http://schemas.microsoft.com/office/drawing/2014/main" id="{735309E4-5E95-899B-A934-443090EAE825}"/>
+              </a:ext>
+            </a:extLst>
+          </p:cNvPr>
+          <p:cNvCxnSpPr>
+            <a:cxnSpLocks/>
+            <a:stCxn id="2" idx="3"/>
+            <a:endCxn id="3" idx="1"/>
+          </p:cNvCxnSpPr>
+          <p:nvPr/>
+        </p:nvCxnSpPr>
+        <p:spPr>
+          <a:xfrm>
+            <a:off x="4089679" y="1926303"/>
+            <a:ext cx="1134887" cy="0"/>
+          </a:xfrm>
+          <a:prstGeom prst="straightConnector1">
+            <a:avLst/>
+          </a:prstGeom>
+          <a:ln>
+            <a:solidFill>
+              <a:schemeClr val="tx1"/>
+            </a:solidFill>
+            <a:tailEnd type="triangle" w="lg" len="lg"/>
+          </a:ln>
+        </p:spPr>
+        <p:style>
+          <a:lnRef idx="2">
+            <a:schemeClr val="accent1"/>
+          </a:lnRef>
+          <a:fillRef idx="0">
+            <a:schemeClr val="accent1"/>
+          </a:fillRef>
+          <a:effectRef idx="1">
+            <a:schemeClr val="accent1"/>
+          </a:effectRef>
+          <a:fontRef idx="minor">
+            <a:schemeClr val="tx1"/>
+          </a:fontRef>
+        </p:style>
+      </p:cxnSp>
+      <p:sp>
+        <p:nvSpPr>
+          <p:cNvPr id="13" name="テキスト ボックス 12">
+            <a:extLst>
+              <a:ext uri="{FF2B5EF4-FFF2-40B4-BE49-F238E27FC236}">
+                <a16:creationId xmlns:a16="http://schemas.microsoft.com/office/drawing/2014/main" id="{B2F8EF45-3E25-8B06-B8F2-28071697C5AA}"/>
+              </a:ext>
+            </a:extLst>
+          </p:cNvPr>
+          <p:cNvSpPr txBox="1"/>
+          <p:nvPr/>
+        </p:nvSpPr>
+        <p:spPr>
+          <a:xfrm>
+            <a:off x="1335595" y="1237613"/>
+            <a:ext cx="3164649" cy="338554"/>
+          </a:xfrm>
+          <a:prstGeom prst="rect">
+            <a:avLst/>
+          </a:prstGeom>
+          <a:noFill/>
+        </p:spPr>
+        <p:txBody>
+          <a:bodyPr wrap="none" rtlCol="0">
+            <a:spAutoFit/>
+          </a:bodyPr>
+          <a:lstStyle/>
+          <a:p>
+            <a:r>
+              <a:rPr lang="ja-JP" altLang="en-US" sz="1600">
+                <a:latin typeface="Meiryo UI" panose="020B0604030504040204" pitchFamily="34" charset="-128"/>
+                <a:ea typeface="Meiryo UI" panose="020B0604030504040204" pitchFamily="34" charset="-128"/>
+              </a:rPr>
+              <a:t>コントローラー（統合テストでテスト）</a:t>
+            </a:r>
+            <a:endParaRPr kumimoji="1" lang="ja-JP" altLang="en-US" sz="1600">
+              <a:latin typeface="Meiryo UI" panose="020B0604030504040204" pitchFamily="34" charset="-128"/>
+              <a:ea typeface="Meiryo UI" panose="020B0604030504040204" pitchFamily="34" charset="-128"/>
+            </a:endParaRPr>
+          </a:p>
+        </p:txBody>
+      </p:sp>
+      <p:sp>
+        <p:nvSpPr>
+          <p:cNvPr id="14" name="テキスト ボックス 13">
+            <a:extLst>
+              <a:ext uri="{FF2B5EF4-FFF2-40B4-BE49-F238E27FC236}">
+                <a16:creationId xmlns:a16="http://schemas.microsoft.com/office/drawing/2014/main" id="{BB4B0A8A-1438-8549-535A-8DB585436F1B}"/>
+              </a:ext>
+            </a:extLst>
+          </p:cNvPr>
+          <p:cNvSpPr txBox="1"/>
+          <p:nvPr/>
+        </p:nvSpPr>
+        <p:spPr>
+          <a:xfrm>
+            <a:off x="6008237" y="3357544"/>
+            <a:ext cx="776175" cy="338554"/>
+          </a:xfrm>
+          <a:prstGeom prst="rect">
+            <a:avLst/>
+          </a:prstGeom>
+          <a:noFill/>
+        </p:spPr>
+        <p:txBody>
+          <a:bodyPr wrap="none" rtlCol="0">
+            <a:spAutoFit/>
+          </a:bodyPr>
+          <a:lstStyle/>
+          <a:p>
+            <a:r>
+              <a:rPr kumimoji="1" lang="ja-JP" altLang="en-US" sz="1600">
+                <a:latin typeface="Meiryo UI" panose="020B0604030504040204" pitchFamily="34" charset="-128"/>
+                <a:ea typeface="Meiryo UI" panose="020B0604030504040204" pitchFamily="34" charset="-128"/>
+              </a:rPr>
+              <a:t>ドメイン</a:t>
+            </a:r>
+          </a:p>
+        </p:txBody>
+      </p:sp>
     </p:spTree>
     <p:extLst>
       <p:ext uri="{BB962C8B-B14F-4D97-AF65-F5344CB8AC3E}">

</xml_diff>